<commit_message>
addds design to signature chapter
</commit_message>
<xml_diff>
--- a/images/pics.pptx
+++ b/images/pics.pptx
@@ -10,6 +10,7 @@
     <p:sldId id="258" r:id="rId4"/>
     <p:sldId id="259" r:id="rId5"/>
     <p:sldId id="260" r:id="rId6"/>
+    <p:sldId id="261" r:id="rId7"/>
   </p:sldIdLst>
   <p:sldSz cx="12192000" cy="6858000"/>
   <p:notesSz cx="6858000" cy="9144000"/>
@@ -5463,137 +5464,6 @@
       </p:sp>
       <p:sp>
         <p:nvSpPr>
-          <p:cNvPr id="10" name="Oval 9"/>
-          <p:cNvSpPr/>
-          <p:nvPr/>
-        </p:nvSpPr>
-        <p:spPr>
-          <a:xfrm>
-            <a:off x="7006590" y="4840287"/>
-            <a:ext cx="454025" cy="469265"/>
-          </a:xfrm>
-          <a:prstGeom prst="ellipse">
-            <a:avLst/>
-          </a:prstGeom>
-          <a:solidFill>
-            <a:schemeClr val="bg1"/>
-          </a:solidFill>
-          <a:ln w="19050">
-            <a:solidFill>
-              <a:schemeClr val="tx1"/>
-            </a:solidFill>
-          </a:ln>
-        </p:spPr>
-        <p:style>
-          <a:lnRef idx="2">
-            <a:schemeClr val="accent1">
-              <a:shade val="50000"/>
-            </a:schemeClr>
-          </a:lnRef>
-          <a:fillRef idx="1">
-            <a:schemeClr val="accent1"/>
-          </a:fillRef>
-          <a:effectRef idx="0">
-            <a:schemeClr val="accent1"/>
-          </a:effectRef>
-          <a:fontRef idx="minor">
-            <a:schemeClr val="lt1"/>
-          </a:fontRef>
-        </p:style>
-        <p:txBody>
-          <a:bodyPr rot="0" spcFirstLastPara="0" vert="horz" wrap="square" lIns="91440" tIns="45720" rIns="91440" bIns="45720" numCol="1" spcCol="0" rtlCol="0" fromWordArt="0" anchor="ctr" anchorCtr="0" forceAA="0" compatLnSpc="1">
-            <a:prstTxWarp prst="textNoShape">
-              <a:avLst/>
-            </a:prstTxWarp>
-            <a:noAutofit/>
-          </a:bodyPr>
-          <a:lstStyle/>
-          <a:p>
-            <a:pPr marL="0" marR="0">
-              <a:lnSpc>
-                <a:spcPct val="107000"/>
-              </a:lnSpc>
-              <a:spcBef>
-                <a:spcPts val="0"/>
-              </a:spcBef>
-              <a:spcAft>
-                <a:spcPts val="800"/>
-              </a:spcAft>
-            </a:pPr>
-            <a:endParaRPr lang="en-US" sz="1200" dirty="0" smtClean="0">
-              <a:solidFill>
-                <a:srgbClr val="000000"/>
-              </a:solidFill>
-              <a:effectLst/>
-              <a:latin typeface="Times New Roman" panose="02020603050405020304" pitchFamily="18" charset="0"/>
-              <a:ea typeface="Calibri" panose="020F0502020204030204" pitchFamily="34" charset="0"/>
-              <a:cs typeface="Times New Roman" panose="02020603050405020304" pitchFamily="18" charset="0"/>
-            </a:endParaRPr>
-          </a:p>
-          <a:p>
-            <a:pPr marL="0" marR="0">
-              <a:lnSpc>
-                <a:spcPct val="107000"/>
-              </a:lnSpc>
-              <a:spcBef>
-                <a:spcPts val="0"/>
-              </a:spcBef>
-              <a:spcAft>
-                <a:spcPts val="800"/>
-              </a:spcAft>
-            </a:pPr>
-            <a:r>
-              <a:rPr lang="en-US" sz="1200" dirty="0" smtClean="0">
-                <a:solidFill>
-                  <a:srgbClr val="000000"/>
-                </a:solidFill>
-                <a:effectLst/>
-                <a:latin typeface="Times New Roman" panose="02020603050405020304" pitchFamily="18" charset="0"/>
-                <a:ea typeface="Calibri" panose="020F0502020204030204" pitchFamily="34" charset="0"/>
-                <a:cs typeface="Times New Roman" panose="02020603050405020304" pitchFamily="18" charset="0"/>
-              </a:rPr>
-              <a:t>I</a:t>
-            </a:r>
-            <a:endParaRPr lang="en-US" sz="1100" dirty="0">
-              <a:effectLst/>
-              <a:ea typeface="Calibri" panose="020F0502020204030204" pitchFamily="34" charset="0"/>
-              <a:cs typeface="Times New Roman" panose="02020603050405020304" pitchFamily="18" charset="0"/>
-            </a:endParaRPr>
-          </a:p>
-          <a:p>
-            <a:pPr marL="0" marR="0">
-              <a:lnSpc>
-                <a:spcPct val="107000"/>
-              </a:lnSpc>
-              <a:spcBef>
-                <a:spcPts val="0"/>
-              </a:spcBef>
-              <a:spcAft>
-                <a:spcPts val="800"/>
-              </a:spcAft>
-            </a:pPr>
-            <a:r>
-              <a:rPr lang="en-US" sz="1200" dirty="0">
-                <a:solidFill>
-                  <a:srgbClr val="000000"/>
-                </a:solidFill>
-                <a:effectLst/>
-                <a:latin typeface="Times New Roman" panose="02020603050405020304" pitchFamily="18" charset="0"/>
-                <a:ea typeface="Calibri" panose="020F0502020204030204" pitchFamily="34" charset="0"/>
-                <a:cs typeface="Times New Roman" panose="02020603050405020304" pitchFamily="18" charset="0"/>
-              </a:rPr>
-              <a:t> </a:t>
-            </a:r>
-            <a:endParaRPr lang="en-US" sz="1100" dirty="0">
-              <a:effectLst/>
-              <a:ea typeface="Calibri" panose="020F0502020204030204" pitchFamily="34" charset="0"/>
-              <a:cs typeface="Times New Roman" panose="02020603050405020304" pitchFamily="18" charset="0"/>
-            </a:endParaRPr>
-          </a:p>
-        </p:txBody>
-      </p:sp>
-      <p:sp>
-        <p:nvSpPr>
           <p:cNvPr id="11" name="Isosceles Triangle 10"/>
           <p:cNvSpPr/>
           <p:nvPr/>
@@ -5925,14 +5795,14 @@
         <p:nvCxnSpPr>
           <p:cNvPr id="19" name="Straight Arrow Connector 18"/>
           <p:cNvCxnSpPr>
-            <a:stCxn id="10" idx="0"/>
+            <a:stCxn id="20" idx="0"/>
           </p:cNvCxnSpPr>
           <p:nvPr/>
         </p:nvCxnSpPr>
         <p:spPr>
           <a:xfrm flipH="1" flipV="1">
-            <a:off x="6774180" y="4376737"/>
-            <a:ext cx="459423" cy="463550"/>
+            <a:off x="6678295" y="4388802"/>
+            <a:ext cx="391378" cy="431800"/>
           </a:xfrm>
           <a:prstGeom prst="straightConnector1">
             <a:avLst/>
@@ -5959,10 +5829,1629 @@
           </a:fontRef>
         </p:style>
       </p:cxnSp>
+      <p:sp>
+        <p:nvSpPr>
+          <p:cNvPr id="20" name="Oval 19"/>
+          <p:cNvSpPr/>
+          <p:nvPr/>
+        </p:nvSpPr>
+        <p:spPr>
+          <a:xfrm>
+            <a:off x="6783070" y="4820602"/>
+            <a:ext cx="573206" cy="600502"/>
+          </a:xfrm>
+          <a:prstGeom prst="ellipse">
+            <a:avLst/>
+          </a:prstGeom>
+          <a:noFill/>
+          <a:ln w="28575">
+            <a:solidFill>
+              <a:schemeClr val="tx1"/>
+            </a:solidFill>
+          </a:ln>
+        </p:spPr>
+        <p:style>
+          <a:lnRef idx="2">
+            <a:schemeClr val="accent1">
+              <a:shade val="50000"/>
+            </a:schemeClr>
+          </a:lnRef>
+          <a:fillRef idx="1">
+            <a:schemeClr val="accent1"/>
+          </a:fillRef>
+          <a:effectRef idx="0">
+            <a:schemeClr val="accent1"/>
+          </a:effectRef>
+          <a:fontRef idx="minor">
+            <a:schemeClr val="lt1"/>
+          </a:fontRef>
+        </p:style>
+        <p:txBody>
+          <a:bodyPr rtlCol="0" anchor="ctr"/>
+          <a:lstStyle/>
+          <a:p>
+            <a:pPr algn="ctr"/>
+            <a:r>
+              <a:rPr lang="en-US" baseline="-25000" smtClean="0">
+                <a:solidFill>
+                  <a:schemeClr val="tx1"/>
+                </a:solidFill>
+              </a:rPr>
+              <a:t>I</a:t>
+            </a:r>
+            <a:endParaRPr lang="en-US" baseline="-25000" dirty="0">
+              <a:solidFill>
+                <a:schemeClr val="tx1"/>
+              </a:solidFill>
+            </a:endParaRPr>
+          </a:p>
+        </p:txBody>
+      </p:sp>
     </p:spTree>
     <p:extLst>
       <p:ext uri="{BB962C8B-B14F-4D97-AF65-F5344CB8AC3E}">
         <p14:creationId xmlns:p14="http://schemas.microsoft.com/office/powerpoint/2010/main" val="2921822747"/>
+      </p:ext>
+    </p:extLst>
+  </p:cSld>
+  <p:clrMapOvr>
+    <a:masterClrMapping/>
+  </p:clrMapOvr>
+  <p:timing>
+    <p:tnLst>
+      <p:par>
+        <p:cTn id="1" dur="indefinite" restart="never" nodeType="tmRoot"/>
+      </p:par>
+    </p:tnLst>
+  </p:timing>
+</p:sld>
+</file>
+
+<file path=ppt/slides/slide6.xml><?xml version="1.0" encoding="utf-8"?>
+<p:sld xmlns:a="http://schemas.openxmlformats.org/drawingml/2006/main" xmlns:r="http://schemas.openxmlformats.org/officeDocument/2006/relationships" xmlns:p="http://schemas.openxmlformats.org/presentationml/2006/main">
+  <p:cSld>
+    <p:spTree>
+      <p:nvGrpSpPr>
+        <p:cNvPr id="1" name=""/>
+        <p:cNvGrpSpPr/>
+        <p:nvPr/>
+      </p:nvGrpSpPr>
+      <p:grpSpPr>
+        <a:xfrm>
+          <a:off x="0" y="0"/>
+          <a:ext cx="0" cy="0"/>
+          <a:chOff x="0" y="0"/>
+          <a:chExt cx="0" cy="0"/>
+        </a:xfrm>
+      </p:grpSpPr>
+      <p:sp>
+        <p:nvSpPr>
+          <p:cNvPr id="2" name="Oval 1"/>
+          <p:cNvSpPr/>
+          <p:nvPr/>
+        </p:nvSpPr>
+        <p:spPr>
+          <a:xfrm>
+            <a:off x="2959734" y="3949065"/>
+            <a:ext cx="455930" cy="455295"/>
+          </a:xfrm>
+          <a:prstGeom prst="ellipse">
+            <a:avLst/>
+          </a:prstGeom>
+          <a:ln w="19050">
+            <a:solidFill>
+              <a:schemeClr val="tx1"/>
+            </a:solidFill>
+          </a:ln>
+        </p:spPr>
+        <p:style>
+          <a:lnRef idx="2">
+            <a:schemeClr val="accent1"/>
+          </a:lnRef>
+          <a:fillRef idx="1">
+            <a:schemeClr val="lt1"/>
+          </a:fillRef>
+          <a:effectRef idx="0">
+            <a:schemeClr val="accent1"/>
+          </a:effectRef>
+          <a:fontRef idx="minor">
+            <a:schemeClr val="dk1"/>
+          </a:fontRef>
+        </p:style>
+        <p:txBody>
+          <a:bodyPr rot="0" spcFirstLastPara="0" vert="horz" wrap="square" lIns="91440" tIns="45720" rIns="91440" bIns="45720" numCol="1" spcCol="0" rtlCol="0" fromWordArt="0" anchor="ctr" anchorCtr="0" forceAA="0" compatLnSpc="1">
+            <a:prstTxWarp prst="textNoShape">
+              <a:avLst/>
+            </a:prstTxWarp>
+            <a:noAutofit/>
+          </a:bodyPr>
+          <a:lstStyle/>
+          <a:p>
+            <a:pPr marL="0" marR="0" algn="ctr">
+              <a:lnSpc>
+                <a:spcPct val="107000"/>
+              </a:lnSpc>
+              <a:spcBef>
+                <a:spcPts val="0"/>
+              </a:spcBef>
+              <a:spcAft>
+                <a:spcPts val="800"/>
+              </a:spcAft>
+            </a:pPr>
+            <a:r>
+              <a:rPr lang="en-US" sz="900" b="1" i="1" dirty="0">
+                <a:effectLst/>
+                <a:latin typeface="Times New Roman" panose="02020603050405020304" pitchFamily="18" charset="0"/>
+                <a:ea typeface="Calibri" panose="020F0502020204030204" pitchFamily="34" charset="0"/>
+                <a:cs typeface="Times New Roman" panose="02020603050405020304" pitchFamily="18" charset="0"/>
+              </a:rPr>
+              <a:t>H</a:t>
+            </a:r>
+            <a:r>
+              <a:rPr lang="en-US" sz="900" b="1" i="1" baseline="-25000" dirty="0">
+                <a:effectLst/>
+                <a:latin typeface="Times New Roman" panose="02020603050405020304" pitchFamily="18" charset="0"/>
+                <a:ea typeface="Calibri" panose="020F0502020204030204" pitchFamily="34" charset="0"/>
+                <a:cs typeface="Times New Roman" panose="02020603050405020304" pitchFamily="18" charset="0"/>
+              </a:rPr>
+              <a:t>0</a:t>
+            </a:r>
+            <a:endParaRPr lang="en-US" sz="900" b="1" dirty="0">
+              <a:effectLst/>
+              <a:ea typeface="Calibri" panose="020F0502020204030204" pitchFamily="34" charset="0"/>
+              <a:cs typeface="Times New Roman" panose="02020603050405020304" pitchFamily="18" charset="0"/>
+            </a:endParaRPr>
+          </a:p>
+        </p:txBody>
+      </p:sp>
+      <p:sp>
+        <p:nvSpPr>
+          <p:cNvPr id="3" name="Oval 2"/>
+          <p:cNvSpPr/>
+          <p:nvPr/>
+        </p:nvSpPr>
+        <p:spPr>
+          <a:xfrm>
+            <a:off x="3643629" y="3949065"/>
+            <a:ext cx="457835" cy="455295"/>
+          </a:xfrm>
+          <a:prstGeom prst="ellipse">
+            <a:avLst/>
+          </a:prstGeom>
+          <a:ln w="19050">
+            <a:solidFill>
+              <a:schemeClr val="tx1"/>
+            </a:solidFill>
+          </a:ln>
+        </p:spPr>
+        <p:style>
+          <a:lnRef idx="2">
+            <a:schemeClr val="accent1"/>
+          </a:lnRef>
+          <a:fillRef idx="1">
+            <a:schemeClr val="lt1"/>
+          </a:fillRef>
+          <a:effectRef idx="0">
+            <a:schemeClr val="accent1"/>
+          </a:effectRef>
+          <a:fontRef idx="minor">
+            <a:schemeClr val="dk1"/>
+          </a:fontRef>
+        </p:style>
+        <p:txBody>
+          <a:bodyPr rot="0" spcFirstLastPara="0" vert="horz" wrap="square" lIns="91440" tIns="45720" rIns="91440" bIns="45720" numCol="1" spcCol="0" rtlCol="0" fromWordArt="0" anchor="ctr" anchorCtr="0" forceAA="0" compatLnSpc="1">
+            <a:prstTxWarp prst="textNoShape">
+              <a:avLst/>
+            </a:prstTxWarp>
+            <a:noAutofit/>
+          </a:bodyPr>
+          <a:lstStyle/>
+          <a:p>
+            <a:pPr marL="0" marR="0" algn="ctr">
+              <a:lnSpc>
+                <a:spcPct val="107000"/>
+              </a:lnSpc>
+              <a:spcBef>
+                <a:spcPts val="0"/>
+              </a:spcBef>
+              <a:spcAft>
+                <a:spcPts val="800"/>
+              </a:spcAft>
+            </a:pPr>
+            <a:r>
+              <a:rPr lang="en-US" sz="900" b="1" i="1" dirty="0">
+                <a:effectLst/>
+                <a:latin typeface="Times New Roman" panose="02020603050405020304" pitchFamily="18" charset="0"/>
+                <a:ea typeface="Calibri" panose="020F0502020204030204" pitchFamily="34" charset="0"/>
+                <a:cs typeface="Times New Roman" panose="02020603050405020304" pitchFamily="18" charset="0"/>
+              </a:rPr>
+              <a:t>I</a:t>
+            </a:r>
+            <a:r>
+              <a:rPr lang="en-US" sz="900" b="1" i="1" baseline="-25000" dirty="0">
+                <a:effectLst/>
+                <a:latin typeface="Times New Roman" panose="02020603050405020304" pitchFamily="18" charset="0"/>
+                <a:ea typeface="Calibri" panose="020F0502020204030204" pitchFamily="34" charset="0"/>
+                <a:cs typeface="Times New Roman" panose="02020603050405020304" pitchFamily="18" charset="0"/>
+              </a:rPr>
+              <a:t>0</a:t>
+            </a:r>
+            <a:endParaRPr lang="en-US" sz="900" b="1" dirty="0">
+              <a:effectLst/>
+              <a:ea typeface="Calibri" panose="020F0502020204030204" pitchFamily="34" charset="0"/>
+              <a:cs typeface="Times New Roman" panose="02020603050405020304" pitchFamily="18" charset="0"/>
+            </a:endParaRPr>
+          </a:p>
+        </p:txBody>
+      </p:sp>
+      <p:sp>
+        <p:nvSpPr>
+          <p:cNvPr id="4" name="Oval 3"/>
+          <p:cNvSpPr/>
+          <p:nvPr/>
+        </p:nvSpPr>
+        <p:spPr>
+          <a:xfrm>
+            <a:off x="3301364" y="3265805"/>
+            <a:ext cx="452755" cy="454025"/>
+          </a:xfrm>
+          <a:prstGeom prst="ellipse">
+            <a:avLst/>
+          </a:prstGeom>
+          <a:ln w="19050">
+            <a:solidFill>
+              <a:schemeClr val="tx1"/>
+            </a:solidFill>
+          </a:ln>
+        </p:spPr>
+        <p:style>
+          <a:lnRef idx="2">
+            <a:schemeClr val="accent1"/>
+          </a:lnRef>
+          <a:fillRef idx="1">
+            <a:schemeClr val="lt1"/>
+          </a:fillRef>
+          <a:effectRef idx="0">
+            <a:schemeClr val="accent1"/>
+          </a:effectRef>
+          <a:fontRef idx="minor">
+            <a:schemeClr val="dk1"/>
+          </a:fontRef>
+        </p:style>
+        <p:txBody>
+          <a:bodyPr rot="0" spcFirstLastPara="0" vert="horz" wrap="square" lIns="91440" tIns="45720" rIns="91440" bIns="45720" numCol="1" spcCol="0" rtlCol="0" fromWordArt="0" anchor="ctr" anchorCtr="0" forceAA="0" compatLnSpc="1">
+            <a:prstTxWarp prst="textNoShape">
+              <a:avLst/>
+            </a:prstTxWarp>
+            <a:noAutofit/>
+          </a:bodyPr>
+          <a:lstStyle/>
+          <a:p>
+            <a:pPr marL="0" marR="0" algn="ctr">
+              <a:lnSpc>
+                <a:spcPct val="107000"/>
+              </a:lnSpc>
+              <a:spcBef>
+                <a:spcPts val="0"/>
+              </a:spcBef>
+              <a:spcAft>
+                <a:spcPts val="800"/>
+              </a:spcAft>
+            </a:pPr>
+            <a:r>
+              <a:rPr lang="en-US" sz="900" b="1" i="1" dirty="0">
+                <a:effectLst/>
+                <a:latin typeface="Times New Roman" panose="02020603050405020304" pitchFamily="18" charset="0"/>
+                <a:ea typeface="Calibri" panose="020F0502020204030204" pitchFamily="34" charset="0"/>
+                <a:cs typeface="Times New Roman" panose="02020603050405020304" pitchFamily="18" charset="0"/>
+              </a:rPr>
+              <a:t>H</a:t>
+            </a:r>
+            <a:r>
+              <a:rPr lang="en-US" sz="900" b="1" i="1" baseline="-25000" dirty="0">
+                <a:effectLst/>
+                <a:latin typeface="Times New Roman" panose="02020603050405020304" pitchFamily="18" charset="0"/>
+                <a:ea typeface="Calibri" panose="020F0502020204030204" pitchFamily="34" charset="0"/>
+                <a:cs typeface="Times New Roman" panose="02020603050405020304" pitchFamily="18" charset="0"/>
+              </a:rPr>
+              <a:t>1</a:t>
+            </a:r>
+            <a:endParaRPr lang="en-US" sz="900" b="1" dirty="0">
+              <a:effectLst/>
+              <a:ea typeface="Calibri" panose="020F0502020204030204" pitchFamily="34" charset="0"/>
+              <a:cs typeface="Times New Roman" panose="02020603050405020304" pitchFamily="18" charset="0"/>
+            </a:endParaRPr>
+          </a:p>
+        </p:txBody>
+      </p:sp>
+      <p:cxnSp>
+        <p:nvCxnSpPr>
+          <p:cNvPr id="5" name="Straight Connector 4"/>
+          <p:cNvCxnSpPr/>
+          <p:nvPr/>
+        </p:nvCxnSpPr>
+        <p:spPr>
+          <a:xfrm flipV="1">
+            <a:off x="3188652" y="3715385"/>
+            <a:ext cx="342900" cy="224790"/>
+          </a:xfrm>
+          <a:prstGeom prst="line">
+            <a:avLst/>
+          </a:prstGeom>
+          <a:ln w="19050">
+            <a:solidFill>
+              <a:schemeClr val="tx1"/>
+            </a:solidFill>
+          </a:ln>
+        </p:spPr>
+        <p:style>
+          <a:lnRef idx="1">
+            <a:schemeClr val="accent1"/>
+          </a:lnRef>
+          <a:fillRef idx="0">
+            <a:schemeClr val="accent1"/>
+          </a:fillRef>
+          <a:effectRef idx="0">
+            <a:schemeClr val="accent1"/>
+          </a:effectRef>
+          <a:fontRef idx="minor">
+            <a:schemeClr val="tx1"/>
+          </a:fontRef>
+        </p:style>
+      </p:cxnSp>
+      <p:cxnSp>
+        <p:nvCxnSpPr>
+          <p:cNvPr id="6" name="Straight Connector 5"/>
+          <p:cNvCxnSpPr/>
+          <p:nvPr/>
+        </p:nvCxnSpPr>
+        <p:spPr>
+          <a:xfrm flipH="1" flipV="1">
+            <a:off x="3531552" y="3715385"/>
+            <a:ext cx="316865" cy="224790"/>
+          </a:xfrm>
+          <a:prstGeom prst="line">
+            <a:avLst/>
+          </a:prstGeom>
+          <a:ln w="19050">
+            <a:solidFill>
+              <a:schemeClr val="tx1"/>
+            </a:solidFill>
+          </a:ln>
+        </p:spPr>
+        <p:style>
+          <a:lnRef idx="1">
+            <a:schemeClr val="accent1"/>
+          </a:lnRef>
+          <a:fillRef idx="0">
+            <a:schemeClr val="accent1"/>
+          </a:fillRef>
+          <a:effectRef idx="0">
+            <a:schemeClr val="accent1"/>
+          </a:effectRef>
+          <a:fontRef idx="minor">
+            <a:schemeClr val="tx1"/>
+          </a:fontRef>
+        </p:style>
+      </p:cxnSp>
+      <p:sp>
+        <p:nvSpPr>
+          <p:cNvPr id="7" name="Oval 6"/>
+          <p:cNvSpPr/>
+          <p:nvPr/>
+        </p:nvSpPr>
+        <p:spPr>
+          <a:xfrm>
+            <a:off x="4336097" y="3941445"/>
+            <a:ext cx="450215" cy="455930"/>
+          </a:xfrm>
+          <a:prstGeom prst="ellipse">
+            <a:avLst/>
+          </a:prstGeom>
+          <a:ln w="19050">
+            <a:solidFill>
+              <a:schemeClr val="tx1"/>
+            </a:solidFill>
+          </a:ln>
+        </p:spPr>
+        <p:style>
+          <a:lnRef idx="2">
+            <a:schemeClr val="accent1"/>
+          </a:lnRef>
+          <a:fillRef idx="1">
+            <a:schemeClr val="lt1"/>
+          </a:fillRef>
+          <a:effectRef idx="0">
+            <a:schemeClr val="accent1"/>
+          </a:effectRef>
+          <a:fontRef idx="minor">
+            <a:schemeClr val="dk1"/>
+          </a:fontRef>
+        </p:style>
+        <p:txBody>
+          <a:bodyPr rot="0" spcFirstLastPara="0" vert="horz" wrap="square" lIns="91440" tIns="45720" rIns="91440" bIns="45720" numCol="1" spcCol="0" rtlCol="0" fromWordArt="0" anchor="ctr" anchorCtr="0" forceAA="0" compatLnSpc="1">
+            <a:prstTxWarp prst="textNoShape">
+              <a:avLst/>
+            </a:prstTxWarp>
+            <a:noAutofit/>
+          </a:bodyPr>
+          <a:lstStyle/>
+          <a:p>
+            <a:pPr marL="0" marR="0" algn="ctr">
+              <a:lnSpc>
+                <a:spcPct val="107000"/>
+              </a:lnSpc>
+              <a:spcBef>
+                <a:spcPts val="0"/>
+              </a:spcBef>
+              <a:spcAft>
+                <a:spcPts val="800"/>
+              </a:spcAft>
+            </a:pPr>
+            <a:r>
+              <a:rPr lang="en-US" sz="900" b="1" i="1" dirty="0">
+                <a:effectLst/>
+                <a:latin typeface="Times New Roman" panose="02020603050405020304" pitchFamily="18" charset="0"/>
+                <a:ea typeface="Calibri" panose="020F0502020204030204" pitchFamily="34" charset="0"/>
+                <a:cs typeface="Times New Roman" panose="02020603050405020304" pitchFamily="18" charset="0"/>
+              </a:rPr>
+              <a:t>C</a:t>
+            </a:r>
+            <a:r>
+              <a:rPr lang="en-US" sz="900" b="1" i="1" baseline="-25000" dirty="0">
+                <a:effectLst/>
+                <a:latin typeface="Times New Roman" panose="02020603050405020304" pitchFamily="18" charset="0"/>
+                <a:ea typeface="Calibri" panose="020F0502020204030204" pitchFamily="34" charset="0"/>
+                <a:cs typeface="Times New Roman" panose="02020603050405020304" pitchFamily="18" charset="0"/>
+              </a:rPr>
+              <a:t>0</a:t>
+            </a:r>
+            <a:endParaRPr lang="en-US" sz="900" b="1" dirty="0">
+              <a:effectLst/>
+              <a:ea typeface="Calibri" panose="020F0502020204030204" pitchFamily="34" charset="0"/>
+              <a:cs typeface="Times New Roman" panose="02020603050405020304" pitchFamily="18" charset="0"/>
+            </a:endParaRPr>
+          </a:p>
+        </p:txBody>
+      </p:sp>
+      <p:sp>
+        <p:nvSpPr>
+          <p:cNvPr id="8" name="Oval 7"/>
+          <p:cNvSpPr/>
+          <p:nvPr/>
+        </p:nvSpPr>
+        <p:spPr>
+          <a:xfrm>
+            <a:off x="4678362" y="3258185"/>
+            <a:ext cx="452755" cy="461645"/>
+          </a:xfrm>
+          <a:prstGeom prst="ellipse">
+            <a:avLst/>
+          </a:prstGeom>
+          <a:ln w="19050">
+            <a:solidFill>
+              <a:schemeClr val="tx1"/>
+            </a:solidFill>
+          </a:ln>
+        </p:spPr>
+        <p:style>
+          <a:lnRef idx="2">
+            <a:schemeClr val="accent1"/>
+          </a:lnRef>
+          <a:fillRef idx="1">
+            <a:schemeClr val="lt1"/>
+          </a:fillRef>
+          <a:effectRef idx="0">
+            <a:schemeClr val="accent1"/>
+          </a:effectRef>
+          <a:fontRef idx="minor">
+            <a:schemeClr val="dk1"/>
+          </a:fontRef>
+        </p:style>
+        <p:txBody>
+          <a:bodyPr rot="0" spcFirstLastPara="0" vert="horz" wrap="square" lIns="91440" tIns="45720" rIns="91440" bIns="45720" numCol="1" spcCol="0" rtlCol="0" fromWordArt="0" anchor="ctr" anchorCtr="0" forceAA="0" compatLnSpc="1">
+            <a:prstTxWarp prst="textNoShape">
+              <a:avLst/>
+            </a:prstTxWarp>
+            <a:noAutofit/>
+          </a:bodyPr>
+          <a:lstStyle/>
+          <a:p>
+            <a:pPr marL="0" marR="0" algn="ctr">
+              <a:lnSpc>
+                <a:spcPct val="107000"/>
+              </a:lnSpc>
+              <a:spcBef>
+                <a:spcPts val="0"/>
+              </a:spcBef>
+              <a:spcAft>
+                <a:spcPts val="800"/>
+              </a:spcAft>
+            </a:pPr>
+            <a:r>
+              <a:rPr lang="en-US" sz="900" b="1" i="1" dirty="0">
+                <a:effectLst/>
+                <a:latin typeface="Times New Roman" panose="02020603050405020304" pitchFamily="18" charset="0"/>
+                <a:ea typeface="Calibri" panose="020F0502020204030204" pitchFamily="34" charset="0"/>
+                <a:cs typeface="Times New Roman" panose="02020603050405020304" pitchFamily="18" charset="0"/>
+              </a:rPr>
+              <a:t>C</a:t>
+            </a:r>
+            <a:r>
+              <a:rPr lang="en-US" sz="900" b="1" i="1" baseline="-25000" dirty="0">
+                <a:effectLst/>
+                <a:latin typeface="Times New Roman" panose="02020603050405020304" pitchFamily="18" charset="0"/>
+                <a:ea typeface="Calibri" panose="020F0502020204030204" pitchFamily="34" charset="0"/>
+                <a:cs typeface="Times New Roman" panose="02020603050405020304" pitchFamily="18" charset="0"/>
+              </a:rPr>
+              <a:t>1</a:t>
+            </a:r>
+            <a:endParaRPr lang="en-US" sz="900" b="1" dirty="0">
+              <a:effectLst/>
+              <a:ea typeface="Calibri" panose="020F0502020204030204" pitchFamily="34" charset="0"/>
+              <a:cs typeface="Times New Roman" panose="02020603050405020304" pitchFamily="18" charset="0"/>
+            </a:endParaRPr>
+          </a:p>
+        </p:txBody>
+      </p:sp>
+      <p:cxnSp>
+        <p:nvCxnSpPr>
+          <p:cNvPr id="9" name="Straight Connector 8"/>
+          <p:cNvCxnSpPr/>
+          <p:nvPr/>
+        </p:nvCxnSpPr>
+        <p:spPr>
+          <a:xfrm flipV="1">
+            <a:off x="4566602" y="3716655"/>
+            <a:ext cx="342900" cy="224790"/>
+          </a:xfrm>
+          <a:prstGeom prst="line">
+            <a:avLst/>
+          </a:prstGeom>
+          <a:ln w="19050">
+            <a:solidFill>
+              <a:schemeClr val="tx1"/>
+            </a:solidFill>
+          </a:ln>
+        </p:spPr>
+        <p:style>
+          <a:lnRef idx="1">
+            <a:schemeClr val="accent1"/>
+          </a:lnRef>
+          <a:fillRef idx="0">
+            <a:schemeClr val="accent1"/>
+          </a:fillRef>
+          <a:effectRef idx="0">
+            <a:schemeClr val="accent1"/>
+          </a:effectRef>
+          <a:fontRef idx="minor">
+            <a:schemeClr val="tx1"/>
+          </a:fontRef>
+        </p:style>
+      </p:cxnSp>
+      <p:cxnSp>
+        <p:nvCxnSpPr>
+          <p:cNvPr id="10" name="Straight Connector 9"/>
+          <p:cNvCxnSpPr/>
+          <p:nvPr/>
+        </p:nvCxnSpPr>
+        <p:spPr>
+          <a:xfrm flipH="1" flipV="1">
+            <a:off x="4909502" y="3716655"/>
+            <a:ext cx="316865" cy="224790"/>
+          </a:xfrm>
+          <a:prstGeom prst="line">
+            <a:avLst/>
+          </a:prstGeom>
+          <a:ln w="19050">
+            <a:solidFill>
+              <a:schemeClr val="tx1"/>
+            </a:solidFill>
+          </a:ln>
+        </p:spPr>
+        <p:style>
+          <a:lnRef idx="1">
+            <a:schemeClr val="accent1"/>
+          </a:lnRef>
+          <a:fillRef idx="0">
+            <a:schemeClr val="accent1"/>
+          </a:fillRef>
+          <a:effectRef idx="0">
+            <a:schemeClr val="accent1"/>
+          </a:effectRef>
+          <a:fontRef idx="minor">
+            <a:schemeClr val="tx1"/>
+          </a:fontRef>
+        </p:style>
+      </p:cxnSp>
+      <p:cxnSp>
+        <p:nvCxnSpPr>
+          <p:cNvPr id="12" name="Straight Connector 11"/>
+          <p:cNvCxnSpPr/>
+          <p:nvPr/>
+        </p:nvCxnSpPr>
+        <p:spPr>
+          <a:xfrm flipV="1">
+            <a:off x="3534092" y="2915920"/>
+            <a:ext cx="680720" cy="341630"/>
+          </a:xfrm>
+          <a:prstGeom prst="line">
+            <a:avLst/>
+          </a:prstGeom>
+          <a:ln w="19050">
+            <a:solidFill>
+              <a:schemeClr val="tx1"/>
+            </a:solidFill>
+          </a:ln>
+        </p:spPr>
+        <p:style>
+          <a:lnRef idx="1">
+            <a:schemeClr val="accent1"/>
+          </a:lnRef>
+          <a:fillRef idx="0">
+            <a:schemeClr val="accent1"/>
+          </a:fillRef>
+          <a:effectRef idx="0">
+            <a:schemeClr val="accent1"/>
+          </a:effectRef>
+          <a:fontRef idx="minor">
+            <a:schemeClr val="tx1"/>
+          </a:fontRef>
+        </p:style>
+      </p:cxnSp>
+      <p:cxnSp>
+        <p:nvCxnSpPr>
+          <p:cNvPr id="13" name="Straight Connector 12"/>
+          <p:cNvCxnSpPr/>
+          <p:nvPr/>
+        </p:nvCxnSpPr>
+        <p:spPr>
+          <a:xfrm flipH="1" flipV="1">
+            <a:off x="4216717" y="2915920"/>
+            <a:ext cx="691515" cy="341630"/>
+          </a:xfrm>
+          <a:prstGeom prst="line">
+            <a:avLst/>
+          </a:prstGeom>
+          <a:ln w="19050">
+            <a:solidFill>
+              <a:schemeClr val="tx1"/>
+            </a:solidFill>
+          </a:ln>
+        </p:spPr>
+        <p:style>
+          <a:lnRef idx="1">
+            <a:schemeClr val="accent1"/>
+          </a:lnRef>
+          <a:fillRef idx="0">
+            <a:schemeClr val="accent1"/>
+          </a:fillRef>
+          <a:effectRef idx="0">
+            <a:schemeClr val="accent1"/>
+          </a:effectRef>
+          <a:fontRef idx="minor">
+            <a:schemeClr val="tx1"/>
+          </a:fontRef>
+        </p:style>
+      </p:cxnSp>
+      <p:sp>
+        <p:nvSpPr>
+          <p:cNvPr id="14" name="Rectangle 13"/>
+          <p:cNvSpPr/>
+          <p:nvPr/>
+        </p:nvSpPr>
+        <p:spPr>
+          <a:xfrm>
+            <a:off x="2834322" y="2343785"/>
+            <a:ext cx="2739390" cy="2170430"/>
+          </a:xfrm>
+          <a:prstGeom prst="rect">
+            <a:avLst/>
+          </a:prstGeom>
+          <a:noFill/>
+          <a:ln w="3175" cap="sq">
+            <a:solidFill>
+              <a:schemeClr val="tx1"/>
+            </a:solidFill>
+            <a:prstDash val="lgDashDotDot"/>
+          </a:ln>
+        </p:spPr>
+        <p:style>
+          <a:lnRef idx="2">
+            <a:schemeClr val="accent1">
+              <a:shade val="50000"/>
+            </a:schemeClr>
+          </a:lnRef>
+          <a:fillRef idx="1">
+            <a:schemeClr val="accent1"/>
+          </a:fillRef>
+          <a:effectRef idx="0">
+            <a:schemeClr val="accent1"/>
+          </a:effectRef>
+          <a:fontRef idx="minor">
+            <a:schemeClr val="lt1"/>
+          </a:fontRef>
+        </p:style>
+        <p:txBody>
+          <a:bodyPr rot="0" spcFirstLastPara="0" vert="horz" wrap="square" lIns="91440" tIns="45720" rIns="91440" bIns="45720" numCol="1" spcCol="0" rtlCol="0" fromWordArt="0" anchor="ctr" anchorCtr="0" forceAA="0" compatLnSpc="1">
+            <a:prstTxWarp prst="textNoShape">
+              <a:avLst/>
+            </a:prstTxWarp>
+            <a:noAutofit/>
+          </a:bodyPr>
+          <a:lstStyle/>
+          <a:p>
+            <a:endParaRPr lang="en-US"/>
+          </a:p>
+        </p:txBody>
+      </p:sp>
+      <p:sp>
+        <p:nvSpPr>
+          <p:cNvPr id="15" name="Oval 14"/>
+          <p:cNvSpPr/>
+          <p:nvPr/>
+        </p:nvSpPr>
+        <p:spPr>
+          <a:xfrm>
+            <a:off x="5823267" y="3943985"/>
+            <a:ext cx="450850" cy="451485"/>
+          </a:xfrm>
+          <a:prstGeom prst="ellipse">
+            <a:avLst/>
+          </a:prstGeom>
+          <a:ln w="19050">
+            <a:solidFill>
+              <a:schemeClr val="tx1"/>
+            </a:solidFill>
+          </a:ln>
+        </p:spPr>
+        <p:style>
+          <a:lnRef idx="2">
+            <a:schemeClr val="accent1"/>
+          </a:lnRef>
+          <a:fillRef idx="1">
+            <a:schemeClr val="lt1"/>
+          </a:fillRef>
+          <a:effectRef idx="0">
+            <a:schemeClr val="accent1"/>
+          </a:effectRef>
+          <a:fontRef idx="minor">
+            <a:schemeClr val="dk1"/>
+          </a:fontRef>
+        </p:style>
+        <p:txBody>
+          <a:bodyPr rot="0" spcFirstLastPara="0" vert="horz" wrap="square" lIns="91440" tIns="45720" rIns="91440" bIns="45720" numCol="1" spcCol="0" rtlCol="0" fromWordArt="0" anchor="ctr" anchorCtr="0" forceAA="0" compatLnSpc="1">
+            <a:prstTxWarp prst="textNoShape">
+              <a:avLst/>
+            </a:prstTxWarp>
+            <a:noAutofit/>
+          </a:bodyPr>
+          <a:lstStyle/>
+          <a:p>
+            <a:pPr marL="0" marR="0" algn="ctr">
+              <a:lnSpc>
+                <a:spcPct val="107000"/>
+              </a:lnSpc>
+              <a:spcBef>
+                <a:spcPts val="0"/>
+              </a:spcBef>
+              <a:spcAft>
+                <a:spcPts val="800"/>
+              </a:spcAft>
+            </a:pPr>
+            <a:r>
+              <a:rPr lang="en-US" sz="900" b="1" i="1" dirty="0">
+                <a:effectLst/>
+                <a:latin typeface="Times New Roman" panose="02020603050405020304" pitchFamily="18" charset="0"/>
+                <a:ea typeface="Calibri" panose="020F0502020204030204" pitchFamily="34" charset="0"/>
+                <a:cs typeface="Times New Roman" panose="02020603050405020304" pitchFamily="18" charset="0"/>
+              </a:rPr>
+              <a:t>E</a:t>
+            </a:r>
+            <a:r>
+              <a:rPr lang="en-US" sz="900" b="1" i="1" baseline="-25000" dirty="0">
+                <a:effectLst/>
+                <a:latin typeface="Times New Roman" panose="02020603050405020304" pitchFamily="18" charset="0"/>
+                <a:ea typeface="Calibri" panose="020F0502020204030204" pitchFamily="34" charset="0"/>
+                <a:cs typeface="Times New Roman" panose="02020603050405020304" pitchFamily="18" charset="0"/>
+              </a:rPr>
+              <a:t>0</a:t>
+            </a:r>
+            <a:endParaRPr lang="en-US" sz="900" b="1" dirty="0">
+              <a:effectLst/>
+              <a:ea typeface="Calibri" panose="020F0502020204030204" pitchFamily="34" charset="0"/>
+              <a:cs typeface="Times New Roman" panose="02020603050405020304" pitchFamily="18" charset="0"/>
+            </a:endParaRPr>
+          </a:p>
+        </p:txBody>
+      </p:sp>
+      <p:sp>
+        <p:nvSpPr>
+          <p:cNvPr id="16" name="Oval 15"/>
+          <p:cNvSpPr/>
+          <p:nvPr/>
+        </p:nvSpPr>
+        <p:spPr>
+          <a:xfrm>
+            <a:off x="6507162" y="3941445"/>
+            <a:ext cx="452755" cy="453390"/>
+          </a:xfrm>
+          <a:prstGeom prst="ellipse">
+            <a:avLst/>
+          </a:prstGeom>
+          <a:ln w="19050">
+            <a:solidFill>
+              <a:schemeClr val="tx1"/>
+            </a:solidFill>
+          </a:ln>
+        </p:spPr>
+        <p:style>
+          <a:lnRef idx="2">
+            <a:schemeClr val="accent1"/>
+          </a:lnRef>
+          <a:fillRef idx="1">
+            <a:schemeClr val="lt1"/>
+          </a:fillRef>
+          <a:effectRef idx="0">
+            <a:schemeClr val="accent1"/>
+          </a:effectRef>
+          <a:fontRef idx="minor">
+            <a:schemeClr val="dk1"/>
+          </a:fontRef>
+        </p:style>
+        <p:txBody>
+          <a:bodyPr rot="0" spcFirstLastPara="0" vert="horz" wrap="square" lIns="91440" tIns="45720" rIns="91440" bIns="45720" numCol="1" spcCol="0" rtlCol="0" fromWordArt="0" anchor="ctr" anchorCtr="0" forceAA="0" compatLnSpc="1">
+            <a:prstTxWarp prst="textNoShape">
+              <a:avLst/>
+            </a:prstTxWarp>
+            <a:noAutofit/>
+          </a:bodyPr>
+          <a:lstStyle/>
+          <a:p>
+            <a:pPr marL="0" marR="0" algn="ctr">
+              <a:lnSpc>
+                <a:spcPct val="107000"/>
+              </a:lnSpc>
+              <a:spcBef>
+                <a:spcPts val="0"/>
+              </a:spcBef>
+              <a:spcAft>
+                <a:spcPts val="800"/>
+              </a:spcAft>
+            </a:pPr>
+            <a:r>
+              <a:rPr lang="en-US" sz="900" b="1" i="1" dirty="0">
+                <a:effectLst/>
+                <a:latin typeface="Times New Roman" panose="02020603050405020304" pitchFamily="18" charset="0"/>
+                <a:ea typeface="Calibri" panose="020F0502020204030204" pitchFamily="34" charset="0"/>
+                <a:cs typeface="Times New Roman" panose="02020603050405020304" pitchFamily="18" charset="0"/>
+              </a:rPr>
+              <a:t>F</a:t>
+            </a:r>
+            <a:r>
+              <a:rPr lang="en-US" sz="900" b="1" i="1" baseline="-25000" dirty="0">
+                <a:effectLst/>
+                <a:latin typeface="Times New Roman" panose="02020603050405020304" pitchFamily="18" charset="0"/>
+                <a:ea typeface="Calibri" panose="020F0502020204030204" pitchFamily="34" charset="0"/>
+                <a:cs typeface="Times New Roman" panose="02020603050405020304" pitchFamily="18" charset="0"/>
+              </a:rPr>
+              <a:t>0</a:t>
+            </a:r>
+            <a:endParaRPr lang="en-US" sz="900" b="1" dirty="0">
+              <a:effectLst/>
+              <a:ea typeface="Calibri" panose="020F0502020204030204" pitchFamily="34" charset="0"/>
+              <a:cs typeface="Times New Roman" panose="02020603050405020304" pitchFamily="18" charset="0"/>
+            </a:endParaRPr>
+          </a:p>
+        </p:txBody>
+      </p:sp>
+      <p:sp>
+        <p:nvSpPr>
+          <p:cNvPr id="17" name="Oval 16"/>
+          <p:cNvSpPr/>
+          <p:nvPr/>
+        </p:nvSpPr>
+        <p:spPr>
+          <a:xfrm>
+            <a:off x="6157277" y="3274060"/>
+            <a:ext cx="459740" cy="445135"/>
+          </a:xfrm>
+          <a:prstGeom prst="ellipse">
+            <a:avLst/>
+          </a:prstGeom>
+          <a:ln w="19050">
+            <a:solidFill>
+              <a:schemeClr val="tx1"/>
+            </a:solidFill>
+          </a:ln>
+        </p:spPr>
+        <p:style>
+          <a:lnRef idx="2">
+            <a:schemeClr val="accent1"/>
+          </a:lnRef>
+          <a:fillRef idx="1">
+            <a:schemeClr val="lt1"/>
+          </a:fillRef>
+          <a:effectRef idx="0">
+            <a:schemeClr val="accent1"/>
+          </a:effectRef>
+          <a:fontRef idx="minor">
+            <a:schemeClr val="dk1"/>
+          </a:fontRef>
+        </p:style>
+        <p:txBody>
+          <a:bodyPr rot="0" spcFirstLastPara="0" vert="horz" wrap="square" lIns="91440" tIns="45720" rIns="91440" bIns="45720" numCol="1" spcCol="0" rtlCol="0" fromWordArt="0" anchor="ctr" anchorCtr="0" forceAA="0" compatLnSpc="1">
+            <a:prstTxWarp prst="textNoShape">
+              <a:avLst/>
+            </a:prstTxWarp>
+            <a:noAutofit/>
+          </a:bodyPr>
+          <a:lstStyle/>
+          <a:p>
+            <a:pPr marL="0" marR="0" algn="ctr">
+              <a:lnSpc>
+                <a:spcPct val="107000"/>
+              </a:lnSpc>
+              <a:spcBef>
+                <a:spcPts val="0"/>
+              </a:spcBef>
+              <a:spcAft>
+                <a:spcPts val="800"/>
+              </a:spcAft>
+            </a:pPr>
+            <a:r>
+              <a:rPr lang="en-US" sz="900" b="1" i="1" dirty="0">
+                <a:effectLst/>
+                <a:latin typeface="Times New Roman" panose="02020603050405020304" pitchFamily="18" charset="0"/>
+                <a:ea typeface="Calibri" panose="020F0502020204030204" pitchFamily="34" charset="0"/>
+                <a:cs typeface="Times New Roman" panose="02020603050405020304" pitchFamily="18" charset="0"/>
+              </a:rPr>
+              <a:t>B</a:t>
+            </a:r>
+            <a:r>
+              <a:rPr lang="en-US" sz="900" b="1" i="1" baseline="-25000" dirty="0">
+                <a:effectLst/>
+                <a:latin typeface="Times New Roman" panose="02020603050405020304" pitchFamily="18" charset="0"/>
+                <a:ea typeface="Calibri" panose="020F0502020204030204" pitchFamily="34" charset="0"/>
+                <a:cs typeface="Times New Roman" panose="02020603050405020304" pitchFamily="18" charset="0"/>
+              </a:rPr>
+              <a:t>1</a:t>
+            </a:r>
+            <a:endParaRPr lang="en-US" sz="900" b="1" dirty="0">
+              <a:effectLst/>
+              <a:ea typeface="Calibri" panose="020F0502020204030204" pitchFamily="34" charset="0"/>
+              <a:cs typeface="Times New Roman" panose="02020603050405020304" pitchFamily="18" charset="0"/>
+            </a:endParaRPr>
+          </a:p>
+        </p:txBody>
+      </p:sp>
+      <p:cxnSp>
+        <p:nvCxnSpPr>
+          <p:cNvPr id="18" name="Straight Connector 17"/>
+          <p:cNvCxnSpPr/>
+          <p:nvPr/>
+        </p:nvCxnSpPr>
+        <p:spPr>
+          <a:xfrm flipV="1">
+            <a:off x="6046152" y="3719195"/>
+            <a:ext cx="341630" cy="222250"/>
+          </a:xfrm>
+          <a:prstGeom prst="line">
+            <a:avLst/>
+          </a:prstGeom>
+          <a:ln w="19050">
+            <a:solidFill>
+              <a:schemeClr val="tx1"/>
+            </a:solidFill>
+          </a:ln>
+        </p:spPr>
+        <p:style>
+          <a:lnRef idx="1">
+            <a:schemeClr val="accent1"/>
+          </a:lnRef>
+          <a:fillRef idx="0">
+            <a:schemeClr val="accent1"/>
+          </a:fillRef>
+          <a:effectRef idx="0">
+            <a:schemeClr val="accent1"/>
+          </a:effectRef>
+          <a:fontRef idx="minor">
+            <a:schemeClr val="tx1"/>
+          </a:fontRef>
+        </p:style>
+      </p:cxnSp>
+      <p:cxnSp>
+        <p:nvCxnSpPr>
+          <p:cNvPr id="19" name="Straight Connector 18"/>
+          <p:cNvCxnSpPr/>
+          <p:nvPr/>
+        </p:nvCxnSpPr>
+        <p:spPr>
+          <a:xfrm flipH="1" flipV="1">
+            <a:off x="6387782" y="3719195"/>
+            <a:ext cx="343535" cy="222250"/>
+          </a:xfrm>
+          <a:prstGeom prst="line">
+            <a:avLst/>
+          </a:prstGeom>
+          <a:ln w="19050">
+            <a:solidFill>
+              <a:schemeClr val="tx1"/>
+            </a:solidFill>
+          </a:ln>
+        </p:spPr>
+        <p:style>
+          <a:lnRef idx="1">
+            <a:schemeClr val="accent1"/>
+          </a:lnRef>
+          <a:fillRef idx="0">
+            <a:schemeClr val="accent1"/>
+          </a:fillRef>
+          <a:effectRef idx="0">
+            <a:schemeClr val="accent1"/>
+          </a:effectRef>
+          <a:fontRef idx="minor">
+            <a:schemeClr val="tx1"/>
+          </a:fontRef>
+        </p:style>
+      </p:cxnSp>
+      <p:sp>
+        <p:nvSpPr>
+          <p:cNvPr id="20" name="Oval 19"/>
+          <p:cNvSpPr/>
+          <p:nvPr/>
+        </p:nvSpPr>
+        <p:spPr>
+          <a:xfrm>
+            <a:off x="7191057" y="3941445"/>
+            <a:ext cx="456565" cy="453390"/>
+          </a:xfrm>
+          <a:prstGeom prst="ellipse">
+            <a:avLst/>
+          </a:prstGeom>
+          <a:ln w="19050">
+            <a:solidFill>
+              <a:schemeClr val="tx1"/>
+            </a:solidFill>
+          </a:ln>
+        </p:spPr>
+        <p:style>
+          <a:lnRef idx="2">
+            <a:schemeClr val="accent1"/>
+          </a:lnRef>
+          <a:fillRef idx="1">
+            <a:schemeClr val="lt1"/>
+          </a:fillRef>
+          <a:effectRef idx="0">
+            <a:schemeClr val="accent1"/>
+          </a:effectRef>
+          <a:fontRef idx="minor">
+            <a:schemeClr val="dk1"/>
+          </a:fontRef>
+        </p:style>
+        <p:txBody>
+          <a:bodyPr rot="0" spcFirstLastPara="0" vert="horz" wrap="square" lIns="91440" tIns="45720" rIns="91440" bIns="45720" numCol="1" spcCol="0" rtlCol="0" fromWordArt="0" anchor="ctr" anchorCtr="0" forceAA="0" compatLnSpc="1">
+            <a:prstTxWarp prst="textNoShape">
+              <a:avLst/>
+            </a:prstTxWarp>
+            <a:noAutofit/>
+          </a:bodyPr>
+          <a:lstStyle/>
+          <a:p>
+            <a:pPr marL="0" marR="0" algn="ctr">
+              <a:lnSpc>
+                <a:spcPct val="107000"/>
+              </a:lnSpc>
+              <a:spcBef>
+                <a:spcPts val="0"/>
+              </a:spcBef>
+              <a:spcAft>
+                <a:spcPts val="800"/>
+              </a:spcAft>
+            </a:pPr>
+            <a:r>
+              <a:rPr lang="en-US" sz="900" b="1" i="1" dirty="0">
+                <a:effectLst/>
+                <a:latin typeface="Times New Roman" panose="02020603050405020304" pitchFamily="18" charset="0"/>
+                <a:ea typeface="Calibri" panose="020F0502020204030204" pitchFamily="34" charset="0"/>
+                <a:cs typeface="Times New Roman" panose="02020603050405020304" pitchFamily="18" charset="0"/>
+              </a:rPr>
+              <a:t>B</a:t>
+            </a:r>
+            <a:r>
+              <a:rPr lang="en-US" sz="900" b="1" i="1" baseline="-25000" dirty="0">
+                <a:effectLst/>
+                <a:latin typeface="Times New Roman" panose="02020603050405020304" pitchFamily="18" charset="0"/>
+                <a:ea typeface="Calibri" panose="020F0502020204030204" pitchFamily="34" charset="0"/>
+                <a:cs typeface="Times New Roman" panose="02020603050405020304" pitchFamily="18" charset="0"/>
+              </a:rPr>
+              <a:t>0</a:t>
+            </a:r>
+            <a:endParaRPr lang="en-US" sz="900" b="1" dirty="0">
+              <a:effectLst/>
+              <a:ea typeface="Calibri" panose="020F0502020204030204" pitchFamily="34" charset="0"/>
+              <a:cs typeface="Times New Roman" panose="02020603050405020304" pitchFamily="18" charset="0"/>
+            </a:endParaRPr>
+          </a:p>
+        </p:txBody>
+      </p:sp>
+      <p:sp>
+        <p:nvSpPr>
+          <p:cNvPr id="21" name="Rectangle 20"/>
+          <p:cNvSpPr/>
+          <p:nvPr/>
+        </p:nvSpPr>
+        <p:spPr>
+          <a:xfrm>
+            <a:off x="5703887" y="3146425"/>
+            <a:ext cx="2056765" cy="1367155"/>
+          </a:xfrm>
+          <a:prstGeom prst="rect">
+            <a:avLst/>
+          </a:prstGeom>
+          <a:noFill/>
+          <a:ln w="3175" cap="sq">
+            <a:solidFill>
+              <a:schemeClr val="tx1"/>
+            </a:solidFill>
+            <a:prstDash val="lgDashDotDot"/>
+          </a:ln>
+        </p:spPr>
+        <p:style>
+          <a:lnRef idx="2">
+            <a:schemeClr val="accent1">
+              <a:shade val="50000"/>
+            </a:schemeClr>
+          </a:lnRef>
+          <a:fillRef idx="1">
+            <a:schemeClr val="accent1"/>
+          </a:fillRef>
+          <a:effectRef idx="0">
+            <a:schemeClr val="accent1"/>
+          </a:effectRef>
+          <a:fontRef idx="minor">
+            <a:schemeClr val="lt1"/>
+          </a:fontRef>
+        </p:style>
+        <p:txBody>
+          <a:bodyPr rot="0" spcFirstLastPara="0" vert="horz" wrap="square" lIns="91440" tIns="45720" rIns="91440" bIns="45720" numCol="1" spcCol="0" rtlCol="0" fromWordArt="0" anchor="ctr" anchorCtr="0" forceAA="0" compatLnSpc="1">
+            <a:prstTxWarp prst="textNoShape">
+              <a:avLst/>
+            </a:prstTxWarp>
+            <a:noAutofit/>
+          </a:bodyPr>
+          <a:lstStyle/>
+          <a:p>
+            <a:endParaRPr lang="en-US"/>
+          </a:p>
+        </p:txBody>
+      </p:sp>
+      <p:sp>
+        <p:nvSpPr>
+          <p:cNvPr id="22" name="Oval 21"/>
+          <p:cNvSpPr/>
+          <p:nvPr/>
+        </p:nvSpPr>
+        <p:spPr>
+          <a:xfrm>
+            <a:off x="8789352" y="3941445"/>
+            <a:ext cx="457200" cy="453390"/>
+          </a:xfrm>
+          <a:prstGeom prst="ellipse">
+            <a:avLst/>
+          </a:prstGeom>
+          <a:ln w="19050">
+            <a:solidFill>
+              <a:schemeClr val="tx1"/>
+            </a:solidFill>
+          </a:ln>
+        </p:spPr>
+        <p:style>
+          <a:lnRef idx="2">
+            <a:schemeClr val="accent1"/>
+          </a:lnRef>
+          <a:fillRef idx="1">
+            <a:schemeClr val="lt1"/>
+          </a:fillRef>
+          <a:effectRef idx="0">
+            <a:schemeClr val="accent1"/>
+          </a:effectRef>
+          <a:fontRef idx="minor">
+            <a:schemeClr val="dk1"/>
+          </a:fontRef>
+        </p:style>
+        <p:txBody>
+          <a:bodyPr rot="0" spcFirstLastPara="0" vert="horz" wrap="square" lIns="91440" tIns="45720" rIns="91440" bIns="45720" numCol="1" spcCol="0" rtlCol="0" fromWordArt="0" anchor="ctr" anchorCtr="0" forceAA="0" compatLnSpc="1">
+            <a:prstTxWarp prst="textNoShape">
+              <a:avLst/>
+            </a:prstTxWarp>
+            <a:noAutofit/>
+          </a:bodyPr>
+          <a:lstStyle/>
+          <a:p>
+            <a:pPr marL="0" marR="0" algn="ctr">
+              <a:lnSpc>
+                <a:spcPct val="107000"/>
+              </a:lnSpc>
+              <a:spcBef>
+                <a:spcPts val="0"/>
+              </a:spcBef>
+              <a:spcAft>
+                <a:spcPts val="800"/>
+              </a:spcAft>
+            </a:pPr>
+            <a:r>
+              <a:rPr lang="en-US" sz="900" b="1" i="1" dirty="0">
+                <a:effectLst/>
+                <a:latin typeface="Times New Roman" panose="02020603050405020304" pitchFamily="18" charset="0"/>
+                <a:ea typeface="Calibri" panose="020F0502020204030204" pitchFamily="34" charset="0"/>
+                <a:cs typeface="Times New Roman" panose="02020603050405020304" pitchFamily="18" charset="0"/>
+              </a:rPr>
+              <a:t>A</a:t>
+            </a:r>
+            <a:r>
+              <a:rPr lang="en-US" sz="900" b="1" i="1" baseline="-25000" dirty="0">
+                <a:effectLst/>
+                <a:latin typeface="Times New Roman" panose="02020603050405020304" pitchFamily="18" charset="0"/>
+                <a:ea typeface="Calibri" panose="020F0502020204030204" pitchFamily="34" charset="0"/>
+                <a:cs typeface="Times New Roman" panose="02020603050405020304" pitchFamily="18" charset="0"/>
+              </a:rPr>
+              <a:t>0</a:t>
+            </a:r>
+            <a:endParaRPr lang="en-US" sz="900" b="1" dirty="0">
+              <a:effectLst/>
+              <a:ea typeface="Calibri" panose="020F0502020204030204" pitchFamily="34" charset="0"/>
+              <a:cs typeface="Times New Roman" panose="02020603050405020304" pitchFamily="18" charset="0"/>
+            </a:endParaRPr>
+          </a:p>
+        </p:txBody>
+      </p:sp>
+      <p:sp>
+        <p:nvSpPr>
+          <p:cNvPr id="23" name="Rectangle 22"/>
+          <p:cNvSpPr/>
+          <p:nvPr/>
+        </p:nvSpPr>
+        <p:spPr>
+          <a:xfrm>
+            <a:off x="8672512" y="3834765"/>
+            <a:ext cx="685165" cy="678815"/>
+          </a:xfrm>
+          <a:prstGeom prst="rect">
+            <a:avLst/>
+          </a:prstGeom>
+          <a:noFill/>
+          <a:ln w="3175" cap="sq">
+            <a:solidFill>
+              <a:schemeClr val="tx1"/>
+            </a:solidFill>
+            <a:prstDash val="lgDashDotDot"/>
+          </a:ln>
+        </p:spPr>
+        <p:style>
+          <a:lnRef idx="2">
+            <a:schemeClr val="accent1">
+              <a:shade val="50000"/>
+            </a:schemeClr>
+          </a:lnRef>
+          <a:fillRef idx="1">
+            <a:schemeClr val="accent1"/>
+          </a:fillRef>
+          <a:effectRef idx="0">
+            <a:schemeClr val="accent1"/>
+          </a:effectRef>
+          <a:fontRef idx="minor">
+            <a:schemeClr val="lt1"/>
+          </a:fontRef>
+        </p:style>
+        <p:txBody>
+          <a:bodyPr rot="0" spcFirstLastPara="0" vert="horz" wrap="square" lIns="91440" tIns="45720" rIns="91440" bIns="45720" numCol="1" spcCol="0" rtlCol="0" fromWordArt="0" anchor="ctr" anchorCtr="0" forceAA="0" compatLnSpc="1">
+            <a:prstTxWarp prst="textNoShape">
+              <a:avLst/>
+            </a:prstTxWarp>
+            <a:noAutofit/>
+          </a:bodyPr>
+          <a:lstStyle/>
+          <a:p>
+            <a:endParaRPr lang="en-US"/>
+          </a:p>
+        </p:txBody>
+      </p:sp>
+      <p:sp>
+        <p:nvSpPr>
+          <p:cNvPr id="24" name="Oval 23"/>
+          <p:cNvSpPr/>
+          <p:nvPr/>
+        </p:nvSpPr>
+        <p:spPr>
+          <a:xfrm>
+            <a:off x="7986077" y="3941445"/>
+            <a:ext cx="456565" cy="451485"/>
+          </a:xfrm>
+          <a:prstGeom prst="ellipse">
+            <a:avLst/>
+          </a:prstGeom>
+          <a:ln w="19050">
+            <a:solidFill>
+              <a:schemeClr val="tx1"/>
+            </a:solidFill>
+          </a:ln>
+        </p:spPr>
+        <p:style>
+          <a:lnRef idx="2">
+            <a:schemeClr val="accent1"/>
+          </a:lnRef>
+          <a:fillRef idx="1">
+            <a:schemeClr val="lt1"/>
+          </a:fillRef>
+          <a:effectRef idx="0">
+            <a:schemeClr val="accent1"/>
+          </a:effectRef>
+          <a:fontRef idx="minor">
+            <a:schemeClr val="dk1"/>
+          </a:fontRef>
+        </p:style>
+        <p:txBody>
+          <a:bodyPr rot="0" spcFirstLastPara="0" vert="horz" wrap="square" lIns="91440" tIns="45720" rIns="91440" bIns="45720" numCol="1" spcCol="0" rtlCol="0" fromWordArt="0" anchor="ctr" anchorCtr="0" forceAA="0" compatLnSpc="1">
+            <a:prstTxWarp prst="textNoShape">
+              <a:avLst/>
+            </a:prstTxWarp>
+            <a:noAutofit/>
+          </a:bodyPr>
+          <a:lstStyle/>
+          <a:p>
+            <a:pPr marL="0" marR="0" algn="ctr">
+              <a:lnSpc>
+                <a:spcPct val="107000"/>
+              </a:lnSpc>
+              <a:spcBef>
+                <a:spcPts val="0"/>
+              </a:spcBef>
+              <a:spcAft>
+                <a:spcPts val="800"/>
+              </a:spcAft>
+            </a:pPr>
+            <a:r>
+              <a:rPr lang="en-US" sz="900" b="1" i="1" dirty="0">
+                <a:effectLst/>
+                <a:latin typeface="Times New Roman" panose="02020603050405020304" pitchFamily="18" charset="0"/>
+                <a:ea typeface="Calibri" panose="020F0502020204030204" pitchFamily="34" charset="0"/>
+                <a:cs typeface="Times New Roman" panose="02020603050405020304" pitchFamily="18" charset="0"/>
+              </a:rPr>
+              <a:t>D</a:t>
+            </a:r>
+            <a:r>
+              <a:rPr lang="en-US" sz="900" b="1" i="1" baseline="-25000" dirty="0">
+                <a:effectLst/>
+                <a:latin typeface="Times New Roman" panose="02020603050405020304" pitchFamily="18" charset="0"/>
+                <a:ea typeface="Calibri" panose="020F0502020204030204" pitchFamily="34" charset="0"/>
+                <a:cs typeface="Times New Roman" panose="02020603050405020304" pitchFamily="18" charset="0"/>
+              </a:rPr>
+              <a:t>0</a:t>
+            </a:r>
+            <a:endParaRPr lang="en-US" sz="900" b="1" dirty="0">
+              <a:effectLst/>
+              <a:ea typeface="Calibri" panose="020F0502020204030204" pitchFamily="34" charset="0"/>
+              <a:cs typeface="Times New Roman" panose="02020603050405020304" pitchFamily="18" charset="0"/>
+            </a:endParaRPr>
+          </a:p>
+        </p:txBody>
+      </p:sp>
+      <p:sp>
+        <p:nvSpPr>
+          <p:cNvPr id="25" name="Rectangle 24"/>
+          <p:cNvSpPr/>
+          <p:nvPr/>
+        </p:nvSpPr>
+        <p:spPr>
+          <a:xfrm>
+            <a:off x="7870507" y="3831590"/>
+            <a:ext cx="685165" cy="678815"/>
+          </a:xfrm>
+          <a:prstGeom prst="rect">
+            <a:avLst/>
+          </a:prstGeom>
+          <a:noFill/>
+          <a:ln w="3175" cap="sq">
+            <a:solidFill>
+              <a:schemeClr val="tx1"/>
+            </a:solidFill>
+            <a:prstDash val="lgDashDotDot"/>
+          </a:ln>
+        </p:spPr>
+        <p:style>
+          <a:lnRef idx="2">
+            <a:schemeClr val="accent1">
+              <a:shade val="50000"/>
+            </a:schemeClr>
+          </a:lnRef>
+          <a:fillRef idx="1">
+            <a:schemeClr val="accent1"/>
+          </a:fillRef>
+          <a:effectRef idx="0">
+            <a:schemeClr val="accent1"/>
+          </a:effectRef>
+          <a:fontRef idx="minor">
+            <a:schemeClr val="lt1"/>
+          </a:fontRef>
+        </p:style>
+        <p:txBody>
+          <a:bodyPr rot="0" spcFirstLastPara="0" vert="horz" wrap="square" lIns="91440" tIns="45720" rIns="91440" bIns="45720" numCol="1" spcCol="0" rtlCol="0" fromWordArt="0" anchor="ctr" anchorCtr="0" forceAA="0" compatLnSpc="1">
+            <a:prstTxWarp prst="textNoShape">
+              <a:avLst/>
+            </a:prstTxWarp>
+            <a:noAutofit/>
+          </a:bodyPr>
+          <a:lstStyle/>
+          <a:p>
+            <a:endParaRPr lang="en-US"/>
+          </a:p>
+        </p:txBody>
+      </p:sp>
+      <p:sp>
+        <p:nvSpPr>
+          <p:cNvPr id="26" name="Oval 25"/>
+          <p:cNvSpPr/>
+          <p:nvPr/>
+        </p:nvSpPr>
+        <p:spPr>
+          <a:xfrm>
+            <a:off x="5018087" y="3942715"/>
+            <a:ext cx="452755" cy="461645"/>
+          </a:xfrm>
+          <a:prstGeom prst="ellipse">
+            <a:avLst/>
+          </a:prstGeom>
+          <a:ln w="19050">
+            <a:solidFill>
+              <a:schemeClr val="tx1"/>
+            </a:solidFill>
+          </a:ln>
+        </p:spPr>
+        <p:style>
+          <a:lnRef idx="2">
+            <a:schemeClr val="accent1"/>
+          </a:lnRef>
+          <a:fillRef idx="1">
+            <a:schemeClr val="lt1"/>
+          </a:fillRef>
+          <a:effectRef idx="0">
+            <a:schemeClr val="accent1"/>
+          </a:effectRef>
+          <a:fontRef idx="minor">
+            <a:schemeClr val="dk1"/>
+          </a:fontRef>
+        </p:style>
+        <p:txBody>
+          <a:bodyPr rot="0" spcFirstLastPara="0" vert="horz" wrap="square" lIns="91440" tIns="45720" rIns="91440" bIns="45720" numCol="1" spcCol="0" rtlCol="0" fromWordArt="0" anchor="ctr" anchorCtr="0" forceAA="0" compatLnSpc="1">
+            <a:prstTxWarp prst="textNoShape">
+              <a:avLst/>
+            </a:prstTxWarp>
+            <a:noAutofit/>
+          </a:bodyPr>
+          <a:lstStyle/>
+          <a:p>
+            <a:pPr marL="0" marR="0" algn="ctr">
+              <a:lnSpc>
+                <a:spcPct val="107000"/>
+              </a:lnSpc>
+              <a:spcBef>
+                <a:spcPts val="0"/>
+              </a:spcBef>
+              <a:spcAft>
+                <a:spcPts val="800"/>
+              </a:spcAft>
+            </a:pPr>
+            <a:r>
+              <a:rPr lang="en-US" sz="900" b="1" i="1" dirty="0">
+                <a:effectLst/>
+                <a:latin typeface="Times New Roman" panose="02020603050405020304" pitchFamily="18" charset="0"/>
+                <a:ea typeface="Calibri" panose="020F0502020204030204" pitchFamily="34" charset="0"/>
+                <a:cs typeface="Times New Roman" panose="02020603050405020304" pitchFamily="18" charset="0"/>
+              </a:rPr>
+              <a:t>G</a:t>
+            </a:r>
+            <a:r>
+              <a:rPr lang="en-US" sz="900" b="1" i="1" baseline="-25000" dirty="0">
+                <a:effectLst/>
+                <a:latin typeface="Times New Roman" panose="02020603050405020304" pitchFamily="18" charset="0"/>
+                <a:ea typeface="Calibri" panose="020F0502020204030204" pitchFamily="34" charset="0"/>
+                <a:cs typeface="Times New Roman" panose="02020603050405020304" pitchFamily="18" charset="0"/>
+              </a:rPr>
+              <a:t>0</a:t>
+            </a:r>
+            <a:endParaRPr lang="en-US" sz="900" b="1" dirty="0">
+              <a:effectLst/>
+              <a:ea typeface="Calibri" panose="020F0502020204030204" pitchFamily="34" charset="0"/>
+              <a:cs typeface="Times New Roman" panose="02020603050405020304" pitchFamily="18" charset="0"/>
+            </a:endParaRPr>
+          </a:p>
+        </p:txBody>
+      </p:sp>
+      <p:sp>
+        <p:nvSpPr>
+          <p:cNvPr id="27" name="Oval 26"/>
+          <p:cNvSpPr/>
+          <p:nvPr/>
+        </p:nvSpPr>
+        <p:spPr>
+          <a:xfrm>
+            <a:off x="3989387" y="2464118"/>
+            <a:ext cx="452755" cy="454025"/>
+          </a:xfrm>
+          <a:prstGeom prst="ellipse">
+            <a:avLst/>
+          </a:prstGeom>
+          <a:ln w="19050">
+            <a:solidFill>
+              <a:schemeClr val="tx1"/>
+            </a:solidFill>
+          </a:ln>
+        </p:spPr>
+        <p:style>
+          <a:lnRef idx="2">
+            <a:schemeClr val="accent1"/>
+          </a:lnRef>
+          <a:fillRef idx="1">
+            <a:schemeClr val="lt1"/>
+          </a:fillRef>
+          <a:effectRef idx="0">
+            <a:schemeClr val="accent1"/>
+          </a:effectRef>
+          <a:fontRef idx="minor">
+            <a:schemeClr val="dk1"/>
+          </a:fontRef>
+        </p:style>
+        <p:txBody>
+          <a:bodyPr rot="0" spcFirstLastPara="0" vert="horz" wrap="square" lIns="91440" tIns="45720" rIns="91440" bIns="45720" numCol="1" spcCol="0" rtlCol="0" fromWordArt="0" anchor="ctr" anchorCtr="0" forceAA="0" compatLnSpc="1">
+            <a:prstTxWarp prst="textNoShape">
+              <a:avLst/>
+            </a:prstTxWarp>
+            <a:noAutofit/>
+          </a:bodyPr>
+          <a:lstStyle/>
+          <a:p>
+            <a:pPr marL="0" marR="0" algn="ctr">
+              <a:lnSpc>
+                <a:spcPct val="107000"/>
+              </a:lnSpc>
+              <a:spcBef>
+                <a:spcPts val="0"/>
+              </a:spcBef>
+              <a:spcAft>
+                <a:spcPts val="800"/>
+              </a:spcAft>
+            </a:pPr>
+            <a:r>
+              <a:rPr lang="en-US" sz="900" b="1" i="1" dirty="0" smtClean="0">
+                <a:effectLst/>
+                <a:latin typeface="Times New Roman" panose="02020603050405020304" pitchFamily="18" charset="0"/>
+                <a:ea typeface="Calibri" panose="020F0502020204030204" pitchFamily="34" charset="0"/>
+                <a:cs typeface="Times New Roman" panose="02020603050405020304" pitchFamily="18" charset="0"/>
+              </a:rPr>
+              <a:t>C</a:t>
+            </a:r>
+            <a:r>
+              <a:rPr lang="en-US" sz="900" b="1" i="1" baseline="-25000" dirty="0" smtClean="0">
+                <a:effectLst/>
+                <a:latin typeface="Times New Roman" panose="02020603050405020304" pitchFamily="18" charset="0"/>
+                <a:ea typeface="Calibri" panose="020F0502020204030204" pitchFamily="34" charset="0"/>
+                <a:cs typeface="Times New Roman" panose="02020603050405020304" pitchFamily="18" charset="0"/>
+              </a:rPr>
+              <a:t>2</a:t>
+            </a:r>
+            <a:endParaRPr lang="en-US" sz="900" b="1" dirty="0">
+              <a:effectLst/>
+              <a:ea typeface="Calibri" panose="020F0502020204030204" pitchFamily="34" charset="0"/>
+              <a:cs typeface="Times New Roman" panose="02020603050405020304" pitchFamily="18" charset="0"/>
+            </a:endParaRPr>
+          </a:p>
+        </p:txBody>
+      </p:sp>
+    </p:spTree>
+    <p:extLst>
+      <p:ext uri="{BB962C8B-B14F-4D97-AF65-F5344CB8AC3E}">
+        <p14:creationId xmlns:p14="http://schemas.microsoft.com/office/powerpoint/2010/main" val="3603151408"/>
       </p:ext>
     </p:extLst>
   </p:cSld>

</xml_diff>

<commit_message>
background on two signing approaches
</commit_message>
<xml_diff>
--- a/images/pics.pptx
+++ b/images/pics.pptx
@@ -4,6 +4,9 @@
   <p:sldMasterIdLst>
     <p:sldMasterId id="2147483648" r:id="rId1"/>
   </p:sldMasterIdLst>
+  <p:notesMasterIdLst>
+    <p:notesMasterId r:id="rId11"/>
+  </p:notesMasterIdLst>
   <p:sldIdLst>
     <p:sldId id="256" r:id="rId2"/>
     <p:sldId id="257" r:id="rId3"/>
@@ -11,6 +14,9 @@
     <p:sldId id="259" r:id="rId5"/>
     <p:sldId id="260" r:id="rId6"/>
     <p:sldId id="261" r:id="rId7"/>
+    <p:sldId id="262" r:id="rId8"/>
+    <p:sldId id="263" r:id="rId9"/>
+    <p:sldId id="264" r:id="rId10"/>
   </p:sldIdLst>
   <p:sldSz cx="12192000" cy="6858000"/>
   <p:notesSz cx="6858000" cy="9144000"/>
@@ -128,6 +134,440 @@
 </p:presentation>
 </file>
 
+<file path=ppt/notesMasters/notesMaster1.xml><?xml version="1.0" encoding="utf-8"?>
+<p:notesMaster xmlns:a="http://schemas.openxmlformats.org/drawingml/2006/main" xmlns:r="http://schemas.openxmlformats.org/officeDocument/2006/relationships" xmlns:p="http://schemas.openxmlformats.org/presentationml/2006/main">
+  <p:cSld>
+    <p:bg>
+      <p:bgRef idx="1001">
+        <a:schemeClr val="bg1"/>
+      </p:bgRef>
+    </p:bg>
+    <p:spTree>
+      <p:nvGrpSpPr>
+        <p:cNvPr id="1" name=""/>
+        <p:cNvGrpSpPr/>
+        <p:nvPr/>
+      </p:nvGrpSpPr>
+      <p:grpSpPr>
+        <a:xfrm>
+          <a:off x="0" y="0"/>
+          <a:ext cx="0" cy="0"/>
+          <a:chOff x="0" y="0"/>
+          <a:chExt cx="0" cy="0"/>
+        </a:xfrm>
+      </p:grpSpPr>
+      <p:sp>
+        <p:nvSpPr>
+          <p:cNvPr id="2" name="Header Placeholder 1"/>
+          <p:cNvSpPr>
+            <a:spLocks noGrp="1"/>
+          </p:cNvSpPr>
+          <p:nvPr>
+            <p:ph type="hdr" sz="quarter"/>
+          </p:nvPr>
+        </p:nvSpPr>
+        <p:spPr>
+          <a:xfrm>
+            <a:off x="0" y="0"/>
+            <a:ext cx="2971800" cy="458788"/>
+          </a:xfrm>
+          <a:prstGeom prst="rect">
+            <a:avLst/>
+          </a:prstGeom>
+        </p:spPr>
+        <p:txBody>
+          <a:bodyPr vert="horz" lIns="91440" tIns="45720" rIns="91440" bIns="45720" rtlCol="0"/>
+          <a:lstStyle>
+            <a:lvl1pPr algn="l">
+              <a:defRPr sz="1200"/>
+            </a:lvl1pPr>
+          </a:lstStyle>
+          <a:p>
+            <a:endParaRPr lang="en-US"/>
+          </a:p>
+        </p:txBody>
+      </p:sp>
+      <p:sp>
+        <p:nvSpPr>
+          <p:cNvPr id="3" name="Date Placeholder 2"/>
+          <p:cNvSpPr>
+            <a:spLocks noGrp="1"/>
+          </p:cNvSpPr>
+          <p:nvPr>
+            <p:ph type="dt" idx="1"/>
+          </p:nvPr>
+        </p:nvSpPr>
+        <p:spPr>
+          <a:xfrm>
+            <a:off x="3884613" y="0"/>
+            <a:ext cx="2971800" cy="458788"/>
+          </a:xfrm>
+          <a:prstGeom prst="rect">
+            <a:avLst/>
+          </a:prstGeom>
+        </p:spPr>
+        <p:txBody>
+          <a:bodyPr vert="horz" lIns="91440" tIns="45720" rIns="91440" bIns="45720" rtlCol="0"/>
+          <a:lstStyle>
+            <a:lvl1pPr algn="r">
+              <a:defRPr sz="1200"/>
+            </a:lvl1pPr>
+          </a:lstStyle>
+          <a:p>
+            <a:fld id="{4FF7AF54-2AD9-468C-807B-634631568B63}" type="datetimeFigureOut">
+              <a:rPr lang="en-US" smtClean="0"/>
+              <a:t>1/13/2015</a:t>
+            </a:fld>
+            <a:endParaRPr lang="en-US"/>
+          </a:p>
+        </p:txBody>
+      </p:sp>
+      <p:sp>
+        <p:nvSpPr>
+          <p:cNvPr id="4" name="Slide Image Placeholder 3"/>
+          <p:cNvSpPr>
+            <a:spLocks noGrp="1" noRot="1" noChangeAspect="1"/>
+          </p:cNvSpPr>
+          <p:nvPr>
+            <p:ph type="sldImg" idx="2"/>
+          </p:nvPr>
+        </p:nvSpPr>
+        <p:spPr>
+          <a:xfrm>
+            <a:off x="685800" y="1143000"/>
+            <a:ext cx="5486400" cy="3086100"/>
+          </a:xfrm>
+          <a:prstGeom prst="rect">
+            <a:avLst/>
+          </a:prstGeom>
+          <a:noFill/>
+          <a:ln w="12700">
+            <a:solidFill>
+              <a:prstClr val="black"/>
+            </a:solidFill>
+          </a:ln>
+        </p:spPr>
+        <p:txBody>
+          <a:bodyPr vert="horz" lIns="91440" tIns="45720" rIns="91440" bIns="45720" rtlCol="0" anchor="ctr"/>
+          <a:lstStyle/>
+          <a:p>
+            <a:endParaRPr lang="en-US"/>
+          </a:p>
+        </p:txBody>
+      </p:sp>
+      <p:sp>
+        <p:nvSpPr>
+          <p:cNvPr id="5" name="Notes Placeholder 4"/>
+          <p:cNvSpPr>
+            <a:spLocks noGrp="1"/>
+          </p:cNvSpPr>
+          <p:nvPr>
+            <p:ph type="body" sz="quarter" idx="3"/>
+          </p:nvPr>
+        </p:nvSpPr>
+        <p:spPr>
+          <a:xfrm>
+            <a:off x="685800" y="4400550"/>
+            <a:ext cx="5486400" cy="3600450"/>
+          </a:xfrm>
+          <a:prstGeom prst="rect">
+            <a:avLst/>
+          </a:prstGeom>
+        </p:spPr>
+        <p:txBody>
+          <a:bodyPr vert="horz" lIns="91440" tIns="45720" rIns="91440" bIns="45720" rtlCol="0"/>
+          <a:lstStyle/>
+          <a:p>
+            <a:pPr lvl="0"/>
+            <a:r>
+              <a:rPr lang="en-US" smtClean="0"/>
+              <a:t>Click to edit Master text styles</a:t>
+            </a:r>
+          </a:p>
+          <a:p>
+            <a:pPr lvl="1"/>
+            <a:r>
+              <a:rPr lang="en-US" smtClean="0"/>
+              <a:t>Second level</a:t>
+            </a:r>
+          </a:p>
+          <a:p>
+            <a:pPr lvl="2"/>
+            <a:r>
+              <a:rPr lang="en-US" smtClean="0"/>
+              <a:t>Third level</a:t>
+            </a:r>
+          </a:p>
+          <a:p>
+            <a:pPr lvl="3"/>
+            <a:r>
+              <a:rPr lang="en-US" smtClean="0"/>
+              <a:t>Fourth level</a:t>
+            </a:r>
+          </a:p>
+          <a:p>
+            <a:pPr lvl="4"/>
+            <a:r>
+              <a:rPr lang="en-US" smtClean="0"/>
+              <a:t>Fifth level</a:t>
+            </a:r>
+            <a:endParaRPr lang="en-US"/>
+          </a:p>
+        </p:txBody>
+      </p:sp>
+      <p:sp>
+        <p:nvSpPr>
+          <p:cNvPr id="6" name="Footer Placeholder 5"/>
+          <p:cNvSpPr>
+            <a:spLocks noGrp="1"/>
+          </p:cNvSpPr>
+          <p:nvPr>
+            <p:ph type="ftr" sz="quarter" idx="4"/>
+          </p:nvPr>
+        </p:nvSpPr>
+        <p:spPr>
+          <a:xfrm>
+            <a:off x="0" y="8685213"/>
+            <a:ext cx="2971800" cy="458787"/>
+          </a:xfrm>
+          <a:prstGeom prst="rect">
+            <a:avLst/>
+          </a:prstGeom>
+        </p:spPr>
+        <p:txBody>
+          <a:bodyPr vert="horz" lIns="91440" tIns="45720" rIns="91440" bIns="45720" rtlCol="0" anchor="b"/>
+          <a:lstStyle>
+            <a:lvl1pPr algn="l">
+              <a:defRPr sz="1200"/>
+            </a:lvl1pPr>
+          </a:lstStyle>
+          <a:p>
+            <a:endParaRPr lang="en-US"/>
+          </a:p>
+        </p:txBody>
+      </p:sp>
+      <p:sp>
+        <p:nvSpPr>
+          <p:cNvPr id="7" name="Slide Number Placeholder 6"/>
+          <p:cNvSpPr>
+            <a:spLocks noGrp="1"/>
+          </p:cNvSpPr>
+          <p:nvPr>
+            <p:ph type="sldNum" sz="quarter" idx="5"/>
+          </p:nvPr>
+        </p:nvSpPr>
+        <p:spPr>
+          <a:xfrm>
+            <a:off x="3884613" y="8685213"/>
+            <a:ext cx="2971800" cy="458787"/>
+          </a:xfrm>
+          <a:prstGeom prst="rect">
+            <a:avLst/>
+          </a:prstGeom>
+        </p:spPr>
+        <p:txBody>
+          <a:bodyPr vert="horz" lIns="91440" tIns="45720" rIns="91440" bIns="45720" rtlCol="0" anchor="b"/>
+          <a:lstStyle>
+            <a:lvl1pPr algn="r">
+              <a:defRPr sz="1200"/>
+            </a:lvl1pPr>
+          </a:lstStyle>
+          <a:p>
+            <a:fld id="{9681177D-50F7-4D66-BAB4-5279F6C0C84A}" type="slidenum">
+              <a:rPr lang="en-US" smtClean="0"/>
+              <a:t>‹#›</a:t>
+            </a:fld>
+            <a:endParaRPr lang="en-US"/>
+          </a:p>
+        </p:txBody>
+      </p:sp>
+    </p:spTree>
+    <p:extLst>
+      <p:ext uri="{BB962C8B-B14F-4D97-AF65-F5344CB8AC3E}">
+        <p14:creationId xmlns:p14="http://schemas.microsoft.com/office/powerpoint/2010/main" val="2003691921"/>
+      </p:ext>
+    </p:extLst>
+  </p:cSld>
+  <p:clrMap bg1="lt1" tx1="dk1" bg2="lt2" tx2="dk2" accent1="accent1" accent2="accent2" accent3="accent3" accent4="accent4" accent5="accent5" accent6="accent6" hlink="hlink" folHlink="folHlink"/>
+  <p:notesStyle>
+    <a:lvl1pPr marL="0" algn="l" defTabSz="914400" rtl="0" eaLnBrk="1" latinLnBrk="0" hangingPunct="1">
+      <a:defRPr sz="1200" kern="1200">
+        <a:solidFill>
+          <a:schemeClr val="tx1"/>
+        </a:solidFill>
+        <a:latin typeface="+mn-lt"/>
+        <a:ea typeface="+mn-ea"/>
+        <a:cs typeface="+mn-cs"/>
+      </a:defRPr>
+    </a:lvl1pPr>
+    <a:lvl2pPr marL="457200" algn="l" defTabSz="914400" rtl="0" eaLnBrk="1" latinLnBrk="0" hangingPunct="1">
+      <a:defRPr sz="1200" kern="1200">
+        <a:solidFill>
+          <a:schemeClr val="tx1"/>
+        </a:solidFill>
+        <a:latin typeface="+mn-lt"/>
+        <a:ea typeface="+mn-ea"/>
+        <a:cs typeface="+mn-cs"/>
+      </a:defRPr>
+    </a:lvl2pPr>
+    <a:lvl3pPr marL="914400" algn="l" defTabSz="914400" rtl="0" eaLnBrk="1" latinLnBrk="0" hangingPunct="1">
+      <a:defRPr sz="1200" kern="1200">
+        <a:solidFill>
+          <a:schemeClr val="tx1"/>
+        </a:solidFill>
+        <a:latin typeface="+mn-lt"/>
+        <a:ea typeface="+mn-ea"/>
+        <a:cs typeface="+mn-cs"/>
+      </a:defRPr>
+    </a:lvl3pPr>
+    <a:lvl4pPr marL="1371600" algn="l" defTabSz="914400" rtl="0" eaLnBrk="1" latinLnBrk="0" hangingPunct="1">
+      <a:defRPr sz="1200" kern="1200">
+        <a:solidFill>
+          <a:schemeClr val="tx1"/>
+        </a:solidFill>
+        <a:latin typeface="+mn-lt"/>
+        <a:ea typeface="+mn-ea"/>
+        <a:cs typeface="+mn-cs"/>
+      </a:defRPr>
+    </a:lvl4pPr>
+    <a:lvl5pPr marL="1828800" algn="l" defTabSz="914400" rtl="0" eaLnBrk="1" latinLnBrk="0" hangingPunct="1">
+      <a:defRPr sz="1200" kern="1200">
+        <a:solidFill>
+          <a:schemeClr val="tx1"/>
+        </a:solidFill>
+        <a:latin typeface="+mn-lt"/>
+        <a:ea typeface="+mn-ea"/>
+        <a:cs typeface="+mn-cs"/>
+      </a:defRPr>
+    </a:lvl5pPr>
+    <a:lvl6pPr marL="2286000" algn="l" defTabSz="914400" rtl="0" eaLnBrk="1" latinLnBrk="0" hangingPunct="1">
+      <a:defRPr sz="1200" kern="1200">
+        <a:solidFill>
+          <a:schemeClr val="tx1"/>
+        </a:solidFill>
+        <a:latin typeface="+mn-lt"/>
+        <a:ea typeface="+mn-ea"/>
+        <a:cs typeface="+mn-cs"/>
+      </a:defRPr>
+    </a:lvl6pPr>
+    <a:lvl7pPr marL="2743200" algn="l" defTabSz="914400" rtl="0" eaLnBrk="1" latinLnBrk="0" hangingPunct="1">
+      <a:defRPr sz="1200" kern="1200">
+        <a:solidFill>
+          <a:schemeClr val="tx1"/>
+        </a:solidFill>
+        <a:latin typeface="+mn-lt"/>
+        <a:ea typeface="+mn-ea"/>
+        <a:cs typeface="+mn-cs"/>
+      </a:defRPr>
+    </a:lvl7pPr>
+    <a:lvl8pPr marL="3200400" algn="l" defTabSz="914400" rtl="0" eaLnBrk="1" latinLnBrk="0" hangingPunct="1">
+      <a:defRPr sz="1200" kern="1200">
+        <a:solidFill>
+          <a:schemeClr val="tx1"/>
+        </a:solidFill>
+        <a:latin typeface="+mn-lt"/>
+        <a:ea typeface="+mn-ea"/>
+        <a:cs typeface="+mn-cs"/>
+      </a:defRPr>
+    </a:lvl8pPr>
+    <a:lvl9pPr marL="3657600" algn="l" defTabSz="914400" rtl="0" eaLnBrk="1" latinLnBrk="0" hangingPunct="1">
+      <a:defRPr sz="1200" kern="1200">
+        <a:solidFill>
+          <a:schemeClr val="tx1"/>
+        </a:solidFill>
+        <a:latin typeface="+mn-lt"/>
+        <a:ea typeface="+mn-ea"/>
+        <a:cs typeface="+mn-cs"/>
+      </a:defRPr>
+    </a:lvl9pPr>
+  </p:notesStyle>
+</p:notesMaster>
+</file>
+
+<file path=ppt/notesSlides/notesSlide1.xml><?xml version="1.0" encoding="utf-8"?>
+<p:notes xmlns:a="http://schemas.openxmlformats.org/drawingml/2006/main" xmlns:r="http://schemas.openxmlformats.org/officeDocument/2006/relationships" xmlns:p="http://schemas.openxmlformats.org/presentationml/2006/main">
+  <p:cSld>
+    <p:spTree>
+      <p:nvGrpSpPr>
+        <p:cNvPr id="1" name=""/>
+        <p:cNvGrpSpPr/>
+        <p:nvPr/>
+      </p:nvGrpSpPr>
+      <p:grpSpPr>
+        <a:xfrm>
+          <a:off x="0" y="0"/>
+          <a:ext cx="0" cy="0"/>
+          <a:chOff x="0" y="0"/>
+          <a:chExt cx="0" cy="0"/>
+        </a:xfrm>
+      </p:grpSpPr>
+      <p:sp>
+        <p:nvSpPr>
+          <p:cNvPr id="2" name="Slide Image Placeholder 1"/>
+          <p:cNvSpPr>
+            <a:spLocks noGrp="1" noRot="1" noChangeAspect="1"/>
+          </p:cNvSpPr>
+          <p:nvPr>
+            <p:ph type="sldImg"/>
+          </p:nvPr>
+        </p:nvSpPr>
+        <p:spPr/>
+      </p:sp>
+      <p:sp>
+        <p:nvSpPr>
+          <p:cNvPr id="3" name="Notes Placeholder 2"/>
+          <p:cNvSpPr>
+            <a:spLocks noGrp="1"/>
+          </p:cNvSpPr>
+          <p:nvPr>
+            <p:ph type="body" idx="1"/>
+          </p:nvPr>
+        </p:nvSpPr>
+        <p:spPr/>
+        <p:txBody>
+          <a:bodyPr/>
+          <a:lstStyle/>
+          <a:p>
+            <a:endParaRPr lang="en-US" dirty="0"/>
+          </a:p>
+        </p:txBody>
+      </p:sp>
+      <p:sp>
+        <p:nvSpPr>
+          <p:cNvPr id="4" name="Slide Number Placeholder 3"/>
+          <p:cNvSpPr>
+            <a:spLocks noGrp="1"/>
+          </p:cNvSpPr>
+          <p:nvPr>
+            <p:ph type="sldNum" sz="quarter" idx="10"/>
+          </p:nvPr>
+        </p:nvSpPr>
+        <p:spPr/>
+        <p:txBody>
+          <a:bodyPr/>
+          <a:lstStyle/>
+          <a:p>
+            <a:fld id="{9681177D-50F7-4D66-BAB4-5279F6C0C84A}" type="slidenum">
+              <a:rPr lang="en-US" smtClean="0"/>
+              <a:t>8</a:t>
+            </a:fld>
+            <a:endParaRPr lang="en-US"/>
+          </a:p>
+        </p:txBody>
+      </p:sp>
+    </p:spTree>
+    <p:extLst>
+      <p:ext uri="{BB962C8B-B14F-4D97-AF65-F5344CB8AC3E}">
+        <p14:creationId xmlns:p14="http://schemas.microsoft.com/office/powerpoint/2010/main" val="1690857853"/>
+      </p:ext>
+    </p:extLst>
+  </p:cSld>
+  <p:clrMapOvr>
+    <a:masterClrMapping/>
+  </p:clrMapOvr>
+</p:notes>
+</file>
+
 <file path=ppt/slideLayouts/slideLayout1.xml><?xml version="1.0" encoding="utf-8"?>
 <p:sldLayout xmlns:a="http://schemas.openxmlformats.org/drawingml/2006/main" xmlns:r="http://schemas.openxmlformats.org/officeDocument/2006/relationships" xmlns:p="http://schemas.openxmlformats.org/presentationml/2006/main" type="title" preserve="1">
   <p:cSld name="Title Slide">
@@ -259,7 +699,7 @@
           <a:p>
             <a:fld id="{844C98E4-C9EE-4E87-AFEC-1BE23205BC3C}" type="datetimeFigureOut">
               <a:rPr lang="en-US" smtClean="0"/>
-              <a:t>1/12/2015</a:t>
+              <a:t>1/13/2015</a:t>
             </a:fld>
             <a:endParaRPr lang="en-US"/>
           </a:p>
@@ -429,7 +869,7 @@
           <a:p>
             <a:fld id="{844C98E4-C9EE-4E87-AFEC-1BE23205BC3C}" type="datetimeFigureOut">
               <a:rPr lang="en-US" smtClean="0"/>
-              <a:t>1/12/2015</a:t>
+              <a:t>1/13/2015</a:t>
             </a:fld>
             <a:endParaRPr lang="en-US"/>
           </a:p>
@@ -609,7 +1049,7 @@
           <a:p>
             <a:fld id="{844C98E4-C9EE-4E87-AFEC-1BE23205BC3C}" type="datetimeFigureOut">
               <a:rPr lang="en-US" smtClean="0"/>
-              <a:t>1/12/2015</a:t>
+              <a:t>1/13/2015</a:t>
             </a:fld>
             <a:endParaRPr lang="en-US"/>
           </a:p>
@@ -779,7 +1219,7 @@
           <a:p>
             <a:fld id="{844C98E4-C9EE-4E87-AFEC-1BE23205BC3C}" type="datetimeFigureOut">
               <a:rPr lang="en-US" smtClean="0"/>
-              <a:t>1/12/2015</a:t>
+              <a:t>1/13/2015</a:t>
             </a:fld>
             <a:endParaRPr lang="en-US"/>
           </a:p>
@@ -1025,7 +1465,7 @@
           <a:p>
             <a:fld id="{844C98E4-C9EE-4E87-AFEC-1BE23205BC3C}" type="datetimeFigureOut">
               <a:rPr lang="en-US" smtClean="0"/>
-              <a:t>1/12/2015</a:t>
+              <a:t>1/13/2015</a:t>
             </a:fld>
             <a:endParaRPr lang="en-US"/>
           </a:p>
@@ -1257,7 +1697,7 @@
           <a:p>
             <a:fld id="{844C98E4-C9EE-4E87-AFEC-1BE23205BC3C}" type="datetimeFigureOut">
               <a:rPr lang="en-US" smtClean="0"/>
-              <a:t>1/12/2015</a:t>
+              <a:t>1/13/2015</a:t>
             </a:fld>
             <a:endParaRPr lang="en-US"/>
           </a:p>
@@ -1624,7 +2064,7 @@
           <a:p>
             <a:fld id="{844C98E4-C9EE-4E87-AFEC-1BE23205BC3C}" type="datetimeFigureOut">
               <a:rPr lang="en-US" smtClean="0"/>
-              <a:t>1/12/2015</a:t>
+              <a:t>1/13/2015</a:t>
             </a:fld>
             <a:endParaRPr lang="en-US"/>
           </a:p>
@@ -1742,7 +2182,7 @@
           <a:p>
             <a:fld id="{844C98E4-C9EE-4E87-AFEC-1BE23205BC3C}" type="datetimeFigureOut">
               <a:rPr lang="en-US" smtClean="0"/>
-              <a:t>1/12/2015</a:t>
+              <a:t>1/13/2015</a:t>
             </a:fld>
             <a:endParaRPr lang="en-US"/>
           </a:p>
@@ -1837,7 +2277,7 @@
           <a:p>
             <a:fld id="{844C98E4-C9EE-4E87-AFEC-1BE23205BC3C}" type="datetimeFigureOut">
               <a:rPr lang="en-US" smtClean="0"/>
-              <a:t>1/12/2015</a:t>
+              <a:t>1/13/2015</a:t>
             </a:fld>
             <a:endParaRPr lang="en-US"/>
           </a:p>
@@ -2114,7 +2554,7 @@
           <a:p>
             <a:fld id="{844C98E4-C9EE-4E87-AFEC-1BE23205BC3C}" type="datetimeFigureOut">
               <a:rPr lang="en-US" smtClean="0"/>
-              <a:t>1/12/2015</a:t>
+              <a:t>1/13/2015</a:t>
             </a:fld>
             <a:endParaRPr lang="en-US"/>
           </a:p>
@@ -2367,7 +2807,7 @@
           <a:p>
             <a:fld id="{844C98E4-C9EE-4E87-AFEC-1BE23205BC3C}" type="datetimeFigureOut">
               <a:rPr lang="en-US" smtClean="0"/>
-              <a:t>1/12/2015</a:t>
+              <a:t>1/13/2015</a:t>
             </a:fld>
             <a:endParaRPr lang="en-US"/>
           </a:p>
@@ -2580,7 +3020,7 @@
           <a:p>
             <a:fld id="{844C98E4-C9EE-4E87-AFEC-1BE23205BC3C}" type="datetimeFigureOut">
               <a:rPr lang="en-US" smtClean="0"/>
-              <a:t>1/12/2015</a:t>
+              <a:t>1/13/2015</a:t>
             </a:fld>
             <a:endParaRPr lang="en-US"/>
           </a:p>
@@ -7468,6 +7908,2508 @@
 </p:sld>
 </file>
 
+<file path=ppt/slides/slide7.xml><?xml version="1.0" encoding="utf-8"?>
+<p:sld xmlns:a="http://schemas.openxmlformats.org/drawingml/2006/main" xmlns:r="http://schemas.openxmlformats.org/officeDocument/2006/relationships" xmlns:p="http://schemas.openxmlformats.org/presentationml/2006/main">
+  <p:cSld>
+    <p:spTree>
+      <p:nvGrpSpPr>
+        <p:cNvPr id="1" name=""/>
+        <p:cNvGrpSpPr/>
+        <p:nvPr/>
+      </p:nvGrpSpPr>
+      <p:grpSpPr>
+        <a:xfrm>
+          <a:off x="0" y="0"/>
+          <a:ext cx="0" cy="0"/>
+          <a:chOff x="0" y="0"/>
+          <a:chExt cx="0" cy="0"/>
+        </a:xfrm>
+      </p:grpSpPr>
+      <p:sp>
+        <p:nvSpPr>
+          <p:cNvPr id="2" name="Oval 1"/>
+          <p:cNvSpPr/>
+          <p:nvPr/>
+        </p:nvSpPr>
+        <p:spPr>
+          <a:xfrm>
+            <a:off x="5867400" y="2000250"/>
+            <a:ext cx="457200" cy="457200"/>
+          </a:xfrm>
+          <a:prstGeom prst="ellipse">
+            <a:avLst/>
+          </a:prstGeom>
+          <a:noFill/>
+          <a:ln w="19050">
+            <a:solidFill>
+              <a:schemeClr val="tx1"/>
+            </a:solidFill>
+          </a:ln>
+        </p:spPr>
+        <p:style>
+          <a:lnRef idx="2">
+            <a:schemeClr val="accent1">
+              <a:shade val="50000"/>
+            </a:schemeClr>
+          </a:lnRef>
+          <a:fillRef idx="1">
+            <a:schemeClr val="accent1"/>
+          </a:fillRef>
+          <a:effectRef idx="0">
+            <a:schemeClr val="accent1"/>
+          </a:effectRef>
+          <a:fontRef idx="minor">
+            <a:schemeClr val="lt1"/>
+          </a:fontRef>
+        </p:style>
+        <p:txBody>
+          <a:bodyPr rot="0" spcFirstLastPara="0" vert="horz" wrap="square" lIns="91440" tIns="45720" rIns="91440" bIns="45720" numCol="1" spcCol="0" rtlCol="0" fromWordArt="0" anchor="ctr" anchorCtr="0" forceAA="0" compatLnSpc="1">
+            <a:prstTxWarp prst="textNoShape">
+              <a:avLst/>
+            </a:prstTxWarp>
+            <a:noAutofit/>
+          </a:bodyPr>
+          <a:lstStyle/>
+          <a:p>
+            <a:r>
+              <a:rPr lang="en-US" dirty="0" smtClean="0">
+                <a:solidFill>
+                  <a:schemeClr val="tx1"/>
+                </a:solidFill>
+                <a:latin typeface="Times New Roman" panose="02020603050405020304" pitchFamily="18" charset="0"/>
+                <a:cs typeface="Times New Roman" panose="02020603050405020304" pitchFamily="18" charset="0"/>
+              </a:rPr>
+              <a:t>A</a:t>
+            </a:r>
+            <a:endParaRPr lang="en-US" dirty="0">
+              <a:solidFill>
+                <a:schemeClr val="tx1"/>
+              </a:solidFill>
+              <a:latin typeface="Times New Roman" panose="02020603050405020304" pitchFamily="18" charset="0"/>
+              <a:cs typeface="Times New Roman" panose="02020603050405020304" pitchFamily="18" charset="0"/>
+            </a:endParaRPr>
+          </a:p>
+        </p:txBody>
+      </p:sp>
+      <p:sp>
+        <p:nvSpPr>
+          <p:cNvPr id="3" name="Oval 2"/>
+          <p:cNvSpPr/>
+          <p:nvPr/>
+        </p:nvSpPr>
+        <p:spPr>
+          <a:xfrm>
+            <a:off x="5867400" y="2800350"/>
+            <a:ext cx="457200" cy="457200"/>
+          </a:xfrm>
+          <a:prstGeom prst="ellipse">
+            <a:avLst/>
+          </a:prstGeom>
+          <a:noFill/>
+          <a:ln w="19050">
+            <a:solidFill>
+              <a:schemeClr val="tx1"/>
+            </a:solidFill>
+          </a:ln>
+        </p:spPr>
+        <p:style>
+          <a:lnRef idx="2">
+            <a:schemeClr val="accent1">
+              <a:shade val="50000"/>
+            </a:schemeClr>
+          </a:lnRef>
+          <a:fillRef idx="1">
+            <a:schemeClr val="accent1"/>
+          </a:fillRef>
+          <a:effectRef idx="0">
+            <a:schemeClr val="accent1"/>
+          </a:effectRef>
+          <a:fontRef idx="minor">
+            <a:schemeClr val="lt1"/>
+          </a:fontRef>
+        </p:style>
+        <p:txBody>
+          <a:bodyPr rot="0" spcFirstLastPara="0" vert="horz" wrap="square" lIns="91440" tIns="45720" rIns="91440" bIns="45720" numCol="1" spcCol="0" rtlCol="0" fromWordArt="0" anchor="ctr" anchorCtr="0" forceAA="0" compatLnSpc="1">
+            <a:prstTxWarp prst="textNoShape">
+              <a:avLst/>
+            </a:prstTxWarp>
+            <a:noAutofit/>
+          </a:bodyPr>
+          <a:lstStyle/>
+          <a:p>
+            <a:r>
+              <a:rPr lang="en-US" dirty="0" smtClean="0">
+                <a:solidFill>
+                  <a:schemeClr val="tx1"/>
+                </a:solidFill>
+                <a:latin typeface="Times New Roman" panose="02020603050405020304" pitchFamily="18" charset="0"/>
+                <a:cs typeface="Times New Roman" panose="02020603050405020304" pitchFamily="18" charset="0"/>
+              </a:rPr>
+              <a:t>B</a:t>
+            </a:r>
+            <a:endParaRPr lang="en-US" dirty="0">
+              <a:solidFill>
+                <a:schemeClr val="tx1"/>
+              </a:solidFill>
+              <a:latin typeface="Times New Roman" panose="02020603050405020304" pitchFamily="18" charset="0"/>
+              <a:cs typeface="Times New Roman" panose="02020603050405020304" pitchFamily="18" charset="0"/>
+            </a:endParaRPr>
+          </a:p>
+        </p:txBody>
+      </p:sp>
+      <p:sp>
+        <p:nvSpPr>
+          <p:cNvPr id="4" name="Oval 3"/>
+          <p:cNvSpPr/>
+          <p:nvPr/>
+        </p:nvSpPr>
+        <p:spPr>
+          <a:xfrm>
+            <a:off x="5857875" y="3600450"/>
+            <a:ext cx="457200" cy="457200"/>
+          </a:xfrm>
+          <a:prstGeom prst="ellipse">
+            <a:avLst/>
+          </a:prstGeom>
+          <a:noFill/>
+          <a:ln w="19050">
+            <a:solidFill>
+              <a:schemeClr val="tx1"/>
+            </a:solidFill>
+          </a:ln>
+        </p:spPr>
+        <p:style>
+          <a:lnRef idx="2">
+            <a:schemeClr val="accent1">
+              <a:shade val="50000"/>
+            </a:schemeClr>
+          </a:lnRef>
+          <a:fillRef idx="1">
+            <a:schemeClr val="accent1"/>
+          </a:fillRef>
+          <a:effectRef idx="0">
+            <a:schemeClr val="accent1"/>
+          </a:effectRef>
+          <a:fontRef idx="minor">
+            <a:schemeClr val="lt1"/>
+          </a:fontRef>
+        </p:style>
+        <p:txBody>
+          <a:bodyPr rot="0" spcFirstLastPara="0" vert="horz" wrap="square" lIns="91440" tIns="45720" rIns="91440" bIns="45720" numCol="1" spcCol="0" rtlCol="0" fromWordArt="0" anchor="ctr" anchorCtr="0" forceAA="0" compatLnSpc="1">
+            <a:prstTxWarp prst="textNoShape">
+              <a:avLst/>
+            </a:prstTxWarp>
+            <a:noAutofit/>
+          </a:bodyPr>
+          <a:lstStyle/>
+          <a:p>
+            <a:r>
+              <a:rPr lang="en-US" dirty="0" smtClean="0">
+                <a:solidFill>
+                  <a:schemeClr val="tx1"/>
+                </a:solidFill>
+                <a:latin typeface="Times New Roman" panose="02020603050405020304" pitchFamily="18" charset="0"/>
+                <a:cs typeface="Times New Roman" panose="02020603050405020304" pitchFamily="18" charset="0"/>
+              </a:rPr>
+              <a:t>C</a:t>
+            </a:r>
+            <a:endParaRPr lang="en-US" dirty="0">
+              <a:solidFill>
+                <a:schemeClr val="tx1"/>
+              </a:solidFill>
+              <a:latin typeface="Times New Roman" panose="02020603050405020304" pitchFamily="18" charset="0"/>
+              <a:cs typeface="Times New Roman" panose="02020603050405020304" pitchFamily="18" charset="0"/>
+            </a:endParaRPr>
+          </a:p>
+        </p:txBody>
+      </p:sp>
+      <p:cxnSp>
+        <p:nvCxnSpPr>
+          <p:cNvPr id="5" name="Straight Connector 4"/>
+          <p:cNvCxnSpPr/>
+          <p:nvPr/>
+        </p:nvCxnSpPr>
+        <p:spPr>
+          <a:xfrm flipV="1">
+            <a:off x="6096000" y="2457450"/>
+            <a:ext cx="0" cy="342900"/>
+          </a:xfrm>
+          <a:prstGeom prst="line">
+            <a:avLst/>
+          </a:prstGeom>
+          <a:ln w="19050">
+            <a:solidFill>
+              <a:schemeClr val="tx1"/>
+            </a:solidFill>
+          </a:ln>
+        </p:spPr>
+        <p:style>
+          <a:lnRef idx="1">
+            <a:schemeClr val="accent1"/>
+          </a:lnRef>
+          <a:fillRef idx="0">
+            <a:schemeClr val="accent1"/>
+          </a:fillRef>
+          <a:effectRef idx="0">
+            <a:schemeClr val="accent1"/>
+          </a:effectRef>
+          <a:fontRef idx="minor">
+            <a:schemeClr val="tx1"/>
+          </a:fontRef>
+        </p:style>
+      </p:cxnSp>
+      <p:cxnSp>
+        <p:nvCxnSpPr>
+          <p:cNvPr id="6" name="Straight Connector 5"/>
+          <p:cNvCxnSpPr/>
+          <p:nvPr/>
+        </p:nvCxnSpPr>
+        <p:spPr>
+          <a:xfrm flipV="1">
+            <a:off x="6096000" y="3257550"/>
+            <a:ext cx="0" cy="342900"/>
+          </a:xfrm>
+          <a:prstGeom prst="line">
+            <a:avLst/>
+          </a:prstGeom>
+          <a:ln w="19050">
+            <a:solidFill>
+              <a:schemeClr val="tx1"/>
+            </a:solidFill>
+          </a:ln>
+        </p:spPr>
+        <p:style>
+          <a:lnRef idx="1">
+            <a:schemeClr val="accent1"/>
+          </a:lnRef>
+          <a:fillRef idx="0">
+            <a:schemeClr val="accent1"/>
+          </a:fillRef>
+          <a:effectRef idx="0">
+            <a:schemeClr val="accent1"/>
+          </a:effectRef>
+          <a:fontRef idx="minor">
+            <a:schemeClr val="tx1"/>
+          </a:fontRef>
+        </p:style>
+      </p:cxnSp>
+      <p:sp>
+        <p:nvSpPr>
+          <p:cNvPr id="7" name="Oval 6"/>
+          <p:cNvSpPr/>
+          <p:nvPr/>
+        </p:nvSpPr>
+        <p:spPr>
+          <a:xfrm>
+            <a:off x="5876925" y="4400550"/>
+            <a:ext cx="457200" cy="457200"/>
+          </a:xfrm>
+          <a:prstGeom prst="ellipse">
+            <a:avLst/>
+          </a:prstGeom>
+          <a:noFill/>
+          <a:ln w="19050">
+            <a:solidFill>
+              <a:schemeClr val="tx1"/>
+            </a:solidFill>
+          </a:ln>
+        </p:spPr>
+        <p:style>
+          <a:lnRef idx="2">
+            <a:schemeClr val="accent1">
+              <a:shade val="50000"/>
+            </a:schemeClr>
+          </a:lnRef>
+          <a:fillRef idx="1">
+            <a:schemeClr val="accent1"/>
+          </a:fillRef>
+          <a:effectRef idx="0">
+            <a:schemeClr val="accent1"/>
+          </a:effectRef>
+          <a:fontRef idx="minor">
+            <a:schemeClr val="lt1"/>
+          </a:fontRef>
+        </p:style>
+        <p:txBody>
+          <a:bodyPr rot="0" spcFirstLastPara="0" vert="horz" wrap="square" lIns="91440" tIns="45720" rIns="91440" bIns="45720" numCol="1" spcCol="0" rtlCol="0" fromWordArt="0" anchor="ctr" anchorCtr="0" forceAA="0" compatLnSpc="1">
+            <a:prstTxWarp prst="textNoShape">
+              <a:avLst/>
+            </a:prstTxWarp>
+            <a:noAutofit/>
+          </a:bodyPr>
+          <a:lstStyle/>
+          <a:p>
+            <a:r>
+              <a:rPr lang="en-US" dirty="0" smtClean="0">
+                <a:solidFill>
+                  <a:schemeClr val="tx1"/>
+                </a:solidFill>
+                <a:latin typeface="Times New Roman" panose="02020603050405020304" pitchFamily="18" charset="0"/>
+                <a:cs typeface="Times New Roman" panose="02020603050405020304" pitchFamily="18" charset="0"/>
+              </a:rPr>
+              <a:t>D</a:t>
+            </a:r>
+            <a:endParaRPr lang="en-US" dirty="0">
+              <a:solidFill>
+                <a:schemeClr val="tx1"/>
+              </a:solidFill>
+              <a:latin typeface="Times New Roman" panose="02020603050405020304" pitchFamily="18" charset="0"/>
+              <a:cs typeface="Times New Roman" panose="02020603050405020304" pitchFamily="18" charset="0"/>
+            </a:endParaRPr>
+          </a:p>
+        </p:txBody>
+      </p:sp>
+      <p:cxnSp>
+        <p:nvCxnSpPr>
+          <p:cNvPr id="8" name="Straight Connector 7"/>
+          <p:cNvCxnSpPr/>
+          <p:nvPr/>
+        </p:nvCxnSpPr>
+        <p:spPr>
+          <a:xfrm flipV="1">
+            <a:off x="6086475" y="4057650"/>
+            <a:ext cx="0" cy="342900"/>
+          </a:xfrm>
+          <a:prstGeom prst="line">
+            <a:avLst/>
+          </a:prstGeom>
+          <a:ln w="19050">
+            <a:solidFill>
+              <a:schemeClr val="tx1"/>
+            </a:solidFill>
+          </a:ln>
+        </p:spPr>
+        <p:style>
+          <a:lnRef idx="1">
+            <a:schemeClr val="accent1"/>
+          </a:lnRef>
+          <a:fillRef idx="0">
+            <a:schemeClr val="accent1"/>
+          </a:fillRef>
+          <a:effectRef idx="0">
+            <a:schemeClr val="accent1"/>
+          </a:effectRef>
+          <a:fontRef idx="minor">
+            <a:schemeClr val="tx1"/>
+          </a:fontRef>
+        </p:style>
+      </p:cxnSp>
+    </p:spTree>
+    <p:extLst>
+      <p:ext uri="{BB962C8B-B14F-4D97-AF65-F5344CB8AC3E}">
+        <p14:creationId xmlns:p14="http://schemas.microsoft.com/office/powerpoint/2010/main" val="794999589"/>
+      </p:ext>
+    </p:extLst>
+  </p:cSld>
+  <p:clrMapOvr>
+    <a:masterClrMapping/>
+  </p:clrMapOvr>
+  <p:timing>
+    <p:tnLst>
+      <p:par>
+        <p:cTn id="1" dur="indefinite" restart="never" nodeType="tmRoot"/>
+      </p:par>
+    </p:tnLst>
+  </p:timing>
+</p:sld>
+</file>
+
+<file path=ppt/slides/slide8.xml><?xml version="1.0" encoding="utf-8"?>
+<p:sld xmlns:a="http://schemas.openxmlformats.org/drawingml/2006/main" xmlns:r="http://schemas.openxmlformats.org/officeDocument/2006/relationships" xmlns:p="http://schemas.openxmlformats.org/presentationml/2006/main">
+  <p:cSld>
+    <p:spTree>
+      <p:nvGrpSpPr>
+        <p:cNvPr id="1" name=""/>
+        <p:cNvGrpSpPr/>
+        <p:nvPr/>
+      </p:nvGrpSpPr>
+      <p:grpSpPr>
+        <a:xfrm>
+          <a:off x="0" y="0"/>
+          <a:ext cx="0" cy="0"/>
+          <a:chOff x="0" y="0"/>
+          <a:chExt cx="0" cy="0"/>
+        </a:xfrm>
+      </p:grpSpPr>
+      <p:sp>
+        <p:nvSpPr>
+          <p:cNvPr id="2" name="Oval 1"/>
+          <p:cNvSpPr/>
+          <p:nvPr/>
+        </p:nvSpPr>
+        <p:spPr>
+          <a:xfrm>
+            <a:off x="3586797" y="2000250"/>
+            <a:ext cx="457200" cy="457200"/>
+          </a:xfrm>
+          <a:prstGeom prst="ellipse">
+            <a:avLst/>
+          </a:prstGeom>
+          <a:noFill/>
+          <a:ln>
+            <a:solidFill>
+              <a:schemeClr val="tx1"/>
+            </a:solidFill>
+          </a:ln>
+        </p:spPr>
+        <p:style>
+          <a:lnRef idx="2">
+            <a:schemeClr val="accent1">
+              <a:shade val="50000"/>
+            </a:schemeClr>
+          </a:lnRef>
+          <a:fillRef idx="1">
+            <a:schemeClr val="accent1"/>
+          </a:fillRef>
+          <a:effectRef idx="0">
+            <a:schemeClr val="accent1"/>
+          </a:effectRef>
+          <a:fontRef idx="minor">
+            <a:schemeClr val="lt1"/>
+          </a:fontRef>
+        </p:style>
+        <p:txBody>
+          <a:bodyPr rot="0" spcFirstLastPara="0" vert="horz" wrap="square" lIns="91440" tIns="45720" rIns="91440" bIns="45720" numCol="1" spcCol="0" rtlCol="0" fromWordArt="0" anchor="ctr" anchorCtr="0" forceAA="0" compatLnSpc="1">
+            <a:prstTxWarp prst="textNoShape">
+              <a:avLst/>
+            </a:prstTxWarp>
+            <a:noAutofit/>
+          </a:bodyPr>
+          <a:lstStyle/>
+          <a:p>
+            <a:endParaRPr lang="en-US"/>
+          </a:p>
+        </p:txBody>
+      </p:sp>
+      <p:sp>
+        <p:nvSpPr>
+          <p:cNvPr id="3" name="Oval 2"/>
+          <p:cNvSpPr/>
+          <p:nvPr/>
+        </p:nvSpPr>
+        <p:spPr>
+          <a:xfrm>
+            <a:off x="3586797" y="2800350"/>
+            <a:ext cx="457200" cy="457200"/>
+          </a:xfrm>
+          <a:prstGeom prst="ellipse">
+            <a:avLst/>
+          </a:prstGeom>
+          <a:noFill/>
+          <a:ln>
+            <a:solidFill>
+              <a:schemeClr val="tx1"/>
+            </a:solidFill>
+          </a:ln>
+        </p:spPr>
+        <p:style>
+          <a:lnRef idx="2">
+            <a:schemeClr val="accent1">
+              <a:shade val="50000"/>
+            </a:schemeClr>
+          </a:lnRef>
+          <a:fillRef idx="1">
+            <a:schemeClr val="accent1"/>
+          </a:fillRef>
+          <a:effectRef idx="0">
+            <a:schemeClr val="accent1"/>
+          </a:effectRef>
+          <a:fontRef idx="minor">
+            <a:schemeClr val="lt1"/>
+          </a:fontRef>
+        </p:style>
+        <p:txBody>
+          <a:bodyPr rot="0" spcFirstLastPara="0" vert="horz" wrap="square" lIns="91440" tIns="45720" rIns="91440" bIns="45720" numCol="1" spcCol="0" rtlCol="0" fromWordArt="0" anchor="ctr" anchorCtr="0" forceAA="0" compatLnSpc="1">
+            <a:prstTxWarp prst="textNoShape">
+              <a:avLst/>
+            </a:prstTxWarp>
+            <a:noAutofit/>
+          </a:bodyPr>
+          <a:lstStyle/>
+          <a:p>
+            <a:endParaRPr lang="en-US"/>
+          </a:p>
+        </p:txBody>
+      </p:sp>
+      <p:sp>
+        <p:nvSpPr>
+          <p:cNvPr id="4" name="Oval 3"/>
+          <p:cNvSpPr/>
+          <p:nvPr/>
+        </p:nvSpPr>
+        <p:spPr>
+          <a:xfrm>
+            <a:off x="3577272" y="3600450"/>
+            <a:ext cx="457200" cy="457200"/>
+          </a:xfrm>
+          <a:prstGeom prst="ellipse">
+            <a:avLst/>
+          </a:prstGeom>
+          <a:noFill/>
+          <a:ln>
+            <a:solidFill>
+              <a:schemeClr val="tx1"/>
+            </a:solidFill>
+          </a:ln>
+        </p:spPr>
+        <p:style>
+          <a:lnRef idx="2">
+            <a:schemeClr val="accent1">
+              <a:shade val="50000"/>
+            </a:schemeClr>
+          </a:lnRef>
+          <a:fillRef idx="1">
+            <a:schemeClr val="accent1"/>
+          </a:fillRef>
+          <a:effectRef idx="0">
+            <a:schemeClr val="accent1"/>
+          </a:effectRef>
+          <a:fontRef idx="minor">
+            <a:schemeClr val="lt1"/>
+          </a:fontRef>
+        </p:style>
+        <p:txBody>
+          <a:bodyPr rot="0" spcFirstLastPara="0" vert="horz" wrap="square" lIns="91440" tIns="45720" rIns="91440" bIns="45720" numCol="1" spcCol="0" rtlCol="0" fromWordArt="0" anchor="ctr" anchorCtr="0" forceAA="0" compatLnSpc="1">
+            <a:prstTxWarp prst="textNoShape">
+              <a:avLst/>
+            </a:prstTxWarp>
+            <a:noAutofit/>
+          </a:bodyPr>
+          <a:lstStyle/>
+          <a:p>
+            <a:endParaRPr lang="en-US"/>
+          </a:p>
+        </p:txBody>
+      </p:sp>
+      <p:cxnSp>
+        <p:nvCxnSpPr>
+          <p:cNvPr id="5" name="Straight Connector 4"/>
+          <p:cNvCxnSpPr/>
+          <p:nvPr/>
+        </p:nvCxnSpPr>
+        <p:spPr>
+          <a:xfrm flipV="1">
+            <a:off x="3815397" y="2457450"/>
+            <a:ext cx="0" cy="342900"/>
+          </a:xfrm>
+          <a:prstGeom prst="line">
+            <a:avLst/>
+          </a:prstGeom>
+          <a:ln>
+            <a:solidFill>
+              <a:schemeClr val="tx1"/>
+            </a:solidFill>
+          </a:ln>
+        </p:spPr>
+        <p:style>
+          <a:lnRef idx="1">
+            <a:schemeClr val="accent1"/>
+          </a:lnRef>
+          <a:fillRef idx="0">
+            <a:schemeClr val="accent1"/>
+          </a:fillRef>
+          <a:effectRef idx="0">
+            <a:schemeClr val="accent1"/>
+          </a:effectRef>
+          <a:fontRef idx="minor">
+            <a:schemeClr val="tx1"/>
+          </a:fontRef>
+        </p:style>
+      </p:cxnSp>
+      <p:cxnSp>
+        <p:nvCxnSpPr>
+          <p:cNvPr id="6" name="Straight Connector 5"/>
+          <p:cNvCxnSpPr/>
+          <p:nvPr/>
+        </p:nvCxnSpPr>
+        <p:spPr>
+          <a:xfrm flipV="1">
+            <a:off x="3815397" y="3257550"/>
+            <a:ext cx="0" cy="342900"/>
+          </a:xfrm>
+          <a:prstGeom prst="line">
+            <a:avLst/>
+          </a:prstGeom>
+          <a:ln>
+            <a:solidFill>
+              <a:schemeClr val="tx1"/>
+            </a:solidFill>
+          </a:ln>
+        </p:spPr>
+        <p:style>
+          <a:lnRef idx="1">
+            <a:schemeClr val="accent1"/>
+          </a:lnRef>
+          <a:fillRef idx="0">
+            <a:schemeClr val="accent1"/>
+          </a:fillRef>
+          <a:effectRef idx="0">
+            <a:schemeClr val="accent1"/>
+          </a:effectRef>
+          <a:fontRef idx="minor">
+            <a:schemeClr val="tx1"/>
+          </a:fontRef>
+        </p:style>
+      </p:cxnSp>
+      <p:sp>
+        <p:nvSpPr>
+          <p:cNvPr id="7" name="Oval 6"/>
+          <p:cNvSpPr/>
+          <p:nvPr/>
+        </p:nvSpPr>
+        <p:spPr>
+          <a:xfrm>
+            <a:off x="3596322" y="4400550"/>
+            <a:ext cx="457200" cy="457200"/>
+          </a:xfrm>
+          <a:prstGeom prst="ellipse">
+            <a:avLst/>
+          </a:prstGeom>
+          <a:noFill/>
+          <a:ln>
+            <a:solidFill>
+              <a:schemeClr val="tx1"/>
+            </a:solidFill>
+          </a:ln>
+        </p:spPr>
+        <p:style>
+          <a:lnRef idx="2">
+            <a:schemeClr val="accent1">
+              <a:shade val="50000"/>
+            </a:schemeClr>
+          </a:lnRef>
+          <a:fillRef idx="1">
+            <a:schemeClr val="accent1"/>
+          </a:fillRef>
+          <a:effectRef idx="0">
+            <a:schemeClr val="accent1"/>
+          </a:effectRef>
+          <a:fontRef idx="minor">
+            <a:schemeClr val="lt1"/>
+          </a:fontRef>
+        </p:style>
+        <p:txBody>
+          <a:bodyPr rot="0" spcFirstLastPara="0" vert="horz" wrap="square" lIns="91440" tIns="45720" rIns="91440" bIns="45720" numCol="1" spcCol="0" rtlCol="0" fromWordArt="0" anchor="ctr" anchorCtr="0" forceAA="0" compatLnSpc="1">
+            <a:prstTxWarp prst="textNoShape">
+              <a:avLst/>
+            </a:prstTxWarp>
+            <a:noAutofit/>
+          </a:bodyPr>
+          <a:lstStyle/>
+          <a:p>
+            <a:endParaRPr lang="en-US"/>
+          </a:p>
+        </p:txBody>
+      </p:sp>
+      <p:cxnSp>
+        <p:nvCxnSpPr>
+          <p:cNvPr id="8" name="Straight Connector 7"/>
+          <p:cNvCxnSpPr/>
+          <p:nvPr/>
+        </p:nvCxnSpPr>
+        <p:spPr>
+          <a:xfrm flipV="1">
+            <a:off x="3805872" y="4057650"/>
+            <a:ext cx="0" cy="342900"/>
+          </a:xfrm>
+          <a:prstGeom prst="line">
+            <a:avLst/>
+          </a:prstGeom>
+          <a:ln>
+            <a:solidFill>
+              <a:schemeClr val="tx1"/>
+            </a:solidFill>
+          </a:ln>
+        </p:spPr>
+        <p:style>
+          <a:lnRef idx="1">
+            <a:schemeClr val="accent1"/>
+          </a:lnRef>
+          <a:fillRef idx="0">
+            <a:schemeClr val="accent1"/>
+          </a:fillRef>
+          <a:effectRef idx="0">
+            <a:schemeClr val="accent1"/>
+          </a:effectRef>
+          <a:fontRef idx="minor">
+            <a:schemeClr val="tx1"/>
+          </a:fontRef>
+        </p:style>
+      </p:cxnSp>
+      <p:sp>
+        <p:nvSpPr>
+          <p:cNvPr id="9" name="Oval 8"/>
+          <p:cNvSpPr/>
+          <p:nvPr/>
+        </p:nvSpPr>
+        <p:spPr>
+          <a:xfrm>
+            <a:off x="6349047" y="4400550"/>
+            <a:ext cx="457200" cy="457200"/>
+          </a:xfrm>
+          <a:prstGeom prst="ellipse">
+            <a:avLst/>
+          </a:prstGeom>
+          <a:noFill/>
+          <a:ln w="19050">
+            <a:solidFill>
+              <a:schemeClr val="tx1"/>
+            </a:solidFill>
+          </a:ln>
+        </p:spPr>
+        <p:style>
+          <a:lnRef idx="2">
+            <a:schemeClr val="accent1">
+              <a:shade val="50000"/>
+            </a:schemeClr>
+          </a:lnRef>
+          <a:fillRef idx="1">
+            <a:schemeClr val="accent1"/>
+          </a:fillRef>
+          <a:effectRef idx="0">
+            <a:schemeClr val="accent1"/>
+          </a:effectRef>
+          <a:fontRef idx="minor">
+            <a:schemeClr val="lt1"/>
+          </a:fontRef>
+        </p:style>
+        <p:txBody>
+          <a:bodyPr rot="0" spcFirstLastPara="0" vert="horz" wrap="square" lIns="91440" tIns="45720" rIns="91440" bIns="45720" numCol="1" spcCol="0" rtlCol="0" fromWordArt="0" anchor="ctr" anchorCtr="0" forceAA="0" compatLnSpc="1">
+            <a:prstTxWarp prst="textNoShape">
+              <a:avLst/>
+            </a:prstTxWarp>
+            <a:noAutofit/>
+          </a:bodyPr>
+          <a:lstStyle/>
+          <a:p>
+            <a:r>
+              <a:rPr lang="en-US" sz="1000" b="1" dirty="0" smtClean="0">
+                <a:solidFill>
+                  <a:prstClr val="black"/>
+                </a:solidFill>
+                <a:latin typeface="Times New Roman" panose="02020603050405020304" pitchFamily="18" charset="0"/>
+                <a:cs typeface="Times New Roman" panose="02020603050405020304" pitchFamily="18" charset="0"/>
+              </a:rPr>
+              <a:t>A</a:t>
+            </a:r>
+            <a:r>
+              <a:rPr lang="en-US" sz="1000" b="1" baseline="-25000" dirty="0" smtClean="0">
+                <a:solidFill>
+                  <a:prstClr val="black"/>
+                </a:solidFill>
+                <a:latin typeface="Times New Roman" panose="02020603050405020304" pitchFamily="18" charset="0"/>
+                <a:cs typeface="Times New Roman" panose="02020603050405020304" pitchFamily="18" charset="0"/>
+              </a:rPr>
+              <a:t>0</a:t>
+            </a:r>
+            <a:endParaRPr lang="en-US" b="1" dirty="0"/>
+          </a:p>
+        </p:txBody>
+      </p:sp>
+      <p:sp>
+        <p:nvSpPr>
+          <p:cNvPr id="10" name="Oval 9"/>
+          <p:cNvSpPr/>
+          <p:nvPr/>
+        </p:nvSpPr>
+        <p:spPr>
+          <a:xfrm>
+            <a:off x="7263447" y="4400550"/>
+            <a:ext cx="457200" cy="457200"/>
+          </a:xfrm>
+          <a:prstGeom prst="ellipse">
+            <a:avLst/>
+          </a:prstGeom>
+          <a:noFill/>
+          <a:ln w="19050">
+            <a:solidFill>
+              <a:schemeClr val="tx1"/>
+            </a:solidFill>
+          </a:ln>
+        </p:spPr>
+        <p:style>
+          <a:lnRef idx="2">
+            <a:schemeClr val="accent1">
+              <a:shade val="50000"/>
+            </a:schemeClr>
+          </a:lnRef>
+          <a:fillRef idx="1">
+            <a:schemeClr val="accent1"/>
+          </a:fillRef>
+          <a:effectRef idx="0">
+            <a:schemeClr val="accent1"/>
+          </a:effectRef>
+          <a:fontRef idx="minor">
+            <a:schemeClr val="lt1"/>
+          </a:fontRef>
+        </p:style>
+        <p:txBody>
+          <a:bodyPr rot="0" spcFirstLastPara="0" vert="horz" wrap="square" lIns="91440" tIns="45720" rIns="91440" bIns="45720" numCol="1" spcCol="0" rtlCol="0" fromWordArt="0" anchor="ctr" anchorCtr="0" forceAA="0" compatLnSpc="1">
+            <a:prstTxWarp prst="textNoShape">
+              <a:avLst/>
+            </a:prstTxWarp>
+            <a:noAutofit/>
+          </a:bodyPr>
+          <a:lstStyle/>
+          <a:p>
+            <a:r>
+              <a:rPr lang="en-US" sz="1000" b="1" dirty="0" smtClean="0">
+                <a:solidFill>
+                  <a:prstClr val="black"/>
+                </a:solidFill>
+                <a:latin typeface="Times New Roman" panose="02020603050405020304" pitchFamily="18" charset="0"/>
+                <a:cs typeface="Times New Roman" panose="02020603050405020304" pitchFamily="18" charset="0"/>
+              </a:rPr>
+              <a:t>B</a:t>
+            </a:r>
+            <a:r>
+              <a:rPr lang="en-US" sz="1000" b="1" baseline="-25000" dirty="0" smtClean="0">
+                <a:solidFill>
+                  <a:prstClr val="black"/>
+                </a:solidFill>
+                <a:latin typeface="Times New Roman" panose="02020603050405020304" pitchFamily="18" charset="0"/>
+                <a:cs typeface="Times New Roman" panose="02020603050405020304" pitchFamily="18" charset="0"/>
+              </a:rPr>
+              <a:t>0</a:t>
+            </a:r>
+            <a:endParaRPr lang="en-US" b="1" dirty="0"/>
+          </a:p>
+        </p:txBody>
+      </p:sp>
+      <p:sp>
+        <p:nvSpPr>
+          <p:cNvPr id="11" name="Oval 10"/>
+          <p:cNvSpPr/>
+          <p:nvPr/>
+        </p:nvSpPr>
+        <p:spPr>
+          <a:xfrm>
+            <a:off x="6804977" y="3484245"/>
+            <a:ext cx="457200" cy="457200"/>
+          </a:xfrm>
+          <a:prstGeom prst="ellipse">
+            <a:avLst/>
+          </a:prstGeom>
+          <a:noFill/>
+          <a:ln w="19050">
+            <a:solidFill>
+              <a:schemeClr val="tx1"/>
+            </a:solidFill>
+          </a:ln>
+        </p:spPr>
+        <p:style>
+          <a:lnRef idx="2">
+            <a:schemeClr val="accent1">
+              <a:shade val="50000"/>
+            </a:schemeClr>
+          </a:lnRef>
+          <a:fillRef idx="1">
+            <a:schemeClr val="accent1"/>
+          </a:fillRef>
+          <a:effectRef idx="0">
+            <a:schemeClr val="accent1"/>
+          </a:effectRef>
+          <a:fontRef idx="minor">
+            <a:schemeClr val="lt1"/>
+          </a:fontRef>
+        </p:style>
+        <p:txBody>
+          <a:bodyPr rot="0" spcFirstLastPara="0" vert="horz" wrap="square" lIns="91440" tIns="45720" rIns="91440" bIns="45720" numCol="1" spcCol="0" rtlCol="0" fromWordArt="0" anchor="ctr" anchorCtr="0" forceAA="0" compatLnSpc="1">
+            <a:prstTxWarp prst="textNoShape">
+              <a:avLst/>
+            </a:prstTxWarp>
+            <a:noAutofit/>
+          </a:bodyPr>
+          <a:lstStyle/>
+          <a:p>
+            <a:r>
+              <a:rPr lang="en-US" sz="1000" b="1" dirty="0" smtClean="0">
+                <a:solidFill>
+                  <a:schemeClr val="tx1"/>
+                </a:solidFill>
+                <a:latin typeface="Times New Roman" panose="02020603050405020304" pitchFamily="18" charset="0"/>
+                <a:cs typeface="Times New Roman" panose="02020603050405020304" pitchFamily="18" charset="0"/>
+              </a:rPr>
+              <a:t>B</a:t>
+            </a:r>
+            <a:r>
+              <a:rPr lang="en-US" sz="1000" b="1" baseline="-25000" dirty="0" smtClean="0">
+                <a:solidFill>
+                  <a:schemeClr val="tx1"/>
+                </a:solidFill>
+                <a:latin typeface="Times New Roman" panose="02020603050405020304" pitchFamily="18" charset="0"/>
+                <a:cs typeface="Times New Roman" panose="02020603050405020304" pitchFamily="18" charset="0"/>
+              </a:rPr>
+              <a:t>1</a:t>
+            </a:r>
+            <a:endParaRPr lang="en-US" sz="1000" b="1" baseline="-25000" dirty="0">
+              <a:solidFill>
+                <a:schemeClr val="tx1"/>
+              </a:solidFill>
+              <a:latin typeface="Times New Roman" panose="02020603050405020304" pitchFamily="18" charset="0"/>
+              <a:cs typeface="Times New Roman" panose="02020603050405020304" pitchFamily="18" charset="0"/>
+            </a:endParaRPr>
+          </a:p>
+        </p:txBody>
+      </p:sp>
+      <p:cxnSp>
+        <p:nvCxnSpPr>
+          <p:cNvPr id="12" name="Straight Connector 11"/>
+          <p:cNvCxnSpPr/>
+          <p:nvPr/>
+        </p:nvCxnSpPr>
+        <p:spPr>
+          <a:xfrm flipV="1">
+            <a:off x="6575742" y="3943985"/>
+            <a:ext cx="458470" cy="455930"/>
+          </a:xfrm>
+          <a:prstGeom prst="line">
+            <a:avLst/>
+          </a:prstGeom>
+          <a:ln w="19050">
+            <a:solidFill>
+              <a:schemeClr val="tx1"/>
+            </a:solidFill>
+          </a:ln>
+        </p:spPr>
+        <p:style>
+          <a:lnRef idx="1">
+            <a:schemeClr val="accent1"/>
+          </a:lnRef>
+          <a:fillRef idx="0">
+            <a:schemeClr val="accent1"/>
+          </a:fillRef>
+          <a:effectRef idx="0">
+            <a:schemeClr val="accent1"/>
+          </a:effectRef>
+          <a:fontRef idx="minor">
+            <a:schemeClr val="tx1"/>
+          </a:fontRef>
+        </p:style>
+      </p:cxnSp>
+      <p:cxnSp>
+        <p:nvCxnSpPr>
+          <p:cNvPr id="13" name="Straight Connector 12"/>
+          <p:cNvCxnSpPr>
+            <a:stCxn id="10" idx="0"/>
+          </p:cNvCxnSpPr>
+          <p:nvPr/>
+        </p:nvCxnSpPr>
+        <p:spPr>
+          <a:xfrm flipH="1" flipV="1">
+            <a:off x="7036118" y="3940175"/>
+            <a:ext cx="455929" cy="460375"/>
+          </a:xfrm>
+          <a:prstGeom prst="line">
+            <a:avLst/>
+          </a:prstGeom>
+          <a:ln w="19050">
+            <a:solidFill>
+              <a:schemeClr val="tx1"/>
+            </a:solidFill>
+          </a:ln>
+        </p:spPr>
+        <p:style>
+          <a:lnRef idx="1">
+            <a:schemeClr val="accent1"/>
+          </a:lnRef>
+          <a:fillRef idx="0">
+            <a:schemeClr val="accent1"/>
+          </a:fillRef>
+          <a:effectRef idx="0">
+            <a:schemeClr val="accent1"/>
+          </a:effectRef>
+          <a:fontRef idx="minor">
+            <a:schemeClr val="tx1"/>
+          </a:fontRef>
+        </p:style>
+      </p:cxnSp>
+      <p:sp>
+        <p:nvSpPr>
+          <p:cNvPr id="14" name="Oval 13"/>
+          <p:cNvSpPr/>
+          <p:nvPr/>
+        </p:nvSpPr>
+        <p:spPr>
+          <a:xfrm>
+            <a:off x="7948612" y="4392295"/>
+            <a:ext cx="457200" cy="457200"/>
+          </a:xfrm>
+          <a:prstGeom prst="ellipse">
+            <a:avLst/>
+          </a:prstGeom>
+          <a:noFill/>
+          <a:ln w="19050">
+            <a:solidFill>
+              <a:schemeClr val="tx1"/>
+            </a:solidFill>
+          </a:ln>
+        </p:spPr>
+        <p:style>
+          <a:lnRef idx="2">
+            <a:schemeClr val="accent1">
+              <a:shade val="50000"/>
+            </a:schemeClr>
+          </a:lnRef>
+          <a:fillRef idx="1">
+            <a:schemeClr val="accent1"/>
+          </a:fillRef>
+          <a:effectRef idx="0">
+            <a:schemeClr val="accent1"/>
+          </a:effectRef>
+          <a:fontRef idx="minor">
+            <a:schemeClr val="lt1"/>
+          </a:fontRef>
+        </p:style>
+        <p:txBody>
+          <a:bodyPr rot="0" spcFirstLastPara="0" vert="horz" wrap="square" lIns="91440" tIns="45720" rIns="91440" bIns="45720" numCol="1" spcCol="0" rtlCol="0" fromWordArt="0" anchor="ctr" anchorCtr="0" forceAA="0" compatLnSpc="1">
+            <a:prstTxWarp prst="textNoShape">
+              <a:avLst/>
+            </a:prstTxWarp>
+            <a:noAutofit/>
+          </a:bodyPr>
+          <a:lstStyle/>
+          <a:p>
+            <a:r>
+              <a:rPr lang="en-US" sz="1000" b="1" dirty="0" smtClean="0">
+                <a:solidFill>
+                  <a:prstClr val="black"/>
+                </a:solidFill>
+                <a:latin typeface="Times New Roman" panose="02020603050405020304" pitchFamily="18" charset="0"/>
+                <a:cs typeface="Times New Roman" panose="02020603050405020304" pitchFamily="18" charset="0"/>
+              </a:rPr>
+              <a:t>C</a:t>
+            </a:r>
+            <a:r>
+              <a:rPr lang="en-US" sz="1000" b="1" baseline="-25000" dirty="0" smtClean="0">
+                <a:solidFill>
+                  <a:prstClr val="black"/>
+                </a:solidFill>
+                <a:latin typeface="Times New Roman" panose="02020603050405020304" pitchFamily="18" charset="0"/>
+                <a:cs typeface="Times New Roman" panose="02020603050405020304" pitchFamily="18" charset="0"/>
+              </a:rPr>
+              <a:t>0</a:t>
+            </a:r>
+            <a:endParaRPr lang="en-US" b="1" dirty="0"/>
+          </a:p>
+        </p:txBody>
+      </p:sp>
+    </p:spTree>
+    <p:extLst>
+      <p:ext uri="{BB962C8B-B14F-4D97-AF65-F5344CB8AC3E}">
+        <p14:creationId xmlns:p14="http://schemas.microsoft.com/office/powerpoint/2010/main" val="1357663410"/>
+      </p:ext>
+    </p:extLst>
+  </p:cSld>
+  <p:clrMapOvr>
+    <a:masterClrMapping/>
+  </p:clrMapOvr>
+  <p:timing>
+    <p:tnLst>
+      <p:par>
+        <p:cTn id="1" dur="indefinite" restart="never" nodeType="tmRoot"/>
+      </p:par>
+    </p:tnLst>
+  </p:timing>
+</p:sld>
+</file>
+
+<file path=ppt/slides/slide9.xml><?xml version="1.0" encoding="utf-8"?>
+<p:sld xmlns:a="http://schemas.openxmlformats.org/drawingml/2006/main" xmlns:r="http://schemas.openxmlformats.org/officeDocument/2006/relationships" xmlns:p="http://schemas.openxmlformats.org/presentationml/2006/main">
+  <p:cSld>
+    <p:spTree>
+      <p:nvGrpSpPr>
+        <p:cNvPr id="1" name=""/>
+        <p:cNvGrpSpPr/>
+        <p:nvPr/>
+      </p:nvGrpSpPr>
+      <p:grpSpPr>
+        <a:xfrm>
+          <a:off x="0" y="0"/>
+          <a:ext cx="0" cy="0"/>
+          <a:chOff x="0" y="0"/>
+          <a:chExt cx="0" cy="0"/>
+        </a:xfrm>
+      </p:grpSpPr>
+      <p:sp>
+        <p:nvSpPr>
+          <p:cNvPr id="2" name="Oval 1"/>
+          <p:cNvSpPr/>
+          <p:nvPr/>
+        </p:nvSpPr>
+        <p:spPr>
+          <a:xfrm>
+            <a:off x="1201159" y="4619534"/>
+            <a:ext cx="457200" cy="457200"/>
+          </a:xfrm>
+          <a:prstGeom prst="ellipse">
+            <a:avLst/>
+          </a:prstGeom>
+          <a:noFill/>
+          <a:ln w="19050">
+            <a:solidFill>
+              <a:schemeClr val="tx1"/>
+            </a:solidFill>
+          </a:ln>
+        </p:spPr>
+        <p:style>
+          <a:lnRef idx="2">
+            <a:schemeClr val="accent1">
+              <a:shade val="50000"/>
+            </a:schemeClr>
+          </a:lnRef>
+          <a:fillRef idx="1">
+            <a:schemeClr val="accent1"/>
+          </a:fillRef>
+          <a:effectRef idx="0">
+            <a:schemeClr val="accent1"/>
+          </a:effectRef>
+          <a:fontRef idx="minor">
+            <a:schemeClr val="lt1"/>
+          </a:fontRef>
+        </p:style>
+        <p:txBody>
+          <a:bodyPr rot="0" spcFirstLastPara="0" vert="horz" wrap="square" lIns="91440" tIns="45720" rIns="91440" bIns="45720" numCol="1" spcCol="0" rtlCol="0" fromWordArt="0" anchor="ctr" anchorCtr="0" forceAA="0" compatLnSpc="1">
+            <a:prstTxWarp prst="textNoShape">
+              <a:avLst/>
+            </a:prstTxWarp>
+            <a:noAutofit/>
+          </a:bodyPr>
+          <a:lstStyle/>
+          <a:p>
+            <a:r>
+              <a:rPr lang="en-US" sz="1000" b="1" dirty="0" smtClean="0">
+                <a:solidFill>
+                  <a:prstClr val="black"/>
+                </a:solidFill>
+                <a:latin typeface="Times New Roman" panose="02020603050405020304" pitchFamily="18" charset="0"/>
+                <a:cs typeface="Times New Roman" panose="02020603050405020304" pitchFamily="18" charset="0"/>
+              </a:rPr>
+              <a:t>C</a:t>
+            </a:r>
+            <a:r>
+              <a:rPr lang="en-US" sz="1000" b="1" baseline="-25000" dirty="0" smtClean="0">
+                <a:solidFill>
+                  <a:prstClr val="black"/>
+                </a:solidFill>
+                <a:latin typeface="Times New Roman" panose="02020603050405020304" pitchFamily="18" charset="0"/>
+                <a:cs typeface="Times New Roman" panose="02020603050405020304" pitchFamily="18" charset="0"/>
+              </a:rPr>
+              <a:t>0</a:t>
+            </a:r>
+            <a:endParaRPr lang="en-US" b="1" dirty="0"/>
+          </a:p>
+        </p:txBody>
+      </p:sp>
+      <p:sp>
+        <p:nvSpPr>
+          <p:cNvPr id="3" name="Oval 2"/>
+          <p:cNvSpPr/>
+          <p:nvPr/>
+        </p:nvSpPr>
+        <p:spPr>
+          <a:xfrm>
+            <a:off x="1822722" y="4619534"/>
+            <a:ext cx="457200" cy="457200"/>
+          </a:xfrm>
+          <a:prstGeom prst="ellipse">
+            <a:avLst/>
+          </a:prstGeom>
+          <a:noFill/>
+          <a:ln w="19050">
+            <a:solidFill>
+              <a:schemeClr val="tx1"/>
+            </a:solidFill>
+          </a:ln>
+        </p:spPr>
+        <p:style>
+          <a:lnRef idx="2">
+            <a:schemeClr val="accent1">
+              <a:shade val="50000"/>
+            </a:schemeClr>
+          </a:lnRef>
+          <a:fillRef idx="1">
+            <a:schemeClr val="accent1"/>
+          </a:fillRef>
+          <a:effectRef idx="0">
+            <a:schemeClr val="accent1"/>
+          </a:effectRef>
+          <a:fontRef idx="minor">
+            <a:schemeClr val="lt1"/>
+          </a:fontRef>
+        </p:style>
+        <p:txBody>
+          <a:bodyPr rot="0" spcFirstLastPara="0" vert="horz" wrap="square" lIns="91440" tIns="45720" rIns="91440" bIns="45720" numCol="1" spcCol="0" rtlCol="0" fromWordArt="0" anchor="ctr" anchorCtr="0" forceAA="0" compatLnSpc="1">
+            <a:prstTxWarp prst="textNoShape">
+              <a:avLst/>
+            </a:prstTxWarp>
+            <a:noAutofit/>
+          </a:bodyPr>
+          <a:lstStyle/>
+          <a:p>
+            <a:r>
+              <a:rPr lang="en-US" sz="1000" b="1" dirty="0" smtClean="0">
+                <a:solidFill>
+                  <a:prstClr val="black"/>
+                </a:solidFill>
+                <a:latin typeface="Times New Roman" panose="02020603050405020304" pitchFamily="18" charset="0"/>
+                <a:cs typeface="Times New Roman" panose="02020603050405020304" pitchFamily="18" charset="0"/>
+              </a:rPr>
+              <a:t>B</a:t>
+            </a:r>
+            <a:r>
+              <a:rPr lang="en-US" sz="1000" b="1" baseline="-25000" dirty="0" smtClean="0">
+                <a:solidFill>
+                  <a:prstClr val="black"/>
+                </a:solidFill>
+                <a:latin typeface="Times New Roman" panose="02020603050405020304" pitchFamily="18" charset="0"/>
+                <a:cs typeface="Times New Roman" panose="02020603050405020304" pitchFamily="18" charset="0"/>
+              </a:rPr>
+              <a:t>0</a:t>
+            </a:r>
+            <a:endParaRPr lang="en-US" b="1" dirty="0"/>
+          </a:p>
+        </p:txBody>
+      </p:sp>
+      <p:sp>
+        <p:nvSpPr>
+          <p:cNvPr id="4" name="Oval 3"/>
+          <p:cNvSpPr/>
+          <p:nvPr/>
+        </p:nvSpPr>
+        <p:spPr>
+          <a:xfrm>
+            <a:off x="1528830" y="3808685"/>
+            <a:ext cx="457200" cy="457200"/>
+          </a:xfrm>
+          <a:prstGeom prst="ellipse">
+            <a:avLst/>
+          </a:prstGeom>
+          <a:noFill/>
+          <a:ln w="19050">
+            <a:solidFill>
+              <a:schemeClr val="tx1"/>
+            </a:solidFill>
+          </a:ln>
+        </p:spPr>
+        <p:style>
+          <a:lnRef idx="2">
+            <a:schemeClr val="accent1">
+              <a:shade val="50000"/>
+            </a:schemeClr>
+          </a:lnRef>
+          <a:fillRef idx="1">
+            <a:schemeClr val="accent1"/>
+          </a:fillRef>
+          <a:effectRef idx="0">
+            <a:schemeClr val="accent1"/>
+          </a:effectRef>
+          <a:fontRef idx="minor">
+            <a:schemeClr val="lt1"/>
+          </a:fontRef>
+        </p:style>
+        <p:txBody>
+          <a:bodyPr rot="0" spcFirstLastPara="0" vert="horz" wrap="square" lIns="91440" tIns="45720" rIns="91440" bIns="45720" numCol="1" spcCol="0" rtlCol="0" fromWordArt="0" anchor="ctr" anchorCtr="0" forceAA="0" compatLnSpc="1">
+            <a:prstTxWarp prst="textNoShape">
+              <a:avLst/>
+            </a:prstTxWarp>
+            <a:noAutofit/>
+          </a:bodyPr>
+          <a:lstStyle/>
+          <a:p>
+            <a:r>
+              <a:rPr lang="en-US" sz="1000" b="1" dirty="0" smtClean="0">
+                <a:solidFill>
+                  <a:schemeClr val="tx1"/>
+                </a:solidFill>
+                <a:latin typeface="Times New Roman" panose="02020603050405020304" pitchFamily="18" charset="0"/>
+                <a:cs typeface="Times New Roman" panose="02020603050405020304" pitchFamily="18" charset="0"/>
+              </a:rPr>
+              <a:t>B</a:t>
+            </a:r>
+            <a:r>
+              <a:rPr lang="en-US" sz="1000" b="1" baseline="-25000" dirty="0" smtClean="0">
+                <a:solidFill>
+                  <a:schemeClr val="tx1"/>
+                </a:solidFill>
+                <a:latin typeface="Times New Roman" panose="02020603050405020304" pitchFamily="18" charset="0"/>
+                <a:cs typeface="Times New Roman" panose="02020603050405020304" pitchFamily="18" charset="0"/>
+              </a:rPr>
+              <a:t>1</a:t>
+            </a:r>
+            <a:endParaRPr lang="en-US" sz="1000" b="1" baseline="-25000" dirty="0">
+              <a:solidFill>
+                <a:schemeClr val="tx1"/>
+              </a:solidFill>
+              <a:latin typeface="Times New Roman" panose="02020603050405020304" pitchFamily="18" charset="0"/>
+              <a:cs typeface="Times New Roman" panose="02020603050405020304" pitchFamily="18" charset="0"/>
+            </a:endParaRPr>
+          </a:p>
+        </p:txBody>
+      </p:sp>
+      <p:cxnSp>
+        <p:nvCxnSpPr>
+          <p:cNvPr id="5" name="Straight Connector 4"/>
+          <p:cNvCxnSpPr>
+            <a:endCxn id="4" idx="4"/>
+          </p:cNvCxnSpPr>
+          <p:nvPr/>
+        </p:nvCxnSpPr>
+        <p:spPr>
+          <a:xfrm flipV="1">
+            <a:off x="1427762" y="4265885"/>
+            <a:ext cx="329668" cy="352380"/>
+          </a:xfrm>
+          <a:prstGeom prst="line">
+            <a:avLst/>
+          </a:prstGeom>
+          <a:ln w="19050">
+            <a:solidFill>
+              <a:schemeClr val="tx1"/>
+            </a:solidFill>
+          </a:ln>
+        </p:spPr>
+        <p:style>
+          <a:lnRef idx="1">
+            <a:schemeClr val="accent1"/>
+          </a:lnRef>
+          <a:fillRef idx="0">
+            <a:schemeClr val="accent1"/>
+          </a:fillRef>
+          <a:effectRef idx="0">
+            <a:schemeClr val="accent1"/>
+          </a:effectRef>
+          <a:fontRef idx="minor">
+            <a:schemeClr val="tx1"/>
+          </a:fontRef>
+        </p:style>
+      </p:cxnSp>
+      <p:cxnSp>
+        <p:nvCxnSpPr>
+          <p:cNvPr id="6" name="Straight Connector 5"/>
+          <p:cNvCxnSpPr>
+            <a:stCxn id="3" idx="0"/>
+            <a:endCxn id="4" idx="4"/>
+          </p:cNvCxnSpPr>
+          <p:nvPr/>
+        </p:nvCxnSpPr>
+        <p:spPr>
+          <a:xfrm flipH="1" flipV="1">
+            <a:off x="1757430" y="4265885"/>
+            <a:ext cx="293892" cy="353649"/>
+          </a:xfrm>
+          <a:prstGeom prst="line">
+            <a:avLst/>
+          </a:prstGeom>
+          <a:ln w="19050">
+            <a:solidFill>
+              <a:schemeClr val="tx1"/>
+            </a:solidFill>
+          </a:ln>
+        </p:spPr>
+        <p:style>
+          <a:lnRef idx="1">
+            <a:schemeClr val="accent1"/>
+          </a:lnRef>
+          <a:fillRef idx="0">
+            <a:schemeClr val="accent1"/>
+          </a:fillRef>
+          <a:effectRef idx="0">
+            <a:schemeClr val="accent1"/>
+          </a:effectRef>
+          <a:fontRef idx="minor">
+            <a:schemeClr val="tx1"/>
+          </a:fontRef>
+        </p:style>
+      </p:cxnSp>
+      <p:sp>
+        <p:nvSpPr>
+          <p:cNvPr id="20" name="Oval 19"/>
+          <p:cNvSpPr/>
+          <p:nvPr/>
+        </p:nvSpPr>
+        <p:spPr>
+          <a:xfrm>
+            <a:off x="2365387" y="4619534"/>
+            <a:ext cx="457200" cy="457200"/>
+          </a:xfrm>
+          <a:prstGeom prst="ellipse">
+            <a:avLst/>
+          </a:prstGeom>
+          <a:noFill/>
+          <a:ln w="19050">
+            <a:solidFill>
+              <a:schemeClr val="tx1"/>
+            </a:solidFill>
+          </a:ln>
+        </p:spPr>
+        <p:style>
+          <a:lnRef idx="2">
+            <a:schemeClr val="accent1">
+              <a:shade val="50000"/>
+            </a:schemeClr>
+          </a:lnRef>
+          <a:fillRef idx="1">
+            <a:schemeClr val="accent1"/>
+          </a:fillRef>
+          <a:effectRef idx="0">
+            <a:schemeClr val="accent1"/>
+          </a:effectRef>
+          <a:fontRef idx="minor">
+            <a:schemeClr val="lt1"/>
+          </a:fontRef>
+        </p:style>
+        <p:txBody>
+          <a:bodyPr rot="0" spcFirstLastPara="0" vert="horz" wrap="square" lIns="91440" tIns="45720" rIns="91440" bIns="45720" numCol="1" spcCol="0" rtlCol="0" fromWordArt="0" anchor="ctr" anchorCtr="0" forceAA="0" compatLnSpc="1">
+            <a:prstTxWarp prst="textNoShape">
+              <a:avLst/>
+            </a:prstTxWarp>
+            <a:noAutofit/>
+          </a:bodyPr>
+          <a:lstStyle/>
+          <a:p>
+            <a:r>
+              <a:rPr lang="en-US" sz="1000" b="1" dirty="0" smtClean="0">
+                <a:solidFill>
+                  <a:prstClr val="black"/>
+                </a:solidFill>
+                <a:latin typeface="Times New Roman" panose="02020603050405020304" pitchFamily="18" charset="0"/>
+                <a:cs typeface="Times New Roman" panose="02020603050405020304" pitchFamily="18" charset="0"/>
+              </a:rPr>
+              <a:t>D</a:t>
+            </a:r>
+            <a:r>
+              <a:rPr lang="en-US" sz="1000" b="1" baseline="-25000" dirty="0" smtClean="0">
+                <a:solidFill>
+                  <a:prstClr val="black"/>
+                </a:solidFill>
+                <a:latin typeface="Times New Roman" panose="02020603050405020304" pitchFamily="18" charset="0"/>
+                <a:cs typeface="Times New Roman" panose="02020603050405020304" pitchFamily="18" charset="0"/>
+              </a:rPr>
+              <a:t>0</a:t>
+            </a:r>
+            <a:endParaRPr lang="en-US" b="1" dirty="0"/>
+          </a:p>
+        </p:txBody>
+      </p:sp>
+      <p:sp>
+        <p:nvSpPr>
+          <p:cNvPr id="21" name="Oval 20"/>
+          <p:cNvSpPr/>
+          <p:nvPr/>
+        </p:nvSpPr>
+        <p:spPr>
+          <a:xfrm>
+            <a:off x="2986950" y="4619534"/>
+            <a:ext cx="457200" cy="457200"/>
+          </a:xfrm>
+          <a:prstGeom prst="ellipse">
+            <a:avLst/>
+          </a:prstGeom>
+          <a:noFill/>
+          <a:ln w="19050">
+            <a:solidFill>
+              <a:schemeClr val="tx1"/>
+            </a:solidFill>
+          </a:ln>
+        </p:spPr>
+        <p:style>
+          <a:lnRef idx="2">
+            <a:schemeClr val="accent1">
+              <a:shade val="50000"/>
+            </a:schemeClr>
+          </a:lnRef>
+          <a:fillRef idx="1">
+            <a:schemeClr val="accent1"/>
+          </a:fillRef>
+          <a:effectRef idx="0">
+            <a:schemeClr val="accent1"/>
+          </a:effectRef>
+          <a:fontRef idx="minor">
+            <a:schemeClr val="lt1"/>
+          </a:fontRef>
+        </p:style>
+        <p:txBody>
+          <a:bodyPr rot="0" spcFirstLastPara="0" vert="horz" wrap="square" lIns="91440" tIns="45720" rIns="91440" bIns="45720" numCol="1" spcCol="0" rtlCol="0" fromWordArt="0" anchor="ctr" anchorCtr="0" forceAA="0" compatLnSpc="1">
+            <a:prstTxWarp prst="textNoShape">
+              <a:avLst/>
+            </a:prstTxWarp>
+            <a:noAutofit/>
+          </a:bodyPr>
+          <a:lstStyle/>
+          <a:p>
+            <a:r>
+              <a:rPr lang="en-US" sz="1000" b="1" dirty="0" smtClean="0">
+                <a:solidFill>
+                  <a:prstClr val="black"/>
+                </a:solidFill>
+                <a:latin typeface="Times New Roman" panose="02020603050405020304" pitchFamily="18" charset="0"/>
+                <a:cs typeface="Times New Roman" panose="02020603050405020304" pitchFamily="18" charset="0"/>
+              </a:rPr>
+              <a:t>E</a:t>
+            </a:r>
+            <a:r>
+              <a:rPr lang="en-US" sz="1000" b="1" baseline="-25000" dirty="0" smtClean="0">
+                <a:solidFill>
+                  <a:prstClr val="black"/>
+                </a:solidFill>
+                <a:latin typeface="Times New Roman" panose="02020603050405020304" pitchFamily="18" charset="0"/>
+                <a:cs typeface="Times New Roman" panose="02020603050405020304" pitchFamily="18" charset="0"/>
+              </a:rPr>
+              <a:t>0</a:t>
+            </a:r>
+            <a:endParaRPr lang="en-US" b="1" dirty="0"/>
+          </a:p>
+        </p:txBody>
+      </p:sp>
+      <p:sp>
+        <p:nvSpPr>
+          <p:cNvPr id="22" name="Oval 21"/>
+          <p:cNvSpPr/>
+          <p:nvPr/>
+        </p:nvSpPr>
+        <p:spPr>
+          <a:xfrm>
+            <a:off x="2693058" y="3808685"/>
+            <a:ext cx="457200" cy="457200"/>
+          </a:xfrm>
+          <a:prstGeom prst="ellipse">
+            <a:avLst/>
+          </a:prstGeom>
+          <a:noFill/>
+          <a:ln w="19050">
+            <a:solidFill>
+              <a:schemeClr val="tx1"/>
+            </a:solidFill>
+          </a:ln>
+        </p:spPr>
+        <p:style>
+          <a:lnRef idx="2">
+            <a:schemeClr val="accent1">
+              <a:shade val="50000"/>
+            </a:schemeClr>
+          </a:lnRef>
+          <a:fillRef idx="1">
+            <a:schemeClr val="accent1"/>
+          </a:fillRef>
+          <a:effectRef idx="0">
+            <a:schemeClr val="accent1"/>
+          </a:effectRef>
+          <a:fontRef idx="minor">
+            <a:schemeClr val="lt1"/>
+          </a:fontRef>
+        </p:style>
+        <p:txBody>
+          <a:bodyPr rot="0" spcFirstLastPara="0" vert="horz" wrap="square" lIns="91440" tIns="45720" rIns="91440" bIns="45720" numCol="1" spcCol="0" rtlCol="0" fromWordArt="0" anchor="ctr" anchorCtr="0" forceAA="0" compatLnSpc="1">
+            <a:prstTxWarp prst="textNoShape">
+              <a:avLst/>
+            </a:prstTxWarp>
+            <a:noAutofit/>
+          </a:bodyPr>
+          <a:lstStyle/>
+          <a:p>
+            <a:r>
+              <a:rPr lang="en-US" sz="1000" b="1" dirty="0" smtClean="0">
+                <a:solidFill>
+                  <a:schemeClr val="tx1"/>
+                </a:solidFill>
+                <a:latin typeface="Times New Roman" panose="02020603050405020304" pitchFamily="18" charset="0"/>
+                <a:cs typeface="Times New Roman" panose="02020603050405020304" pitchFamily="18" charset="0"/>
+              </a:rPr>
+              <a:t>D</a:t>
+            </a:r>
+            <a:r>
+              <a:rPr lang="en-US" sz="1000" b="1" baseline="-25000" dirty="0" smtClean="0">
+                <a:solidFill>
+                  <a:schemeClr val="tx1"/>
+                </a:solidFill>
+                <a:latin typeface="Times New Roman" panose="02020603050405020304" pitchFamily="18" charset="0"/>
+                <a:cs typeface="Times New Roman" panose="02020603050405020304" pitchFamily="18" charset="0"/>
+              </a:rPr>
+              <a:t>1</a:t>
+            </a:r>
+            <a:endParaRPr lang="en-US" sz="1000" b="1" baseline="-25000" dirty="0">
+              <a:solidFill>
+                <a:schemeClr val="tx1"/>
+              </a:solidFill>
+              <a:latin typeface="Times New Roman" panose="02020603050405020304" pitchFamily="18" charset="0"/>
+              <a:cs typeface="Times New Roman" panose="02020603050405020304" pitchFamily="18" charset="0"/>
+            </a:endParaRPr>
+          </a:p>
+        </p:txBody>
+      </p:sp>
+      <p:cxnSp>
+        <p:nvCxnSpPr>
+          <p:cNvPr id="23" name="Straight Connector 22"/>
+          <p:cNvCxnSpPr>
+            <a:endCxn id="22" idx="4"/>
+          </p:cNvCxnSpPr>
+          <p:nvPr/>
+        </p:nvCxnSpPr>
+        <p:spPr>
+          <a:xfrm flipV="1">
+            <a:off x="2591990" y="4265885"/>
+            <a:ext cx="329668" cy="352380"/>
+          </a:xfrm>
+          <a:prstGeom prst="line">
+            <a:avLst/>
+          </a:prstGeom>
+          <a:ln w="19050">
+            <a:solidFill>
+              <a:schemeClr val="tx1"/>
+            </a:solidFill>
+          </a:ln>
+        </p:spPr>
+        <p:style>
+          <a:lnRef idx="1">
+            <a:schemeClr val="accent1"/>
+          </a:lnRef>
+          <a:fillRef idx="0">
+            <a:schemeClr val="accent1"/>
+          </a:fillRef>
+          <a:effectRef idx="0">
+            <a:schemeClr val="accent1"/>
+          </a:effectRef>
+          <a:fontRef idx="minor">
+            <a:schemeClr val="tx1"/>
+          </a:fontRef>
+        </p:style>
+      </p:cxnSp>
+      <p:cxnSp>
+        <p:nvCxnSpPr>
+          <p:cNvPr id="24" name="Straight Connector 23"/>
+          <p:cNvCxnSpPr>
+            <a:stCxn id="21" idx="0"/>
+            <a:endCxn id="22" idx="4"/>
+          </p:cNvCxnSpPr>
+          <p:nvPr/>
+        </p:nvCxnSpPr>
+        <p:spPr>
+          <a:xfrm flipH="1" flipV="1">
+            <a:off x="2921658" y="4265885"/>
+            <a:ext cx="293892" cy="353649"/>
+          </a:xfrm>
+          <a:prstGeom prst="line">
+            <a:avLst/>
+          </a:prstGeom>
+          <a:ln w="19050">
+            <a:solidFill>
+              <a:schemeClr val="tx1"/>
+            </a:solidFill>
+          </a:ln>
+        </p:spPr>
+        <p:style>
+          <a:lnRef idx="1">
+            <a:schemeClr val="accent1"/>
+          </a:lnRef>
+          <a:fillRef idx="0">
+            <a:schemeClr val="accent1"/>
+          </a:fillRef>
+          <a:effectRef idx="0">
+            <a:schemeClr val="accent1"/>
+          </a:effectRef>
+          <a:fontRef idx="minor">
+            <a:schemeClr val="tx1"/>
+          </a:fontRef>
+        </p:style>
+      </p:cxnSp>
+      <p:sp>
+        <p:nvSpPr>
+          <p:cNvPr id="25" name="Right Arrow 24"/>
+          <p:cNvSpPr/>
+          <p:nvPr/>
+        </p:nvSpPr>
+        <p:spPr>
+          <a:xfrm>
+            <a:off x="3444150" y="3825830"/>
+            <a:ext cx="458470" cy="211455"/>
+          </a:xfrm>
+          <a:prstGeom prst="rightArrow">
+            <a:avLst/>
+          </a:prstGeom>
+        </p:spPr>
+        <p:style>
+          <a:lnRef idx="2">
+            <a:schemeClr val="dk1">
+              <a:shade val="50000"/>
+            </a:schemeClr>
+          </a:lnRef>
+          <a:fillRef idx="1">
+            <a:schemeClr val="dk1"/>
+          </a:fillRef>
+          <a:effectRef idx="0">
+            <a:schemeClr val="dk1"/>
+          </a:effectRef>
+          <a:fontRef idx="minor">
+            <a:schemeClr val="lt1"/>
+          </a:fontRef>
+        </p:style>
+        <p:txBody>
+          <a:bodyPr rot="0" spcFirstLastPara="0" vert="horz" wrap="square" lIns="91440" tIns="45720" rIns="91440" bIns="45720" numCol="1" spcCol="0" rtlCol="0" fromWordArt="0" anchor="ctr" anchorCtr="0" forceAA="0" compatLnSpc="1">
+            <a:prstTxWarp prst="textNoShape">
+              <a:avLst/>
+            </a:prstTxWarp>
+            <a:noAutofit/>
+          </a:bodyPr>
+          <a:lstStyle/>
+          <a:p>
+            <a:endParaRPr lang="en-US"/>
+          </a:p>
+        </p:txBody>
+      </p:sp>
+      <p:sp>
+        <p:nvSpPr>
+          <p:cNvPr id="26" name="Oval 25"/>
+          <p:cNvSpPr/>
+          <p:nvPr/>
+        </p:nvSpPr>
+        <p:spPr>
+          <a:xfrm>
+            <a:off x="3978594" y="4636679"/>
+            <a:ext cx="457200" cy="457200"/>
+          </a:xfrm>
+          <a:prstGeom prst="ellipse">
+            <a:avLst/>
+          </a:prstGeom>
+          <a:noFill/>
+          <a:ln w="19050">
+            <a:solidFill>
+              <a:schemeClr val="tx1"/>
+            </a:solidFill>
+          </a:ln>
+        </p:spPr>
+        <p:style>
+          <a:lnRef idx="2">
+            <a:schemeClr val="accent1">
+              <a:shade val="50000"/>
+            </a:schemeClr>
+          </a:lnRef>
+          <a:fillRef idx="1">
+            <a:schemeClr val="accent1"/>
+          </a:fillRef>
+          <a:effectRef idx="0">
+            <a:schemeClr val="accent1"/>
+          </a:effectRef>
+          <a:fontRef idx="minor">
+            <a:schemeClr val="lt1"/>
+          </a:fontRef>
+        </p:style>
+        <p:txBody>
+          <a:bodyPr rot="0" spcFirstLastPara="0" vert="horz" wrap="square" lIns="91440" tIns="45720" rIns="91440" bIns="45720" numCol="1" spcCol="0" rtlCol="0" fromWordArt="0" anchor="ctr" anchorCtr="0" forceAA="0" compatLnSpc="1">
+            <a:prstTxWarp prst="textNoShape">
+              <a:avLst/>
+            </a:prstTxWarp>
+            <a:noAutofit/>
+          </a:bodyPr>
+          <a:lstStyle/>
+          <a:p>
+            <a:r>
+              <a:rPr lang="en-US" sz="1000" b="1" dirty="0" smtClean="0">
+                <a:solidFill>
+                  <a:prstClr val="black"/>
+                </a:solidFill>
+                <a:latin typeface="Times New Roman" panose="02020603050405020304" pitchFamily="18" charset="0"/>
+                <a:cs typeface="Times New Roman" panose="02020603050405020304" pitchFamily="18" charset="0"/>
+              </a:rPr>
+              <a:t>C</a:t>
+            </a:r>
+            <a:r>
+              <a:rPr lang="en-US" sz="1000" b="1" baseline="-25000" dirty="0" smtClean="0">
+                <a:solidFill>
+                  <a:prstClr val="black"/>
+                </a:solidFill>
+                <a:latin typeface="Times New Roman" panose="02020603050405020304" pitchFamily="18" charset="0"/>
+                <a:cs typeface="Times New Roman" panose="02020603050405020304" pitchFamily="18" charset="0"/>
+              </a:rPr>
+              <a:t>0</a:t>
+            </a:r>
+            <a:endParaRPr lang="en-US" b="1" dirty="0"/>
+          </a:p>
+        </p:txBody>
+      </p:sp>
+      <p:sp>
+        <p:nvSpPr>
+          <p:cNvPr id="27" name="Oval 26"/>
+          <p:cNvSpPr/>
+          <p:nvPr/>
+        </p:nvSpPr>
+        <p:spPr>
+          <a:xfrm>
+            <a:off x="4600157" y="4636679"/>
+            <a:ext cx="457200" cy="457200"/>
+          </a:xfrm>
+          <a:prstGeom prst="ellipse">
+            <a:avLst/>
+          </a:prstGeom>
+          <a:noFill/>
+          <a:ln w="19050">
+            <a:solidFill>
+              <a:schemeClr val="tx1"/>
+            </a:solidFill>
+          </a:ln>
+        </p:spPr>
+        <p:style>
+          <a:lnRef idx="2">
+            <a:schemeClr val="accent1">
+              <a:shade val="50000"/>
+            </a:schemeClr>
+          </a:lnRef>
+          <a:fillRef idx="1">
+            <a:schemeClr val="accent1"/>
+          </a:fillRef>
+          <a:effectRef idx="0">
+            <a:schemeClr val="accent1"/>
+          </a:effectRef>
+          <a:fontRef idx="minor">
+            <a:schemeClr val="lt1"/>
+          </a:fontRef>
+        </p:style>
+        <p:txBody>
+          <a:bodyPr rot="0" spcFirstLastPara="0" vert="horz" wrap="square" lIns="91440" tIns="45720" rIns="91440" bIns="45720" numCol="1" spcCol="0" rtlCol="0" fromWordArt="0" anchor="ctr" anchorCtr="0" forceAA="0" compatLnSpc="1">
+            <a:prstTxWarp prst="textNoShape">
+              <a:avLst/>
+            </a:prstTxWarp>
+            <a:noAutofit/>
+          </a:bodyPr>
+          <a:lstStyle/>
+          <a:p>
+            <a:r>
+              <a:rPr lang="en-US" sz="1000" b="1" dirty="0" smtClean="0">
+                <a:solidFill>
+                  <a:prstClr val="black"/>
+                </a:solidFill>
+                <a:latin typeface="Times New Roman" panose="02020603050405020304" pitchFamily="18" charset="0"/>
+                <a:cs typeface="Times New Roman" panose="02020603050405020304" pitchFamily="18" charset="0"/>
+              </a:rPr>
+              <a:t>B</a:t>
+            </a:r>
+            <a:r>
+              <a:rPr lang="en-US" sz="1000" b="1" baseline="-25000" dirty="0" smtClean="0">
+                <a:solidFill>
+                  <a:prstClr val="black"/>
+                </a:solidFill>
+                <a:latin typeface="Times New Roman" panose="02020603050405020304" pitchFamily="18" charset="0"/>
+                <a:cs typeface="Times New Roman" panose="02020603050405020304" pitchFamily="18" charset="0"/>
+              </a:rPr>
+              <a:t>0</a:t>
+            </a:r>
+            <a:endParaRPr lang="en-US" b="1" dirty="0"/>
+          </a:p>
+        </p:txBody>
+      </p:sp>
+      <p:sp>
+        <p:nvSpPr>
+          <p:cNvPr id="28" name="Oval 27"/>
+          <p:cNvSpPr/>
+          <p:nvPr/>
+        </p:nvSpPr>
+        <p:spPr>
+          <a:xfrm>
+            <a:off x="4306265" y="3825830"/>
+            <a:ext cx="457200" cy="457200"/>
+          </a:xfrm>
+          <a:prstGeom prst="ellipse">
+            <a:avLst/>
+          </a:prstGeom>
+          <a:noFill/>
+          <a:ln w="19050">
+            <a:solidFill>
+              <a:schemeClr val="tx1"/>
+            </a:solidFill>
+          </a:ln>
+        </p:spPr>
+        <p:style>
+          <a:lnRef idx="2">
+            <a:schemeClr val="accent1">
+              <a:shade val="50000"/>
+            </a:schemeClr>
+          </a:lnRef>
+          <a:fillRef idx="1">
+            <a:schemeClr val="accent1"/>
+          </a:fillRef>
+          <a:effectRef idx="0">
+            <a:schemeClr val="accent1"/>
+          </a:effectRef>
+          <a:fontRef idx="minor">
+            <a:schemeClr val="lt1"/>
+          </a:fontRef>
+        </p:style>
+        <p:txBody>
+          <a:bodyPr rot="0" spcFirstLastPara="0" vert="horz" wrap="square" lIns="91440" tIns="45720" rIns="91440" bIns="45720" numCol="1" spcCol="0" rtlCol="0" fromWordArt="0" anchor="ctr" anchorCtr="0" forceAA="0" compatLnSpc="1">
+            <a:prstTxWarp prst="textNoShape">
+              <a:avLst/>
+            </a:prstTxWarp>
+            <a:noAutofit/>
+          </a:bodyPr>
+          <a:lstStyle/>
+          <a:p>
+            <a:r>
+              <a:rPr lang="en-US" sz="1000" b="1" dirty="0" smtClean="0">
+                <a:solidFill>
+                  <a:schemeClr val="tx1"/>
+                </a:solidFill>
+                <a:latin typeface="Times New Roman" panose="02020603050405020304" pitchFamily="18" charset="0"/>
+                <a:cs typeface="Times New Roman" panose="02020603050405020304" pitchFamily="18" charset="0"/>
+              </a:rPr>
+              <a:t>B</a:t>
+            </a:r>
+            <a:r>
+              <a:rPr lang="en-US" sz="1000" b="1" baseline="-25000" dirty="0" smtClean="0">
+                <a:solidFill>
+                  <a:schemeClr val="tx1"/>
+                </a:solidFill>
+                <a:latin typeface="Times New Roman" panose="02020603050405020304" pitchFamily="18" charset="0"/>
+                <a:cs typeface="Times New Roman" panose="02020603050405020304" pitchFamily="18" charset="0"/>
+              </a:rPr>
+              <a:t>1</a:t>
+            </a:r>
+            <a:endParaRPr lang="en-US" sz="1000" b="1" baseline="-25000" dirty="0">
+              <a:solidFill>
+                <a:schemeClr val="tx1"/>
+              </a:solidFill>
+              <a:latin typeface="Times New Roman" panose="02020603050405020304" pitchFamily="18" charset="0"/>
+              <a:cs typeface="Times New Roman" panose="02020603050405020304" pitchFamily="18" charset="0"/>
+            </a:endParaRPr>
+          </a:p>
+        </p:txBody>
+      </p:sp>
+      <p:cxnSp>
+        <p:nvCxnSpPr>
+          <p:cNvPr id="29" name="Straight Connector 28"/>
+          <p:cNvCxnSpPr>
+            <a:endCxn id="28" idx="4"/>
+          </p:cNvCxnSpPr>
+          <p:nvPr/>
+        </p:nvCxnSpPr>
+        <p:spPr>
+          <a:xfrm flipV="1">
+            <a:off x="4205197" y="4283030"/>
+            <a:ext cx="329668" cy="352380"/>
+          </a:xfrm>
+          <a:prstGeom prst="line">
+            <a:avLst/>
+          </a:prstGeom>
+          <a:ln w="19050">
+            <a:solidFill>
+              <a:schemeClr val="tx1"/>
+            </a:solidFill>
+          </a:ln>
+        </p:spPr>
+        <p:style>
+          <a:lnRef idx="1">
+            <a:schemeClr val="accent1"/>
+          </a:lnRef>
+          <a:fillRef idx="0">
+            <a:schemeClr val="accent1"/>
+          </a:fillRef>
+          <a:effectRef idx="0">
+            <a:schemeClr val="accent1"/>
+          </a:effectRef>
+          <a:fontRef idx="minor">
+            <a:schemeClr val="tx1"/>
+          </a:fontRef>
+        </p:style>
+      </p:cxnSp>
+      <p:cxnSp>
+        <p:nvCxnSpPr>
+          <p:cNvPr id="30" name="Straight Connector 29"/>
+          <p:cNvCxnSpPr>
+            <a:stCxn id="27" idx="0"/>
+            <a:endCxn id="28" idx="4"/>
+          </p:cNvCxnSpPr>
+          <p:nvPr/>
+        </p:nvCxnSpPr>
+        <p:spPr>
+          <a:xfrm flipH="1" flipV="1">
+            <a:off x="4534865" y="4283030"/>
+            <a:ext cx="293892" cy="353649"/>
+          </a:xfrm>
+          <a:prstGeom prst="line">
+            <a:avLst/>
+          </a:prstGeom>
+          <a:ln w="19050">
+            <a:solidFill>
+              <a:schemeClr val="tx1"/>
+            </a:solidFill>
+          </a:ln>
+        </p:spPr>
+        <p:style>
+          <a:lnRef idx="1">
+            <a:schemeClr val="accent1"/>
+          </a:lnRef>
+          <a:fillRef idx="0">
+            <a:schemeClr val="accent1"/>
+          </a:fillRef>
+          <a:effectRef idx="0">
+            <a:schemeClr val="accent1"/>
+          </a:effectRef>
+          <a:fontRef idx="minor">
+            <a:schemeClr val="tx1"/>
+          </a:fontRef>
+        </p:style>
+      </p:cxnSp>
+      <p:sp>
+        <p:nvSpPr>
+          <p:cNvPr id="31" name="Oval 30"/>
+          <p:cNvSpPr/>
+          <p:nvPr/>
+        </p:nvSpPr>
+        <p:spPr>
+          <a:xfrm>
+            <a:off x="5142822" y="4636679"/>
+            <a:ext cx="457200" cy="457200"/>
+          </a:xfrm>
+          <a:prstGeom prst="ellipse">
+            <a:avLst/>
+          </a:prstGeom>
+          <a:noFill/>
+          <a:ln w="19050">
+            <a:solidFill>
+              <a:schemeClr val="tx1"/>
+            </a:solidFill>
+          </a:ln>
+        </p:spPr>
+        <p:style>
+          <a:lnRef idx="2">
+            <a:schemeClr val="accent1">
+              <a:shade val="50000"/>
+            </a:schemeClr>
+          </a:lnRef>
+          <a:fillRef idx="1">
+            <a:schemeClr val="accent1"/>
+          </a:fillRef>
+          <a:effectRef idx="0">
+            <a:schemeClr val="accent1"/>
+          </a:effectRef>
+          <a:fontRef idx="minor">
+            <a:schemeClr val="lt1"/>
+          </a:fontRef>
+        </p:style>
+        <p:txBody>
+          <a:bodyPr rot="0" spcFirstLastPara="0" vert="horz" wrap="square" lIns="91440" tIns="45720" rIns="91440" bIns="45720" numCol="1" spcCol="0" rtlCol="0" fromWordArt="0" anchor="ctr" anchorCtr="0" forceAA="0" compatLnSpc="1">
+            <a:prstTxWarp prst="textNoShape">
+              <a:avLst/>
+            </a:prstTxWarp>
+            <a:noAutofit/>
+          </a:bodyPr>
+          <a:lstStyle/>
+          <a:p>
+            <a:r>
+              <a:rPr lang="en-US" sz="1000" b="1" dirty="0" smtClean="0">
+                <a:solidFill>
+                  <a:prstClr val="black"/>
+                </a:solidFill>
+                <a:latin typeface="Times New Roman" panose="02020603050405020304" pitchFamily="18" charset="0"/>
+                <a:cs typeface="Times New Roman" panose="02020603050405020304" pitchFamily="18" charset="0"/>
+              </a:rPr>
+              <a:t>D</a:t>
+            </a:r>
+            <a:r>
+              <a:rPr lang="en-US" sz="1000" b="1" baseline="-25000" dirty="0" smtClean="0">
+                <a:solidFill>
+                  <a:prstClr val="black"/>
+                </a:solidFill>
+                <a:latin typeface="Times New Roman" panose="02020603050405020304" pitchFamily="18" charset="0"/>
+                <a:cs typeface="Times New Roman" panose="02020603050405020304" pitchFamily="18" charset="0"/>
+              </a:rPr>
+              <a:t>0</a:t>
+            </a:r>
+            <a:endParaRPr lang="en-US" b="1" dirty="0"/>
+          </a:p>
+        </p:txBody>
+      </p:sp>
+      <p:sp>
+        <p:nvSpPr>
+          <p:cNvPr id="32" name="Oval 31"/>
+          <p:cNvSpPr/>
+          <p:nvPr/>
+        </p:nvSpPr>
+        <p:spPr>
+          <a:xfrm>
+            <a:off x="5764385" y="4636679"/>
+            <a:ext cx="457200" cy="457200"/>
+          </a:xfrm>
+          <a:prstGeom prst="ellipse">
+            <a:avLst/>
+          </a:prstGeom>
+          <a:noFill/>
+          <a:ln w="19050">
+            <a:solidFill>
+              <a:schemeClr val="tx1"/>
+            </a:solidFill>
+          </a:ln>
+        </p:spPr>
+        <p:style>
+          <a:lnRef idx="2">
+            <a:schemeClr val="accent1">
+              <a:shade val="50000"/>
+            </a:schemeClr>
+          </a:lnRef>
+          <a:fillRef idx="1">
+            <a:schemeClr val="accent1"/>
+          </a:fillRef>
+          <a:effectRef idx="0">
+            <a:schemeClr val="accent1"/>
+          </a:effectRef>
+          <a:fontRef idx="minor">
+            <a:schemeClr val="lt1"/>
+          </a:fontRef>
+        </p:style>
+        <p:txBody>
+          <a:bodyPr rot="0" spcFirstLastPara="0" vert="horz" wrap="square" lIns="91440" tIns="45720" rIns="91440" bIns="45720" numCol="1" spcCol="0" rtlCol="0" fromWordArt="0" anchor="ctr" anchorCtr="0" forceAA="0" compatLnSpc="1">
+            <a:prstTxWarp prst="textNoShape">
+              <a:avLst/>
+            </a:prstTxWarp>
+            <a:noAutofit/>
+          </a:bodyPr>
+          <a:lstStyle/>
+          <a:p>
+            <a:r>
+              <a:rPr lang="en-US" sz="1000" b="1" dirty="0" smtClean="0">
+                <a:solidFill>
+                  <a:prstClr val="black"/>
+                </a:solidFill>
+                <a:latin typeface="Times New Roman" panose="02020603050405020304" pitchFamily="18" charset="0"/>
+                <a:cs typeface="Times New Roman" panose="02020603050405020304" pitchFamily="18" charset="0"/>
+              </a:rPr>
+              <a:t>E</a:t>
+            </a:r>
+            <a:r>
+              <a:rPr lang="en-US" sz="1000" b="1" baseline="-25000" dirty="0" smtClean="0">
+                <a:solidFill>
+                  <a:prstClr val="black"/>
+                </a:solidFill>
+                <a:latin typeface="Times New Roman" panose="02020603050405020304" pitchFamily="18" charset="0"/>
+                <a:cs typeface="Times New Roman" panose="02020603050405020304" pitchFamily="18" charset="0"/>
+              </a:rPr>
+              <a:t>0</a:t>
+            </a:r>
+            <a:endParaRPr lang="en-US" b="1" dirty="0"/>
+          </a:p>
+        </p:txBody>
+      </p:sp>
+      <p:sp>
+        <p:nvSpPr>
+          <p:cNvPr id="33" name="Oval 32"/>
+          <p:cNvSpPr/>
+          <p:nvPr/>
+        </p:nvSpPr>
+        <p:spPr>
+          <a:xfrm>
+            <a:off x="5470493" y="3825830"/>
+            <a:ext cx="457200" cy="457200"/>
+          </a:xfrm>
+          <a:prstGeom prst="ellipse">
+            <a:avLst/>
+          </a:prstGeom>
+          <a:noFill/>
+          <a:ln w="19050">
+            <a:solidFill>
+              <a:schemeClr val="tx1"/>
+            </a:solidFill>
+          </a:ln>
+        </p:spPr>
+        <p:style>
+          <a:lnRef idx="2">
+            <a:schemeClr val="accent1">
+              <a:shade val="50000"/>
+            </a:schemeClr>
+          </a:lnRef>
+          <a:fillRef idx="1">
+            <a:schemeClr val="accent1"/>
+          </a:fillRef>
+          <a:effectRef idx="0">
+            <a:schemeClr val="accent1"/>
+          </a:effectRef>
+          <a:fontRef idx="minor">
+            <a:schemeClr val="lt1"/>
+          </a:fontRef>
+        </p:style>
+        <p:txBody>
+          <a:bodyPr rot="0" spcFirstLastPara="0" vert="horz" wrap="square" lIns="91440" tIns="45720" rIns="91440" bIns="45720" numCol="1" spcCol="0" rtlCol="0" fromWordArt="0" anchor="ctr" anchorCtr="0" forceAA="0" compatLnSpc="1">
+            <a:prstTxWarp prst="textNoShape">
+              <a:avLst/>
+            </a:prstTxWarp>
+            <a:noAutofit/>
+          </a:bodyPr>
+          <a:lstStyle/>
+          <a:p>
+            <a:r>
+              <a:rPr lang="en-US" sz="1000" b="1" dirty="0" smtClean="0">
+                <a:solidFill>
+                  <a:schemeClr val="tx1"/>
+                </a:solidFill>
+                <a:latin typeface="Times New Roman" panose="02020603050405020304" pitchFamily="18" charset="0"/>
+                <a:cs typeface="Times New Roman" panose="02020603050405020304" pitchFamily="18" charset="0"/>
+              </a:rPr>
+              <a:t>D</a:t>
+            </a:r>
+            <a:r>
+              <a:rPr lang="en-US" sz="1000" b="1" baseline="-25000" dirty="0" smtClean="0">
+                <a:solidFill>
+                  <a:schemeClr val="tx1"/>
+                </a:solidFill>
+                <a:latin typeface="Times New Roman" panose="02020603050405020304" pitchFamily="18" charset="0"/>
+                <a:cs typeface="Times New Roman" panose="02020603050405020304" pitchFamily="18" charset="0"/>
+              </a:rPr>
+              <a:t>1</a:t>
+            </a:r>
+            <a:endParaRPr lang="en-US" sz="1000" b="1" baseline="-25000" dirty="0">
+              <a:solidFill>
+                <a:schemeClr val="tx1"/>
+              </a:solidFill>
+              <a:latin typeface="Times New Roman" panose="02020603050405020304" pitchFamily="18" charset="0"/>
+              <a:cs typeface="Times New Roman" panose="02020603050405020304" pitchFamily="18" charset="0"/>
+            </a:endParaRPr>
+          </a:p>
+        </p:txBody>
+      </p:sp>
+      <p:cxnSp>
+        <p:nvCxnSpPr>
+          <p:cNvPr id="34" name="Straight Connector 33"/>
+          <p:cNvCxnSpPr>
+            <a:endCxn id="33" idx="4"/>
+          </p:cNvCxnSpPr>
+          <p:nvPr/>
+        </p:nvCxnSpPr>
+        <p:spPr>
+          <a:xfrm flipV="1">
+            <a:off x="5369425" y="4283030"/>
+            <a:ext cx="329668" cy="352380"/>
+          </a:xfrm>
+          <a:prstGeom prst="line">
+            <a:avLst/>
+          </a:prstGeom>
+          <a:ln w="19050">
+            <a:solidFill>
+              <a:schemeClr val="tx1"/>
+            </a:solidFill>
+          </a:ln>
+        </p:spPr>
+        <p:style>
+          <a:lnRef idx="1">
+            <a:schemeClr val="accent1"/>
+          </a:lnRef>
+          <a:fillRef idx="0">
+            <a:schemeClr val="accent1"/>
+          </a:fillRef>
+          <a:effectRef idx="0">
+            <a:schemeClr val="accent1"/>
+          </a:effectRef>
+          <a:fontRef idx="minor">
+            <a:schemeClr val="tx1"/>
+          </a:fontRef>
+        </p:style>
+      </p:cxnSp>
+      <p:cxnSp>
+        <p:nvCxnSpPr>
+          <p:cNvPr id="35" name="Straight Connector 34"/>
+          <p:cNvCxnSpPr>
+            <a:stCxn id="32" idx="0"/>
+            <a:endCxn id="33" idx="4"/>
+          </p:cNvCxnSpPr>
+          <p:nvPr/>
+        </p:nvCxnSpPr>
+        <p:spPr>
+          <a:xfrm flipH="1" flipV="1">
+            <a:off x="5699093" y="4283030"/>
+            <a:ext cx="293892" cy="353649"/>
+          </a:xfrm>
+          <a:prstGeom prst="line">
+            <a:avLst/>
+          </a:prstGeom>
+          <a:ln w="19050">
+            <a:solidFill>
+              <a:schemeClr val="tx1"/>
+            </a:solidFill>
+          </a:ln>
+        </p:spPr>
+        <p:style>
+          <a:lnRef idx="1">
+            <a:schemeClr val="accent1"/>
+          </a:lnRef>
+          <a:fillRef idx="0">
+            <a:schemeClr val="accent1"/>
+          </a:fillRef>
+          <a:effectRef idx="0">
+            <a:schemeClr val="accent1"/>
+          </a:effectRef>
+          <a:fontRef idx="minor">
+            <a:schemeClr val="tx1"/>
+          </a:fontRef>
+        </p:style>
+      </p:cxnSp>
+      <p:sp>
+        <p:nvSpPr>
+          <p:cNvPr id="36" name="Oval 35"/>
+          <p:cNvSpPr/>
+          <p:nvPr/>
+        </p:nvSpPr>
+        <p:spPr>
+          <a:xfrm>
+            <a:off x="4911807" y="2997155"/>
+            <a:ext cx="457200" cy="457200"/>
+          </a:xfrm>
+          <a:prstGeom prst="ellipse">
+            <a:avLst/>
+          </a:prstGeom>
+          <a:noFill/>
+          <a:ln w="19050">
+            <a:solidFill>
+              <a:schemeClr val="tx1"/>
+            </a:solidFill>
+          </a:ln>
+        </p:spPr>
+        <p:style>
+          <a:lnRef idx="2">
+            <a:schemeClr val="accent1">
+              <a:shade val="50000"/>
+            </a:schemeClr>
+          </a:lnRef>
+          <a:fillRef idx="1">
+            <a:schemeClr val="accent1"/>
+          </a:fillRef>
+          <a:effectRef idx="0">
+            <a:schemeClr val="accent1"/>
+          </a:effectRef>
+          <a:fontRef idx="minor">
+            <a:schemeClr val="lt1"/>
+          </a:fontRef>
+        </p:style>
+        <p:txBody>
+          <a:bodyPr rot="0" spcFirstLastPara="0" vert="horz" wrap="square" lIns="91440" tIns="45720" rIns="91440" bIns="45720" numCol="1" spcCol="0" rtlCol="0" fromWordArt="0" anchor="ctr" anchorCtr="0" forceAA="0" compatLnSpc="1">
+            <a:prstTxWarp prst="textNoShape">
+              <a:avLst/>
+            </a:prstTxWarp>
+            <a:noAutofit/>
+          </a:bodyPr>
+          <a:lstStyle/>
+          <a:p>
+            <a:r>
+              <a:rPr lang="en-US" sz="1000" b="1" dirty="0" smtClean="0">
+                <a:solidFill>
+                  <a:schemeClr val="tx1"/>
+                </a:solidFill>
+                <a:latin typeface="Times New Roman" panose="02020603050405020304" pitchFamily="18" charset="0"/>
+                <a:cs typeface="Times New Roman" panose="02020603050405020304" pitchFamily="18" charset="0"/>
+              </a:rPr>
+              <a:t>B</a:t>
+            </a:r>
+            <a:r>
+              <a:rPr lang="en-US" sz="1000" b="1" baseline="-25000" dirty="0" smtClean="0">
+                <a:solidFill>
+                  <a:schemeClr val="tx1"/>
+                </a:solidFill>
+                <a:latin typeface="Times New Roman" panose="02020603050405020304" pitchFamily="18" charset="0"/>
+                <a:cs typeface="Times New Roman" panose="02020603050405020304" pitchFamily="18" charset="0"/>
+              </a:rPr>
+              <a:t>1</a:t>
+            </a:r>
+            <a:endParaRPr lang="en-US" sz="1000" b="1" baseline="-25000" dirty="0">
+              <a:solidFill>
+                <a:schemeClr val="tx1"/>
+              </a:solidFill>
+              <a:latin typeface="Times New Roman" panose="02020603050405020304" pitchFamily="18" charset="0"/>
+              <a:cs typeface="Times New Roman" panose="02020603050405020304" pitchFamily="18" charset="0"/>
+            </a:endParaRPr>
+          </a:p>
+        </p:txBody>
+      </p:sp>
+      <p:cxnSp>
+        <p:nvCxnSpPr>
+          <p:cNvPr id="37" name="Straight Connector 36"/>
+          <p:cNvCxnSpPr>
+            <a:stCxn id="28" idx="0"/>
+            <a:endCxn id="36" idx="4"/>
+          </p:cNvCxnSpPr>
+          <p:nvPr/>
+        </p:nvCxnSpPr>
+        <p:spPr>
+          <a:xfrm flipV="1">
+            <a:off x="4534865" y="3454355"/>
+            <a:ext cx="605542" cy="371475"/>
+          </a:xfrm>
+          <a:prstGeom prst="line">
+            <a:avLst/>
+          </a:prstGeom>
+          <a:ln w="19050">
+            <a:solidFill>
+              <a:schemeClr val="tx1"/>
+            </a:solidFill>
+          </a:ln>
+        </p:spPr>
+        <p:style>
+          <a:lnRef idx="1">
+            <a:schemeClr val="accent1"/>
+          </a:lnRef>
+          <a:fillRef idx="0">
+            <a:schemeClr val="accent1"/>
+          </a:fillRef>
+          <a:effectRef idx="0">
+            <a:schemeClr val="accent1"/>
+          </a:effectRef>
+          <a:fontRef idx="minor">
+            <a:schemeClr val="tx1"/>
+          </a:fontRef>
+        </p:style>
+      </p:cxnSp>
+      <p:cxnSp>
+        <p:nvCxnSpPr>
+          <p:cNvPr id="40" name="Straight Connector 39"/>
+          <p:cNvCxnSpPr>
+            <a:stCxn id="33" idx="0"/>
+          </p:cNvCxnSpPr>
+          <p:nvPr/>
+        </p:nvCxnSpPr>
+        <p:spPr>
+          <a:xfrm flipH="1" flipV="1">
+            <a:off x="5140407" y="3455037"/>
+            <a:ext cx="558686" cy="370793"/>
+          </a:xfrm>
+          <a:prstGeom prst="line">
+            <a:avLst/>
+          </a:prstGeom>
+          <a:ln w="19050">
+            <a:solidFill>
+              <a:schemeClr val="tx1"/>
+            </a:solidFill>
+          </a:ln>
+        </p:spPr>
+        <p:style>
+          <a:lnRef idx="1">
+            <a:schemeClr val="accent1"/>
+          </a:lnRef>
+          <a:fillRef idx="0">
+            <a:schemeClr val="accent1"/>
+          </a:fillRef>
+          <a:effectRef idx="0">
+            <a:schemeClr val="accent1"/>
+          </a:effectRef>
+          <a:fontRef idx="minor">
+            <a:schemeClr val="tx1"/>
+          </a:fontRef>
+        </p:style>
+      </p:cxnSp>
+    </p:spTree>
+    <p:extLst>
+      <p:ext uri="{BB962C8B-B14F-4D97-AF65-F5344CB8AC3E}">
+        <p14:creationId xmlns:p14="http://schemas.microsoft.com/office/powerpoint/2010/main" val="323737039"/>
+      </p:ext>
+    </p:extLst>
+  </p:cSld>
+  <p:clrMapOvr>
+    <a:masterClrMapping/>
+  </p:clrMapOvr>
+  <p:timing>
+    <p:tnLst>
+      <p:par>
+        <p:cTn id="1" dur="indefinite" restart="never" nodeType="tmRoot"/>
+      </p:par>
+    </p:tnLst>
+  </p:timing>
+</p:sld>
+</file>
+
 <file path=ppt/theme/theme1.xml><?xml version="1.0" encoding="utf-8"?>
 <a:theme xmlns:a="http://schemas.openxmlformats.org/drawingml/2006/main" name="Office Theme">
   <a:themeElements>
@@ -7727,4 +10669,265 @@
     </a:ext>
   </a:extLst>
 </a:theme>
+</file>
+
+<file path=ppt/theme/theme2.xml><?xml version="1.0" encoding="utf-8"?>
+<a:theme xmlns:a="http://schemas.openxmlformats.org/drawingml/2006/main" name="Office Theme">
+  <a:themeElements>
+    <a:clrScheme name="Office">
+      <a:dk1>
+        <a:sysClr val="windowText" lastClr="000000"/>
+      </a:dk1>
+      <a:lt1>
+        <a:sysClr val="window" lastClr="FFFFFF"/>
+      </a:lt1>
+      <a:dk2>
+        <a:srgbClr val="44546A"/>
+      </a:dk2>
+      <a:lt2>
+        <a:srgbClr val="E7E6E6"/>
+      </a:lt2>
+      <a:accent1>
+        <a:srgbClr val="5B9BD5"/>
+      </a:accent1>
+      <a:accent2>
+        <a:srgbClr val="ED7D31"/>
+      </a:accent2>
+      <a:accent3>
+        <a:srgbClr val="A5A5A5"/>
+      </a:accent3>
+      <a:accent4>
+        <a:srgbClr val="FFC000"/>
+      </a:accent4>
+      <a:accent5>
+        <a:srgbClr val="4472C4"/>
+      </a:accent5>
+      <a:accent6>
+        <a:srgbClr val="70AD47"/>
+      </a:accent6>
+      <a:hlink>
+        <a:srgbClr val="0563C1"/>
+      </a:hlink>
+      <a:folHlink>
+        <a:srgbClr val="954F72"/>
+      </a:folHlink>
+    </a:clrScheme>
+    <a:fontScheme name="Office">
+      <a:majorFont>
+        <a:latin typeface="Calibri Light" panose="020F0302020204030204"/>
+        <a:ea typeface=""/>
+        <a:cs typeface=""/>
+        <a:font script="Jpan" typeface="ＭＳ Ｐゴシック"/>
+        <a:font script="Hang" typeface="맑은 고딕"/>
+        <a:font script="Hans" typeface="宋体"/>
+        <a:font script="Hant" typeface="新細明體"/>
+        <a:font script="Arab" typeface="Times New Roman"/>
+        <a:font script="Hebr" typeface="Times New Roman"/>
+        <a:font script="Thai" typeface="Angsana New"/>
+        <a:font script="Ethi" typeface="Nyala"/>
+        <a:font script="Beng" typeface="Vrinda"/>
+        <a:font script="Gujr" typeface="Shruti"/>
+        <a:font script="Khmr" typeface="MoolBoran"/>
+        <a:font script="Knda" typeface="Tunga"/>
+        <a:font script="Guru" typeface="Raavi"/>
+        <a:font script="Cans" typeface="Euphemia"/>
+        <a:font script="Cher" typeface="Plantagenet Cherokee"/>
+        <a:font script="Yiii" typeface="Microsoft Yi Baiti"/>
+        <a:font script="Tibt" typeface="Microsoft Himalaya"/>
+        <a:font script="Thaa" typeface="MV Boli"/>
+        <a:font script="Deva" typeface="Mangal"/>
+        <a:font script="Telu" typeface="Gautami"/>
+        <a:font script="Taml" typeface="Latha"/>
+        <a:font script="Syrc" typeface="Estrangelo Edessa"/>
+        <a:font script="Orya" typeface="Kalinga"/>
+        <a:font script="Mlym" typeface="Kartika"/>
+        <a:font script="Laoo" typeface="DokChampa"/>
+        <a:font script="Sinh" typeface="Iskoola Pota"/>
+        <a:font script="Mong" typeface="Mongolian Baiti"/>
+        <a:font script="Viet" typeface="Times New Roman"/>
+        <a:font script="Uigh" typeface="Microsoft Uighur"/>
+        <a:font script="Geor" typeface="Sylfaen"/>
+      </a:majorFont>
+      <a:minorFont>
+        <a:latin typeface="Calibri" panose="020F0502020204030204"/>
+        <a:ea typeface=""/>
+        <a:cs typeface=""/>
+        <a:font script="Jpan" typeface="ＭＳ Ｐゴシック"/>
+        <a:font script="Hang" typeface="맑은 고딕"/>
+        <a:font script="Hans" typeface="宋体"/>
+        <a:font script="Hant" typeface="新細明體"/>
+        <a:font script="Arab" typeface="Arial"/>
+        <a:font script="Hebr" typeface="Arial"/>
+        <a:font script="Thai" typeface="Cordia New"/>
+        <a:font script="Ethi" typeface="Nyala"/>
+        <a:font script="Beng" typeface="Vrinda"/>
+        <a:font script="Gujr" typeface="Shruti"/>
+        <a:font script="Khmr" typeface="DaunPenh"/>
+        <a:font script="Knda" typeface="Tunga"/>
+        <a:font script="Guru" typeface="Raavi"/>
+        <a:font script="Cans" typeface="Euphemia"/>
+        <a:font script="Cher" typeface="Plantagenet Cherokee"/>
+        <a:font script="Yiii" typeface="Microsoft Yi Baiti"/>
+        <a:font script="Tibt" typeface="Microsoft Himalaya"/>
+        <a:font script="Thaa" typeface="MV Boli"/>
+        <a:font script="Deva" typeface="Mangal"/>
+        <a:font script="Telu" typeface="Gautami"/>
+        <a:font script="Taml" typeface="Latha"/>
+        <a:font script="Syrc" typeface="Estrangelo Edessa"/>
+        <a:font script="Orya" typeface="Kalinga"/>
+        <a:font script="Mlym" typeface="Kartika"/>
+        <a:font script="Laoo" typeface="DokChampa"/>
+        <a:font script="Sinh" typeface="Iskoola Pota"/>
+        <a:font script="Mong" typeface="Mongolian Baiti"/>
+        <a:font script="Viet" typeface="Arial"/>
+        <a:font script="Uigh" typeface="Microsoft Uighur"/>
+        <a:font script="Geor" typeface="Sylfaen"/>
+      </a:minorFont>
+    </a:fontScheme>
+    <a:fmtScheme name="Office">
+      <a:fillStyleLst>
+        <a:solidFill>
+          <a:schemeClr val="phClr"/>
+        </a:solidFill>
+        <a:gradFill rotWithShape="1">
+          <a:gsLst>
+            <a:gs pos="0">
+              <a:schemeClr val="phClr">
+                <a:lumMod val="110000"/>
+                <a:satMod val="105000"/>
+                <a:tint val="67000"/>
+              </a:schemeClr>
+            </a:gs>
+            <a:gs pos="50000">
+              <a:schemeClr val="phClr">
+                <a:lumMod val="105000"/>
+                <a:satMod val="103000"/>
+                <a:tint val="73000"/>
+              </a:schemeClr>
+            </a:gs>
+            <a:gs pos="100000">
+              <a:schemeClr val="phClr">
+                <a:lumMod val="105000"/>
+                <a:satMod val="109000"/>
+                <a:tint val="81000"/>
+              </a:schemeClr>
+            </a:gs>
+          </a:gsLst>
+          <a:lin ang="5400000" scaled="0"/>
+        </a:gradFill>
+        <a:gradFill rotWithShape="1">
+          <a:gsLst>
+            <a:gs pos="0">
+              <a:schemeClr val="phClr">
+                <a:satMod val="103000"/>
+                <a:lumMod val="102000"/>
+                <a:tint val="94000"/>
+              </a:schemeClr>
+            </a:gs>
+            <a:gs pos="50000">
+              <a:schemeClr val="phClr">
+                <a:satMod val="110000"/>
+                <a:lumMod val="100000"/>
+                <a:shade val="100000"/>
+              </a:schemeClr>
+            </a:gs>
+            <a:gs pos="100000">
+              <a:schemeClr val="phClr">
+                <a:lumMod val="99000"/>
+                <a:satMod val="120000"/>
+                <a:shade val="78000"/>
+              </a:schemeClr>
+            </a:gs>
+          </a:gsLst>
+          <a:lin ang="5400000" scaled="0"/>
+        </a:gradFill>
+      </a:fillStyleLst>
+      <a:lnStyleLst>
+        <a:ln w="6350" cap="flat" cmpd="sng" algn="ctr">
+          <a:solidFill>
+            <a:schemeClr val="phClr"/>
+          </a:solidFill>
+          <a:prstDash val="solid"/>
+          <a:miter lim="800000"/>
+        </a:ln>
+        <a:ln w="12700" cap="flat" cmpd="sng" algn="ctr">
+          <a:solidFill>
+            <a:schemeClr val="phClr"/>
+          </a:solidFill>
+          <a:prstDash val="solid"/>
+          <a:miter lim="800000"/>
+        </a:ln>
+        <a:ln w="19050" cap="flat" cmpd="sng" algn="ctr">
+          <a:solidFill>
+            <a:schemeClr val="phClr"/>
+          </a:solidFill>
+          <a:prstDash val="solid"/>
+          <a:miter lim="800000"/>
+        </a:ln>
+      </a:lnStyleLst>
+      <a:effectStyleLst>
+        <a:effectStyle>
+          <a:effectLst/>
+        </a:effectStyle>
+        <a:effectStyle>
+          <a:effectLst/>
+        </a:effectStyle>
+        <a:effectStyle>
+          <a:effectLst>
+            <a:outerShdw blurRad="57150" dist="19050" dir="5400000" algn="ctr" rotWithShape="0">
+              <a:srgbClr val="000000">
+                <a:alpha val="63000"/>
+              </a:srgbClr>
+            </a:outerShdw>
+          </a:effectLst>
+        </a:effectStyle>
+      </a:effectStyleLst>
+      <a:bgFillStyleLst>
+        <a:solidFill>
+          <a:schemeClr val="phClr"/>
+        </a:solidFill>
+        <a:solidFill>
+          <a:schemeClr val="phClr">
+            <a:tint val="95000"/>
+            <a:satMod val="170000"/>
+          </a:schemeClr>
+        </a:solidFill>
+        <a:gradFill rotWithShape="1">
+          <a:gsLst>
+            <a:gs pos="0">
+              <a:schemeClr val="phClr">
+                <a:tint val="93000"/>
+                <a:satMod val="150000"/>
+                <a:shade val="98000"/>
+                <a:lumMod val="102000"/>
+              </a:schemeClr>
+            </a:gs>
+            <a:gs pos="50000">
+              <a:schemeClr val="phClr">
+                <a:tint val="98000"/>
+                <a:satMod val="130000"/>
+                <a:shade val="90000"/>
+                <a:lumMod val="103000"/>
+              </a:schemeClr>
+            </a:gs>
+            <a:gs pos="100000">
+              <a:schemeClr val="phClr">
+                <a:shade val="63000"/>
+                <a:satMod val="120000"/>
+              </a:schemeClr>
+            </a:gs>
+          </a:gsLst>
+          <a:lin ang="5400000" scaled="0"/>
+        </a:gradFill>
+      </a:bgFillStyleLst>
+    </a:fmtScheme>
+  </a:themeElements>
+  <a:objectDefaults/>
+  <a:extraClrSchemeLst/>
+  <a:extLst>
+    <a:ext uri="{05A4C25C-085E-4340-85A3-A5531E510DB2}">
+      <thm15:themeFamily xmlns:thm15="http://schemas.microsoft.com/office/thememl/2012/main" name="Office Theme" id="{62F939B6-93AF-4DB8-9C6B-D6C7DFDC589F}" vid="{4A3C46E8-61CC-4603-A589-7422A47A8E4A}"/>
+    </a:ext>
+  </a:extLst>
+</a:theme>
 </file>
</xml_diff>

<commit_message>
corrects image message, adds section for forwarding the payloads
</commit_message>
<xml_diff>
--- a/images/pics.pptx
+++ b/images/pics.pptx
@@ -216,7 +216,7 @@
           <a:p>
             <a:fld id="{4FF7AF54-2AD9-468C-807B-634631568B63}" type="datetimeFigureOut">
               <a:rPr lang="en-US" smtClean="0"/>
-              <a:t>1/13/2015</a:t>
+              <a:t>1/16/2015</a:t>
             </a:fld>
             <a:endParaRPr lang="en-US"/>
           </a:p>
@@ -699,7 +699,7 @@
           <a:p>
             <a:fld id="{844C98E4-C9EE-4E87-AFEC-1BE23205BC3C}" type="datetimeFigureOut">
               <a:rPr lang="en-US" smtClean="0"/>
-              <a:t>1/13/2015</a:t>
+              <a:t>1/16/2015</a:t>
             </a:fld>
             <a:endParaRPr lang="en-US"/>
           </a:p>
@@ -869,7 +869,7 @@
           <a:p>
             <a:fld id="{844C98E4-C9EE-4E87-AFEC-1BE23205BC3C}" type="datetimeFigureOut">
               <a:rPr lang="en-US" smtClean="0"/>
-              <a:t>1/13/2015</a:t>
+              <a:t>1/16/2015</a:t>
             </a:fld>
             <a:endParaRPr lang="en-US"/>
           </a:p>
@@ -1049,7 +1049,7 @@
           <a:p>
             <a:fld id="{844C98E4-C9EE-4E87-AFEC-1BE23205BC3C}" type="datetimeFigureOut">
               <a:rPr lang="en-US" smtClean="0"/>
-              <a:t>1/13/2015</a:t>
+              <a:t>1/16/2015</a:t>
             </a:fld>
             <a:endParaRPr lang="en-US"/>
           </a:p>
@@ -1219,7 +1219,7 @@
           <a:p>
             <a:fld id="{844C98E4-C9EE-4E87-AFEC-1BE23205BC3C}" type="datetimeFigureOut">
               <a:rPr lang="en-US" smtClean="0"/>
-              <a:t>1/13/2015</a:t>
+              <a:t>1/16/2015</a:t>
             </a:fld>
             <a:endParaRPr lang="en-US"/>
           </a:p>
@@ -1465,7 +1465,7 @@
           <a:p>
             <a:fld id="{844C98E4-C9EE-4E87-AFEC-1BE23205BC3C}" type="datetimeFigureOut">
               <a:rPr lang="en-US" smtClean="0"/>
-              <a:t>1/13/2015</a:t>
+              <a:t>1/16/2015</a:t>
             </a:fld>
             <a:endParaRPr lang="en-US"/>
           </a:p>
@@ -1697,7 +1697,7 @@
           <a:p>
             <a:fld id="{844C98E4-C9EE-4E87-AFEC-1BE23205BC3C}" type="datetimeFigureOut">
               <a:rPr lang="en-US" smtClean="0"/>
-              <a:t>1/13/2015</a:t>
+              <a:t>1/16/2015</a:t>
             </a:fld>
             <a:endParaRPr lang="en-US"/>
           </a:p>
@@ -2064,7 +2064,7 @@
           <a:p>
             <a:fld id="{844C98E4-C9EE-4E87-AFEC-1BE23205BC3C}" type="datetimeFigureOut">
               <a:rPr lang="en-US" smtClean="0"/>
-              <a:t>1/13/2015</a:t>
+              <a:t>1/16/2015</a:t>
             </a:fld>
             <a:endParaRPr lang="en-US"/>
           </a:p>
@@ -2182,7 +2182,7 @@
           <a:p>
             <a:fld id="{844C98E4-C9EE-4E87-AFEC-1BE23205BC3C}" type="datetimeFigureOut">
               <a:rPr lang="en-US" smtClean="0"/>
-              <a:t>1/13/2015</a:t>
+              <a:t>1/16/2015</a:t>
             </a:fld>
             <a:endParaRPr lang="en-US"/>
           </a:p>
@@ -2277,7 +2277,7 @@
           <a:p>
             <a:fld id="{844C98E4-C9EE-4E87-AFEC-1BE23205BC3C}" type="datetimeFigureOut">
               <a:rPr lang="en-US" smtClean="0"/>
-              <a:t>1/13/2015</a:t>
+              <a:t>1/16/2015</a:t>
             </a:fld>
             <a:endParaRPr lang="en-US"/>
           </a:p>
@@ -2554,7 +2554,7 @@
           <a:p>
             <a:fld id="{844C98E4-C9EE-4E87-AFEC-1BE23205BC3C}" type="datetimeFigureOut">
               <a:rPr lang="en-US" smtClean="0"/>
-              <a:t>1/13/2015</a:t>
+              <a:t>1/16/2015</a:t>
             </a:fld>
             <a:endParaRPr lang="en-US"/>
           </a:p>
@@ -2807,7 +2807,7 @@
           <a:p>
             <a:fld id="{844C98E4-C9EE-4E87-AFEC-1BE23205BC3C}" type="datetimeFigureOut">
               <a:rPr lang="en-US" smtClean="0"/>
-              <a:t>1/13/2015</a:t>
+              <a:t>1/16/2015</a:t>
             </a:fld>
             <a:endParaRPr lang="en-US"/>
           </a:p>
@@ -3020,7 +3020,7 @@
           <a:p>
             <a:fld id="{844C98E4-C9EE-4E87-AFEC-1BE23205BC3C}" type="datetimeFigureOut">
               <a:rPr lang="en-US" smtClean="0"/>
-              <a:t>1/13/2015</a:t>
+              <a:t>1/16/2015</a:t>
             </a:fld>
             <a:endParaRPr lang="en-US"/>
           </a:p>
@@ -7979,7 +7979,7 @@
                 <a:latin typeface="Times New Roman" panose="02020603050405020304" pitchFamily="18" charset="0"/>
                 <a:cs typeface="Times New Roman" panose="02020603050405020304" pitchFamily="18" charset="0"/>
               </a:rPr>
-              <a:t>A</a:t>
+              <a:t>D</a:t>
             </a:r>
             <a:endParaRPr lang="en-US" dirty="0">
               <a:solidFill>
@@ -8000,6 +8000,72 @@
         <p:spPr>
           <a:xfrm>
             <a:off x="5867400" y="2800350"/>
+            <a:ext cx="457200" cy="457200"/>
+          </a:xfrm>
+          <a:prstGeom prst="ellipse">
+            <a:avLst/>
+          </a:prstGeom>
+          <a:noFill/>
+          <a:ln w="19050">
+            <a:solidFill>
+              <a:schemeClr val="tx1"/>
+            </a:solidFill>
+          </a:ln>
+        </p:spPr>
+        <p:style>
+          <a:lnRef idx="2">
+            <a:schemeClr val="accent1">
+              <a:shade val="50000"/>
+            </a:schemeClr>
+          </a:lnRef>
+          <a:fillRef idx="1">
+            <a:schemeClr val="accent1"/>
+          </a:fillRef>
+          <a:effectRef idx="0">
+            <a:schemeClr val="accent1"/>
+          </a:effectRef>
+          <a:fontRef idx="minor">
+            <a:schemeClr val="lt1"/>
+          </a:fontRef>
+        </p:style>
+        <p:txBody>
+          <a:bodyPr rot="0" spcFirstLastPara="0" vert="horz" wrap="square" lIns="91440" tIns="45720" rIns="91440" bIns="45720" numCol="1" spcCol="0" rtlCol="0" fromWordArt="0" anchor="ctr" anchorCtr="0" forceAA="0" compatLnSpc="1">
+            <a:prstTxWarp prst="textNoShape">
+              <a:avLst/>
+            </a:prstTxWarp>
+            <a:noAutofit/>
+          </a:bodyPr>
+          <a:lstStyle/>
+          <a:p>
+            <a:r>
+              <a:rPr lang="en-US" dirty="0" smtClean="0">
+                <a:solidFill>
+                  <a:schemeClr val="tx1"/>
+                </a:solidFill>
+                <a:latin typeface="Times New Roman" panose="02020603050405020304" pitchFamily="18" charset="0"/>
+                <a:cs typeface="Times New Roman" panose="02020603050405020304" pitchFamily="18" charset="0"/>
+              </a:rPr>
+              <a:t>C</a:t>
+            </a:r>
+            <a:endParaRPr lang="en-US" dirty="0">
+              <a:solidFill>
+                <a:schemeClr val="tx1"/>
+              </a:solidFill>
+              <a:latin typeface="Times New Roman" panose="02020603050405020304" pitchFamily="18" charset="0"/>
+              <a:cs typeface="Times New Roman" panose="02020603050405020304" pitchFamily="18" charset="0"/>
+            </a:endParaRPr>
+          </a:p>
+        </p:txBody>
+      </p:sp>
+      <p:sp>
+        <p:nvSpPr>
+          <p:cNvPr id="4" name="Oval 3"/>
+          <p:cNvSpPr/>
+          <p:nvPr/>
+        </p:nvSpPr>
+        <p:spPr>
+          <a:xfrm>
+            <a:off x="5857875" y="3600450"/>
             <a:ext cx="457200" cy="457200"/>
           </a:xfrm>
           <a:prstGeom prst="ellipse">
@@ -8057,15 +8123,85 @@
           </a:p>
         </p:txBody>
       </p:sp>
-      <p:sp>
-        <p:nvSpPr>
-          <p:cNvPr id="4" name="Oval 3"/>
+      <p:cxnSp>
+        <p:nvCxnSpPr>
+          <p:cNvPr id="5" name="Straight Connector 4"/>
+          <p:cNvCxnSpPr/>
+          <p:nvPr/>
+        </p:nvCxnSpPr>
+        <p:spPr>
+          <a:xfrm flipV="1">
+            <a:off x="6096000" y="2457450"/>
+            <a:ext cx="0" cy="342900"/>
+          </a:xfrm>
+          <a:prstGeom prst="line">
+            <a:avLst/>
+          </a:prstGeom>
+          <a:ln w="19050">
+            <a:solidFill>
+              <a:schemeClr val="tx1"/>
+            </a:solidFill>
+          </a:ln>
+        </p:spPr>
+        <p:style>
+          <a:lnRef idx="1">
+            <a:schemeClr val="accent1"/>
+          </a:lnRef>
+          <a:fillRef idx="0">
+            <a:schemeClr val="accent1"/>
+          </a:fillRef>
+          <a:effectRef idx="0">
+            <a:schemeClr val="accent1"/>
+          </a:effectRef>
+          <a:fontRef idx="minor">
+            <a:schemeClr val="tx1"/>
+          </a:fontRef>
+        </p:style>
+      </p:cxnSp>
+      <p:cxnSp>
+        <p:nvCxnSpPr>
+          <p:cNvPr id="6" name="Straight Connector 5"/>
+          <p:cNvCxnSpPr/>
+          <p:nvPr/>
+        </p:nvCxnSpPr>
+        <p:spPr>
+          <a:xfrm flipV="1">
+            <a:off x="6096000" y="3257550"/>
+            <a:ext cx="0" cy="342900"/>
+          </a:xfrm>
+          <a:prstGeom prst="line">
+            <a:avLst/>
+          </a:prstGeom>
+          <a:ln w="19050">
+            <a:solidFill>
+              <a:schemeClr val="tx1"/>
+            </a:solidFill>
+          </a:ln>
+        </p:spPr>
+        <p:style>
+          <a:lnRef idx="1">
+            <a:schemeClr val="accent1"/>
+          </a:lnRef>
+          <a:fillRef idx="0">
+            <a:schemeClr val="accent1"/>
+          </a:fillRef>
+          <a:effectRef idx="0">
+            <a:schemeClr val="accent1"/>
+          </a:effectRef>
+          <a:fontRef idx="minor">
+            <a:schemeClr val="tx1"/>
+          </a:fontRef>
+        </p:style>
+      </p:cxnSp>
+      <p:sp>
+        <p:nvSpPr>
+          <p:cNvPr id="7" name="Oval 6"/>
           <p:cNvSpPr/>
           <p:nvPr/>
         </p:nvSpPr>
         <p:spPr>
           <a:xfrm>
-            <a:off x="5857875" y="3600450"/>
+            <a:off x="5876925" y="4400550"/>
             <a:ext cx="457200" cy="457200"/>
           </a:xfrm>
           <a:prstGeom prst="ellipse">
@@ -8111,143 +8247,7 @@
                 <a:latin typeface="Times New Roman" panose="02020603050405020304" pitchFamily="18" charset="0"/>
                 <a:cs typeface="Times New Roman" panose="02020603050405020304" pitchFamily="18" charset="0"/>
               </a:rPr>
-              <a:t>C</a:t>
-            </a:r>
-            <a:endParaRPr lang="en-US" dirty="0">
-              <a:solidFill>
-                <a:schemeClr val="tx1"/>
-              </a:solidFill>
-              <a:latin typeface="Times New Roman" panose="02020603050405020304" pitchFamily="18" charset="0"/>
-              <a:cs typeface="Times New Roman" panose="02020603050405020304" pitchFamily="18" charset="0"/>
-            </a:endParaRPr>
-          </a:p>
-        </p:txBody>
-      </p:sp>
-      <p:cxnSp>
-        <p:nvCxnSpPr>
-          <p:cNvPr id="5" name="Straight Connector 4"/>
-          <p:cNvCxnSpPr/>
-          <p:nvPr/>
-        </p:nvCxnSpPr>
-        <p:spPr>
-          <a:xfrm flipV="1">
-            <a:off x="6096000" y="2457450"/>
-            <a:ext cx="0" cy="342900"/>
-          </a:xfrm>
-          <a:prstGeom prst="line">
-            <a:avLst/>
-          </a:prstGeom>
-          <a:ln w="19050">
-            <a:solidFill>
-              <a:schemeClr val="tx1"/>
-            </a:solidFill>
-          </a:ln>
-        </p:spPr>
-        <p:style>
-          <a:lnRef idx="1">
-            <a:schemeClr val="accent1"/>
-          </a:lnRef>
-          <a:fillRef idx="0">
-            <a:schemeClr val="accent1"/>
-          </a:fillRef>
-          <a:effectRef idx="0">
-            <a:schemeClr val="accent1"/>
-          </a:effectRef>
-          <a:fontRef idx="minor">
-            <a:schemeClr val="tx1"/>
-          </a:fontRef>
-        </p:style>
-      </p:cxnSp>
-      <p:cxnSp>
-        <p:nvCxnSpPr>
-          <p:cNvPr id="6" name="Straight Connector 5"/>
-          <p:cNvCxnSpPr/>
-          <p:nvPr/>
-        </p:nvCxnSpPr>
-        <p:spPr>
-          <a:xfrm flipV="1">
-            <a:off x="6096000" y="3257550"/>
-            <a:ext cx="0" cy="342900"/>
-          </a:xfrm>
-          <a:prstGeom prst="line">
-            <a:avLst/>
-          </a:prstGeom>
-          <a:ln w="19050">
-            <a:solidFill>
-              <a:schemeClr val="tx1"/>
-            </a:solidFill>
-          </a:ln>
-        </p:spPr>
-        <p:style>
-          <a:lnRef idx="1">
-            <a:schemeClr val="accent1"/>
-          </a:lnRef>
-          <a:fillRef idx="0">
-            <a:schemeClr val="accent1"/>
-          </a:fillRef>
-          <a:effectRef idx="0">
-            <a:schemeClr val="accent1"/>
-          </a:effectRef>
-          <a:fontRef idx="minor">
-            <a:schemeClr val="tx1"/>
-          </a:fontRef>
-        </p:style>
-      </p:cxnSp>
-      <p:sp>
-        <p:nvSpPr>
-          <p:cNvPr id="7" name="Oval 6"/>
-          <p:cNvSpPr/>
-          <p:nvPr/>
-        </p:nvSpPr>
-        <p:spPr>
-          <a:xfrm>
-            <a:off x="5876925" y="4400550"/>
-            <a:ext cx="457200" cy="457200"/>
-          </a:xfrm>
-          <a:prstGeom prst="ellipse">
-            <a:avLst/>
-          </a:prstGeom>
-          <a:noFill/>
-          <a:ln w="19050">
-            <a:solidFill>
-              <a:schemeClr val="tx1"/>
-            </a:solidFill>
-          </a:ln>
-        </p:spPr>
-        <p:style>
-          <a:lnRef idx="2">
-            <a:schemeClr val="accent1">
-              <a:shade val="50000"/>
-            </a:schemeClr>
-          </a:lnRef>
-          <a:fillRef idx="1">
-            <a:schemeClr val="accent1"/>
-          </a:fillRef>
-          <a:effectRef idx="0">
-            <a:schemeClr val="accent1"/>
-          </a:effectRef>
-          <a:fontRef idx="minor">
-            <a:schemeClr val="lt1"/>
-          </a:fontRef>
-        </p:style>
-        <p:txBody>
-          <a:bodyPr rot="0" spcFirstLastPara="0" vert="horz" wrap="square" lIns="91440" tIns="45720" rIns="91440" bIns="45720" numCol="1" spcCol="0" rtlCol="0" fromWordArt="0" anchor="ctr" anchorCtr="0" forceAA="0" compatLnSpc="1">
-            <a:prstTxWarp prst="textNoShape">
-              <a:avLst/>
-            </a:prstTxWarp>
-            <a:noAutofit/>
-          </a:bodyPr>
-          <a:lstStyle/>
-          <a:p>
-            <a:r>
-              <a:rPr lang="en-US" dirty="0" smtClean="0">
-                <a:solidFill>
-                  <a:schemeClr val="tx1"/>
-                </a:solidFill>
-                <a:latin typeface="Times New Roman" panose="02020603050405020304" pitchFamily="18" charset="0"/>
-                <a:cs typeface="Times New Roman" panose="02020603050405020304" pitchFamily="18" charset="0"/>
-              </a:rPr>
-              <a:t>D</a:t>
+              <a:t>A</a:t>
             </a:r>
             <a:endParaRPr lang="en-US" dirty="0">
               <a:solidFill>

</xml_diff>

<commit_message>
quick fixes after meeting
</commit_message>
<xml_diff>
--- a/images/pics.pptx
+++ b/images/pics.pptx
@@ -223,7 +223,7 @@
           <a:p>
             <a:fld id="{4FF7AF54-2AD9-468C-807B-634631568B63}" type="datetimeFigureOut">
               <a:rPr lang="en-US" smtClean="0"/>
-              <a:t>1/23/2015</a:t>
+              <a:t>1/26/2015</a:t>
             </a:fld>
             <a:endParaRPr lang="en-US"/>
           </a:p>
@@ -706,7 +706,7 @@
           <a:p>
             <a:fld id="{844C98E4-C9EE-4E87-AFEC-1BE23205BC3C}" type="datetimeFigureOut">
               <a:rPr lang="en-US" smtClean="0"/>
-              <a:t>1/23/2015</a:t>
+              <a:t>1/26/2015</a:t>
             </a:fld>
             <a:endParaRPr lang="en-US"/>
           </a:p>
@@ -876,7 +876,7 @@
           <a:p>
             <a:fld id="{844C98E4-C9EE-4E87-AFEC-1BE23205BC3C}" type="datetimeFigureOut">
               <a:rPr lang="en-US" smtClean="0"/>
-              <a:t>1/23/2015</a:t>
+              <a:t>1/26/2015</a:t>
             </a:fld>
             <a:endParaRPr lang="en-US"/>
           </a:p>
@@ -1056,7 +1056,7 @@
           <a:p>
             <a:fld id="{844C98E4-C9EE-4E87-AFEC-1BE23205BC3C}" type="datetimeFigureOut">
               <a:rPr lang="en-US" smtClean="0"/>
-              <a:t>1/23/2015</a:t>
+              <a:t>1/26/2015</a:t>
             </a:fld>
             <a:endParaRPr lang="en-US"/>
           </a:p>
@@ -1226,7 +1226,7 @@
           <a:p>
             <a:fld id="{844C98E4-C9EE-4E87-AFEC-1BE23205BC3C}" type="datetimeFigureOut">
               <a:rPr lang="en-US" smtClean="0"/>
-              <a:t>1/23/2015</a:t>
+              <a:t>1/26/2015</a:t>
             </a:fld>
             <a:endParaRPr lang="en-US"/>
           </a:p>
@@ -1472,7 +1472,7 @@
           <a:p>
             <a:fld id="{844C98E4-C9EE-4E87-AFEC-1BE23205BC3C}" type="datetimeFigureOut">
               <a:rPr lang="en-US" smtClean="0"/>
-              <a:t>1/23/2015</a:t>
+              <a:t>1/26/2015</a:t>
             </a:fld>
             <a:endParaRPr lang="en-US"/>
           </a:p>
@@ -1704,7 +1704,7 @@
           <a:p>
             <a:fld id="{844C98E4-C9EE-4E87-AFEC-1BE23205BC3C}" type="datetimeFigureOut">
               <a:rPr lang="en-US" smtClean="0"/>
-              <a:t>1/23/2015</a:t>
+              <a:t>1/26/2015</a:t>
             </a:fld>
             <a:endParaRPr lang="en-US"/>
           </a:p>
@@ -2071,7 +2071,7 @@
           <a:p>
             <a:fld id="{844C98E4-C9EE-4E87-AFEC-1BE23205BC3C}" type="datetimeFigureOut">
               <a:rPr lang="en-US" smtClean="0"/>
-              <a:t>1/23/2015</a:t>
+              <a:t>1/26/2015</a:t>
             </a:fld>
             <a:endParaRPr lang="en-US"/>
           </a:p>
@@ -2189,7 +2189,7 @@
           <a:p>
             <a:fld id="{844C98E4-C9EE-4E87-AFEC-1BE23205BC3C}" type="datetimeFigureOut">
               <a:rPr lang="en-US" smtClean="0"/>
-              <a:t>1/23/2015</a:t>
+              <a:t>1/26/2015</a:t>
             </a:fld>
             <a:endParaRPr lang="en-US"/>
           </a:p>
@@ -2284,7 +2284,7 @@
           <a:p>
             <a:fld id="{844C98E4-C9EE-4E87-AFEC-1BE23205BC3C}" type="datetimeFigureOut">
               <a:rPr lang="en-US" smtClean="0"/>
-              <a:t>1/23/2015</a:t>
+              <a:t>1/26/2015</a:t>
             </a:fld>
             <a:endParaRPr lang="en-US"/>
           </a:p>
@@ -2561,7 +2561,7 @@
           <a:p>
             <a:fld id="{844C98E4-C9EE-4E87-AFEC-1BE23205BC3C}" type="datetimeFigureOut">
               <a:rPr lang="en-US" smtClean="0"/>
-              <a:t>1/23/2015</a:t>
+              <a:t>1/26/2015</a:t>
             </a:fld>
             <a:endParaRPr lang="en-US"/>
           </a:p>
@@ -2814,7 +2814,7 @@
           <a:p>
             <a:fld id="{844C98E4-C9EE-4E87-AFEC-1BE23205BC3C}" type="datetimeFigureOut">
               <a:rPr lang="en-US" smtClean="0"/>
-              <a:t>1/23/2015</a:t>
+              <a:t>1/26/2015</a:t>
             </a:fld>
             <a:endParaRPr lang="en-US"/>
           </a:p>
@@ -3027,7 +3027,7 @@
           <a:p>
             <a:fld id="{844C98E4-C9EE-4E87-AFEC-1BE23205BC3C}" type="datetimeFigureOut">
               <a:rPr lang="en-US" smtClean="0"/>
-              <a:t>1/23/2015</a:t>
+              <a:t>1/26/2015</a:t>
             </a:fld>
             <a:endParaRPr lang="en-US"/>
           </a:p>
@@ -11720,10 +11720,11 @@
           </a:bodyPr>
           <a:lstStyle/>
           <a:p>
-            <a:r>
-              <a:rPr lang="en-US" sz="800" dirty="0" smtClean="0">
-                <a:solidFill>
-                  <a:schemeClr val="tx1"/>
+            <a:pPr lvl="0"/>
+            <a:r>
+              <a:rPr lang="en-US" sz="900" b="1" dirty="0" smtClean="0">
+                <a:solidFill>
+                  <a:prstClr val="black"/>
                 </a:solidFill>
                 <a:latin typeface="Times New Roman" panose="02020603050405020304" pitchFamily="18" charset="0"/>
                 <a:cs typeface="Times New Roman" panose="02020603050405020304" pitchFamily="18" charset="0"/>
@@ -11731,18 +11732,28 @@
               <a:t>A</a:t>
             </a:r>
             <a:r>
-              <a:rPr lang="en-US" sz="800" baseline="-25000" dirty="0" smtClean="0">
-                <a:solidFill>
-                  <a:schemeClr val="tx1"/>
-                </a:solidFill>
-                <a:latin typeface="Times New Roman" panose="02020603050405020304" pitchFamily="18" charset="0"/>
-                <a:cs typeface="Times New Roman" panose="02020603050405020304" pitchFamily="18" charset="0"/>
-              </a:rPr>
-              <a:t>10</a:t>
-            </a:r>
-            <a:endParaRPr lang="en-US" sz="800" baseline="-25000" dirty="0">
+              <a:rPr lang="en-US" sz="600" b="1" baseline="-25000" dirty="0">
+                <a:solidFill>
+                  <a:prstClr val="black"/>
+                </a:solidFill>
+                <a:latin typeface="Times New Roman" panose="02020603050405020304" pitchFamily="18" charset="0"/>
+                <a:cs typeface="Times New Roman" panose="02020603050405020304" pitchFamily="18" charset="0"/>
+              </a:rPr>
+              <a:t>1</a:t>
+            </a:r>
+            <a:r>
+              <a:rPr lang="en-US" sz="600" b="1" baseline="-25000" dirty="0" smtClean="0">
+                <a:solidFill>
+                  <a:prstClr val="black"/>
+                </a:solidFill>
+                <a:latin typeface="Times New Roman" panose="02020603050405020304" pitchFamily="18" charset="0"/>
+                <a:cs typeface="Times New Roman" panose="02020603050405020304" pitchFamily="18" charset="0"/>
+              </a:rPr>
+              <a:t>0</a:t>
+            </a:r>
+            <a:endParaRPr lang="en-US" sz="600" b="1" baseline="-25000" dirty="0">
               <a:solidFill>
-                <a:schemeClr val="tx1"/>
+                <a:prstClr val="black"/>
               </a:solidFill>
               <a:latin typeface="Times New Roman" panose="02020603050405020304" pitchFamily="18" charset="0"/>
               <a:cs typeface="Times New Roman" panose="02020603050405020304" pitchFamily="18" charset="0"/>
@@ -11796,10 +11807,21 @@
           </a:bodyPr>
           <a:lstStyle/>
           <a:p>
-            <a:r>
-              <a:rPr lang="en-US" sz="800" dirty="0" smtClean="0">
-                <a:solidFill>
-                  <a:schemeClr val="tx1"/>
+            <a:pPr lvl="0"/>
+            <a:endParaRPr lang="en-US" sz="900" b="1" dirty="0" smtClean="0">
+              <a:solidFill>
+                <a:prstClr val="black"/>
+              </a:solidFill>
+              <a:latin typeface="Times New Roman" panose="02020603050405020304" pitchFamily="18" charset="0"/>
+              <a:cs typeface="Times New Roman" panose="02020603050405020304" pitchFamily="18" charset="0"/>
+            </a:endParaRPr>
+          </a:p>
+          <a:p>
+            <a:pPr lvl="0"/>
+            <a:r>
+              <a:rPr lang="en-US" sz="900" b="1" dirty="0" smtClean="0">
+                <a:solidFill>
+                  <a:prstClr val="black"/>
                 </a:solidFill>
                 <a:latin typeface="Times New Roman" panose="02020603050405020304" pitchFamily="18" charset="0"/>
                 <a:cs typeface="Times New Roman" panose="02020603050405020304" pitchFamily="18" charset="0"/>
@@ -11807,18 +11829,28 @@
               <a:t>A</a:t>
             </a:r>
             <a:r>
-              <a:rPr lang="en-US" sz="800" baseline="-25000" dirty="0" smtClean="0">
-                <a:solidFill>
-                  <a:schemeClr val="tx1"/>
-                </a:solidFill>
-                <a:latin typeface="Times New Roman" panose="02020603050405020304" pitchFamily="18" charset="0"/>
-                <a:cs typeface="Times New Roman" panose="02020603050405020304" pitchFamily="18" charset="0"/>
-              </a:rPr>
-              <a:t>11</a:t>
-            </a:r>
-            <a:endParaRPr lang="en-US" sz="800" baseline="-25000" dirty="0">
+              <a:rPr lang="en-US" sz="600" b="1" baseline="-25000" dirty="0">
+                <a:solidFill>
+                  <a:prstClr val="black"/>
+                </a:solidFill>
+                <a:latin typeface="Times New Roman" panose="02020603050405020304" pitchFamily="18" charset="0"/>
+                <a:cs typeface="Times New Roman" panose="02020603050405020304" pitchFamily="18" charset="0"/>
+              </a:rPr>
+              <a:t>1</a:t>
+            </a:r>
+            <a:r>
+              <a:rPr lang="en-US" sz="600" b="1" baseline="-25000" dirty="0" smtClean="0">
+                <a:solidFill>
+                  <a:prstClr val="black"/>
+                </a:solidFill>
+                <a:latin typeface="Times New Roman" panose="02020603050405020304" pitchFamily="18" charset="0"/>
+                <a:cs typeface="Times New Roman" panose="02020603050405020304" pitchFamily="18" charset="0"/>
+              </a:rPr>
+              <a:t>1</a:t>
+            </a:r>
+            <a:endParaRPr lang="en-US" sz="600" b="1" baseline="-25000" dirty="0">
               <a:solidFill>
-                <a:schemeClr val="tx1"/>
+                <a:prstClr val="black"/>
               </a:solidFill>
               <a:latin typeface="Times New Roman" panose="02020603050405020304" pitchFamily="18" charset="0"/>
               <a:cs typeface="Times New Roman" panose="02020603050405020304" pitchFamily="18" charset="0"/>
@@ -11882,7 +11914,7 @@
           <a:lstStyle/>
           <a:p>
             <a:r>
-              <a:rPr lang="en-US" sz="800" dirty="0" smtClean="0">
+              <a:rPr lang="en-US" sz="900" b="1" dirty="0" smtClean="0">
                 <a:solidFill>
                   <a:schemeClr val="tx1"/>
                 </a:solidFill>
@@ -11892,7 +11924,7 @@
               <a:t>A</a:t>
             </a:r>
             <a:r>
-              <a:rPr lang="en-US" sz="800" baseline="-25000" dirty="0" smtClean="0">
+              <a:rPr lang="en-US" sz="600" b="1" baseline="-25000" dirty="0" smtClean="0">
                 <a:solidFill>
                   <a:schemeClr val="tx1"/>
                 </a:solidFill>
@@ -11901,7 +11933,7 @@
               </a:rPr>
               <a:t>20</a:t>
             </a:r>
-            <a:endParaRPr lang="en-US" sz="800" baseline="-25000" dirty="0">
+            <a:endParaRPr lang="en-US" sz="600" b="1" baseline="-25000" dirty="0">
               <a:solidFill>
                 <a:schemeClr val="tx1"/>
               </a:solidFill>
@@ -11966,10 +11998,11 @@
           </a:bodyPr>
           <a:lstStyle/>
           <a:p>
-            <a:r>
-              <a:rPr lang="en-US" sz="800" dirty="0" smtClean="0">
-                <a:solidFill>
-                  <a:schemeClr val="tx1"/>
+            <a:pPr lvl="0"/>
+            <a:r>
+              <a:rPr lang="en-US" sz="900" b="1" dirty="0" smtClean="0">
+                <a:solidFill>
+                  <a:prstClr val="black"/>
                 </a:solidFill>
                 <a:latin typeface="Times New Roman" panose="02020603050405020304" pitchFamily="18" charset="0"/>
                 <a:cs typeface="Times New Roman" panose="02020603050405020304" pitchFamily="18" charset="0"/>
@@ -11977,18 +12010,18 @@
               <a:t>A</a:t>
             </a:r>
             <a:r>
-              <a:rPr lang="en-US" sz="800" baseline="-25000" dirty="0" smtClean="0">
-                <a:solidFill>
-                  <a:schemeClr val="tx1"/>
+              <a:rPr lang="en-US" sz="600" b="1" baseline="-25000" dirty="0" smtClean="0">
+                <a:solidFill>
+                  <a:prstClr val="black"/>
                 </a:solidFill>
                 <a:latin typeface="Times New Roman" panose="02020603050405020304" pitchFamily="18" charset="0"/>
                 <a:cs typeface="Times New Roman" panose="02020603050405020304" pitchFamily="18" charset="0"/>
               </a:rPr>
               <a:t>21</a:t>
             </a:r>
-            <a:endParaRPr lang="en-US" sz="800" b="1" baseline="-25000" dirty="0">
+            <a:endParaRPr lang="en-US" sz="600" b="1" baseline="-25000" dirty="0">
               <a:solidFill>
-                <a:schemeClr val="tx1"/>
+                <a:prstClr val="black"/>
               </a:solidFill>
               <a:latin typeface="Times New Roman" panose="02020603050405020304" pitchFamily="18" charset="0"/>
               <a:cs typeface="Times New Roman" panose="02020603050405020304" pitchFamily="18" charset="0"/>

</xml_diff>

<commit_message>
adds sensor nodes architecture section
</commit_message>
<xml_diff>
--- a/images/pics.pptx
+++ b/images/pics.pptx
@@ -5,7 +5,7 @@
     <p:sldMasterId id="2147483648" r:id="rId1"/>
   </p:sldMasterIdLst>
   <p:notesMasterIdLst>
-    <p:notesMasterId r:id="rId18"/>
+    <p:notesMasterId r:id="rId19"/>
   </p:notesMasterIdLst>
   <p:sldIdLst>
     <p:sldId id="256" r:id="rId2"/>
@@ -24,6 +24,7 @@
     <p:sldId id="269" r:id="rId15"/>
     <p:sldId id="270" r:id="rId16"/>
     <p:sldId id="271" r:id="rId17"/>
+    <p:sldId id="272" r:id="rId18"/>
   </p:sldIdLst>
   <p:sldSz cx="12192000" cy="6858000"/>
   <p:notesSz cx="6858000" cy="9144000"/>
@@ -223,7 +224,7 @@
           <a:p>
             <a:fld id="{4FF7AF54-2AD9-468C-807B-634631568B63}" type="datetimeFigureOut">
               <a:rPr lang="en-US" smtClean="0"/>
-              <a:t>1/26/2015</a:t>
+              <a:t>1/27/2015</a:t>
             </a:fld>
             <a:endParaRPr lang="en-US"/>
           </a:p>
@@ -706,7 +707,7 @@
           <a:p>
             <a:fld id="{844C98E4-C9EE-4E87-AFEC-1BE23205BC3C}" type="datetimeFigureOut">
               <a:rPr lang="en-US" smtClean="0"/>
-              <a:t>1/26/2015</a:t>
+              <a:t>1/27/2015</a:t>
             </a:fld>
             <a:endParaRPr lang="en-US"/>
           </a:p>
@@ -876,7 +877,7 @@
           <a:p>
             <a:fld id="{844C98E4-C9EE-4E87-AFEC-1BE23205BC3C}" type="datetimeFigureOut">
               <a:rPr lang="en-US" smtClean="0"/>
-              <a:t>1/26/2015</a:t>
+              <a:t>1/27/2015</a:t>
             </a:fld>
             <a:endParaRPr lang="en-US"/>
           </a:p>
@@ -1056,7 +1057,7 @@
           <a:p>
             <a:fld id="{844C98E4-C9EE-4E87-AFEC-1BE23205BC3C}" type="datetimeFigureOut">
               <a:rPr lang="en-US" smtClean="0"/>
-              <a:t>1/26/2015</a:t>
+              <a:t>1/27/2015</a:t>
             </a:fld>
             <a:endParaRPr lang="en-US"/>
           </a:p>
@@ -1226,7 +1227,7 @@
           <a:p>
             <a:fld id="{844C98E4-C9EE-4E87-AFEC-1BE23205BC3C}" type="datetimeFigureOut">
               <a:rPr lang="en-US" smtClean="0"/>
-              <a:t>1/26/2015</a:t>
+              <a:t>1/27/2015</a:t>
             </a:fld>
             <a:endParaRPr lang="en-US"/>
           </a:p>
@@ -1472,7 +1473,7 @@
           <a:p>
             <a:fld id="{844C98E4-C9EE-4E87-AFEC-1BE23205BC3C}" type="datetimeFigureOut">
               <a:rPr lang="en-US" smtClean="0"/>
-              <a:t>1/26/2015</a:t>
+              <a:t>1/27/2015</a:t>
             </a:fld>
             <a:endParaRPr lang="en-US"/>
           </a:p>
@@ -1704,7 +1705,7 @@
           <a:p>
             <a:fld id="{844C98E4-C9EE-4E87-AFEC-1BE23205BC3C}" type="datetimeFigureOut">
               <a:rPr lang="en-US" smtClean="0"/>
-              <a:t>1/26/2015</a:t>
+              <a:t>1/27/2015</a:t>
             </a:fld>
             <a:endParaRPr lang="en-US"/>
           </a:p>
@@ -2071,7 +2072,7 @@
           <a:p>
             <a:fld id="{844C98E4-C9EE-4E87-AFEC-1BE23205BC3C}" type="datetimeFigureOut">
               <a:rPr lang="en-US" smtClean="0"/>
-              <a:t>1/26/2015</a:t>
+              <a:t>1/27/2015</a:t>
             </a:fld>
             <a:endParaRPr lang="en-US"/>
           </a:p>
@@ -2189,7 +2190,7 @@
           <a:p>
             <a:fld id="{844C98E4-C9EE-4E87-AFEC-1BE23205BC3C}" type="datetimeFigureOut">
               <a:rPr lang="en-US" smtClean="0"/>
-              <a:t>1/26/2015</a:t>
+              <a:t>1/27/2015</a:t>
             </a:fld>
             <a:endParaRPr lang="en-US"/>
           </a:p>
@@ -2284,7 +2285,7 @@
           <a:p>
             <a:fld id="{844C98E4-C9EE-4E87-AFEC-1BE23205BC3C}" type="datetimeFigureOut">
               <a:rPr lang="en-US" smtClean="0"/>
-              <a:t>1/26/2015</a:t>
+              <a:t>1/27/2015</a:t>
             </a:fld>
             <a:endParaRPr lang="en-US"/>
           </a:p>
@@ -2561,7 +2562,7 @@
           <a:p>
             <a:fld id="{844C98E4-C9EE-4E87-AFEC-1BE23205BC3C}" type="datetimeFigureOut">
               <a:rPr lang="en-US" smtClean="0"/>
-              <a:t>1/26/2015</a:t>
+              <a:t>1/27/2015</a:t>
             </a:fld>
             <a:endParaRPr lang="en-US"/>
           </a:p>
@@ -2814,7 +2815,7 @@
           <a:p>
             <a:fld id="{844C98E4-C9EE-4E87-AFEC-1BE23205BC3C}" type="datetimeFigureOut">
               <a:rPr lang="en-US" smtClean="0"/>
-              <a:t>1/26/2015</a:t>
+              <a:t>1/27/2015</a:t>
             </a:fld>
             <a:endParaRPr lang="en-US"/>
           </a:p>
@@ -3027,7 +3028,7 @@
           <a:p>
             <a:fld id="{844C98E4-C9EE-4E87-AFEC-1BE23205BC3C}" type="datetimeFigureOut">
               <a:rPr lang="en-US" smtClean="0"/>
-              <a:t>1/26/2015</a:t>
+              <a:t>1/27/2015</a:t>
             </a:fld>
             <a:endParaRPr lang="en-US"/>
           </a:p>
@@ -12338,6 +12339,666 @@
     <p:extLst>
       <p:ext uri="{BB962C8B-B14F-4D97-AF65-F5344CB8AC3E}">
         <p14:creationId xmlns:p14="http://schemas.microsoft.com/office/powerpoint/2010/main" val="718796236"/>
+      </p:ext>
+    </p:extLst>
+  </p:cSld>
+  <p:clrMapOvr>
+    <a:masterClrMapping/>
+  </p:clrMapOvr>
+  <p:timing>
+    <p:tnLst>
+      <p:par>
+        <p:cTn id="1" dur="indefinite" restart="never" nodeType="tmRoot"/>
+      </p:par>
+    </p:tnLst>
+  </p:timing>
+</p:sld>
+</file>
+
+<file path=ppt/slides/slide17.xml><?xml version="1.0" encoding="utf-8"?>
+<p:sld xmlns:a="http://schemas.openxmlformats.org/drawingml/2006/main" xmlns:r="http://schemas.openxmlformats.org/officeDocument/2006/relationships" xmlns:p="http://schemas.openxmlformats.org/presentationml/2006/main">
+  <p:cSld>
+    <p:spTree>
+      <p:nvGrpSpPr>
+        <p:cNvPr id="1" name=""/>
+        <p:cNvGrpSpPr/>
+        <p:nvPr/>
+      </p:nvGrpSpPr>
+      <p:grpSpPr>
+        <a:xfrm>
+          <a:off x="0" y="0"/>
+          <a:ext cx="0" cy="0"/>
+          <a:chOff x="0" y="0"/>
+          <a:chExt cx="0" cy="0"/>
+        </a:xfrm>
+      </p:grpSpPr>
+      <p:sp>
+        <p:nvSpPr>
+          <p:cNvPr id="2" name="Rectangle 1"/>
+          <p:cNvSpPr/>
+          <p:nvPr/>
+        </p:nvSpPr>
+        <p:spPr>
+          <a:xfrm>
+            <a:off x="676274" y="3952875"/>
+            <a:ext cx="1190626" cy="466725"/>
+          </a:xfrm>
+          <a:prstGeom prst="rect">
+            <a:avLst/>
+          </a:prstGeom>
+          <a:noFill/>
+          <a:ln w="19050">
+            <a:solidFill>
+              <a:schemeClr val="tx1"/>
+            </a:solidFill>
+          </a:ln>
+        </p:spPr>
+        <p:style>
+          <a:lnRef idx="2">
+            <a:schemeClr val="accent1">
+              <a:shade val="50000"/>
+            </a:schemeClr>
+          </a:lnRef>
+          <a:fillRef idx="1">
+            <a:schemeClr val="accent1"/>
+          </a:fillRef>
+          <a:effectRef idx="0">
+            <a:schemeClr val="accent1"/>
+          </a:effectRef>
+          <a:fontRef idx="minor">
+            <a:schemeClr val="lt1"/>
+          </a:fontRef>
+        </p:style>
+        <p:txBody>
+          <a:bodyPr rtlCol="0" anchor="ctr"/>
+          <a:lstStyle/>
+          <a:p>
+            <a:pPr algn="ctr"/>
+            <a:r>
+              <a:rPr lang="en-US" sz="1100" b="1" dirty="0" smtClean="0">
+                <a:solidFill>
+                  <a:schemeClr val="tx1"/>
+                </a:solidFill>
+                <a:latin typeface="Times New Roman" panose="02020603050405020304" pitchFamily="18" charset="0"/>
+                <a:cs typeface="Times New Roman" panose="02020603050405020304" pitchFamily="18" charset="0"/>
+              </a:rPr>
+              <a:t>Communication </a:t>
+            </a:r>
+          </a:p>
+          <a:p>
+            <a:pPr algn="ctr"/>
+            <a:r>
+              <a:rPr lang="en-US" sz="1100" b="1" dirty="0" smtClean="0">
+                <a:solidFill>
+                  <a:schemeClr val="tx1"/>
+                </a:solidFill>
+                <a:latin typeface="Times New Roman" panose="02020603050405020304" pitchFamily="18" charset="0"/>
+                <a:cs typeface="Times New Roman" panose="02020603050405020304" pitchFamily="18" charset="0"/>
+              </a:rPr>
+              <a:t>device</a:t>
+            </a:r>
+            <a:endParaRPr lang="en-US" sz="1100" b="1" dirty="0">
+              <a:solidFill>
+                <a:schemeClr val="tx1"/>
+              </a:solidFill>
+              <a:latin typeface="Times New Roman" panose="02020603050405020304" pitchFamily="18" charset="0"/>
+              <a:cs typeface="Times New Roman" panose="02020603050405020304" pitchFamily="18" charset="0"/>
+            </a:endParaRPr>
+          </a:p>
+        </p:txBody>
+      </p:sp>
+      <p:sp>
+        <p:nvSpPr>
+          <p:cNvPr id="3" name="Rectangle 2"/>
+          <p:cNvSpPr/>
+          <p:nvPr/>
+        </p:nvSpPr>
+        <p:spPr>
+          <a:xfrm>
+            <a:off x="3486149" y="3952874"/>
+            <a:ext cx="1190626" cy="466725"/>
+          </a:xfrm>
+          <a:prstGeom prst="rect">
+            <a:avLst/>
+          </a:prstGeom>
+          <a:noFill/>
+          <a:ln w="19050">
+            <a:solidFill>
+              <a:schemeClr val="tx1"/>
+            </a:solidFill>
+          </a:ln>
+        </p:spPr>
+        <p:style>
+          <a:lnRef idx="2">
+            <a:schemeClr val="accent1">
+              <a:shade val="50000"/>
+            </a:schemeClr>
+          </a:lnRef>
+          <a:fillRef idx="1">
+            <a:schemeClr val="accent1"/>
+          </a:fillRef>
+          <a:effectRef idx="0">
+            <a:schemeClr val="accent1"/>
+          </a:effectRef>
+          <a:fontRef idx="minor">
+            <a:schemeClr val="lt1"/>
+          </a:fontRef>
+        </p:style>
+        <p:txBody>
+          <a:bodyPr rtlCol="0" anchor="ctr"/>
+          <a:lstStyle/>
+          <a:p>
+            <a:pPr algn="ctr"/>
+            <a:r>
+              <a:rPr lang="en-US" sz="1100" b="1" dirty="0" smtClean="0">
+                <a:solidFill>
+                  <a:schemeClr val="tx1"/>
+                </a:solidFill>
+                <a:latin typeface="Times New Roman" panose="02020603050405020304" pitchFamily="18" charset="0"/>
+                <a:cs typeface="Times New Roman" panose="02020603050405020304" pitchFamily="18" charset="0"/>
+              </a:rPr>
+              <a:t>Sensor(s</a:t>
+            </a:r>
+            <a:r>
+              <a:rPr lang="en-US" sz="1100" b="1" dirty="0" smtClean="0">
+                <a:solidFill>
+                  <a:schemeClr val="tx1"/>
+                </a:solidFill>
+                <a:latin typeface="Times New Roman" panose="02020603050405020304" pitchFamily="18" charset="0"/>
+                <a:cs typeface="Times New Roman" panose="02020603050405020304" pitchFamily="18" charset="0"/>
+              </a:rPr>
+              <a:t>)</a:t>
+            </a:r>
+            <a:endParaRPr lang="en-US" sz="1100" b="1" dirty="0" smtClean="0">
+              <a:solidFill>
+                <a:schemeClr val="tx1"/>
+              </a:solidFill>
+              <a:latin typeface="Times New Roman" panose="02020603050405020304" pitchFamily="18" charset="0"/>
+              <a:cs typeface="Times New Roman" panose="02020603050405020304" pitchFamily="18" charset="0"/>
+            </a:endParaRPr>
+          </a:p>
+        </p:txBody>
+      </p:sp>
+      <p:sp>
+        <p:nvSpPr>
+          <p:cNvPr id="4" name="Rectangle 3"/>
+          <p:cNvSpPr/>
+          <p:nvPr/>
+        </p:nvSpPr>
+        <p:spPr>
+          <a:xfrm>
+            <a:off x="2081211" y="3203898"/>
+            <a:ext cx="1190626" cy="333374"/>
+          </a:xfrm>
+          <a:prstGeom prst="rect">
+            <a:avLst/>
+          </a:prstGeom>
+          <a:noFill/>
+          <a:ln w="19050">
+            <a:solidFill>
+              <a:schemeClr val="tx1"/>
+            </a:solidFill>
+          </a:ln>
+        </p:spPr>
+        <p:style>
+          <a:lnRef idx="2">
+            <a:schemeClr val="accent1">
+              <a:shade val="50000"/>
+            </a:schemeClr>
+          </a:lnRef>
+          <a:fillRef idx="1">
+            <a:schemeClr val="accent1"/>
+          </a:fillRef>
+          <a:effectRef idx="0">
+            <a:schemeClr val="accent1"/>
+          </a:effectRef>
+          <a:fontRef idx="minor">
+            <a:schemeClr val="lt1"/>
+          </a:fontRef>
+        </p:style>
+        <p:txBody>
+          <a:bodyPr rtlCol="0" anchor="ctr"/>
+          <a:lstStyle/>
+          <a:p>
+            <a:pPr algn="ctr"/>
+            <a:r>
+              <a:rPr lang="en-US" sz="1100" b="1" dirty="0" smtClean="0">
+                <a:solidFill>
+                  <a:schemeClr val="tx1"/>
+                </a:solidFill>
+                <a:latin typeface="Times New Roman" panose="02020603050405020304" pitchFamily="18" charset="0"/>
+                <a:cs typeface="Times New Roman" panose="02020603050405020304" pitchFamily="18" charset="0"/>
+              </a:rPr>
+              <a:t>Memory</a:t>
+            </a:r>
+            <a:endParaRPr lang="en-US" sz="1100" b="1" dirty="0">
+              <a:solidFill>
+                <a:schemeClr val="tx1"/>
+              </a:solidFill>
+              <a:latin typeface="Times New Roman" panose="02020603050405020304" pitchFamily="18" charset="0"/>
+              <a:cs typeface="Times New Roman" panose="02020603050405020304" pitchFamily="18" charset="0"/>
+            </a:endParaRPr>
+          </a:p>
+        </p:txBody>
+      </p:sp>
+      <p:sp>
+        <p:nvSpPr>
+          <p:cNvPr id="5" name="Rectangle 4"/>
+          <p:cNvSpPr/>
+          <p:nvPr/>
+        </p:nvSpPr>
+        <p:spPr>
+          <a:xfrm>
+            <a:off x="2081211" y="3952874"/>
+            <a:ext cx="1190624" cy="466725"/>
+          </a:xfrm>
+          <a:prstGeom prst="rect">
+            <a:avLst/>
+          </a:prstGeom>
+          <a:noFill/>
+          <a:ln w="19050">
+            <a:solidFill>
+              <a:schemeClr val="tx1"/>
+            </a:solidFill>
+          </a:ln>
+        </p:spPr>
+        <p:style>
+          <a:lnRef idx="2">
+            <a:schemeClr val="accent1">
+              <a:shade val="50000"/>
+            </a:schemeClr>
+          </a:lnRef>
+          <a:fillRef idx="1">
+            <a:schemeClr val="accent1"/>
+          </a:fillRef>
+          <a:effectRef idx="0">
+            <a:schemeClr val="accent1"/>
+          </a:effectRef>
+          <a:fontRef idx="minor">
+            <a:schemeClr val="lt1"/>
+          </a:fontRef>
+        </p:style>
+        <p:txBody>
+          <a:bodyPr rtlCol="0" anchor="ctr"/>
+          <a:lstStyle/>
+          <a:p>
+            <a:pPr algn="ctr"/>
+            <a:r>
+              <a:rPr lang="en-US" sz="1100" b="1" dirty="0" smtClean="0">
+                <a:solidFill>
+                  <a:schemeClr val="tx1"/>
+                </a:solidFill>
+                <a:latin typeface="Times New Roman" panose="02020603050405020304" pitchFamily="18" charset="0"/>
+                <a:cs typeface="Times New Roman" panose="02020603050405020304" pitchFamily="18" charset="0"/>
+              </a:rPr>
+              <a:t>Controller</a:t>
+            </a:r>
+            <a:endParaRPr lang="en-US" sz="1100" b="1" dirty="0">
+              <a:solidFill>
+                <a:schemeClr val="tx1"/>
+              </a:solidFill>
+              <a:latin typeface="Times New Roman" panose="02020603050405020304" pitchFamily="18" charset="0"/>
+              <a:cs typeface="Times New Roman" panose="02020603050405020304" pitchFamily="18" charset="0"/>
+            </a:endParaRPr>
+          </a:p>
+        </p:txBody>
+      </p:sp>
+      <p:sp>
+        <p:nvSpPr>
+          <p:cNvPr id="6" name="Rectangle 5"/>
+          <p:cNvSpPr/>
+          <p:nvPr/>
+        </p:nvSpPr>
+        <p:spPr>
+          <a:xfrm>
+            <a:off x="2081211" y="4917426"/>
+            <a:ext cx="1190624" cy="311798"/>
+          </a:xfrm>
+          <a:prstGeom prst="rect">
+            <a:avLst/>
+          </a:prstGeom>
+          <a:noFill/>
+          <a:ln w="19050">
+            <a:solidFill>
+              <a:schemeClr val="tx1"/>
+            </a:solidFill>
+          </a:ln>
+        </p:spPr>
+        <p:style>
+          <a:lnRef idx="2">
+            <a:schemeClr val="accent1">
+              <a:shade val="50000"/>
+            </a:schemeClr>
+          </a:lnRef>
+          <a:fillRef idx="1">
+            <a:schemeClr val="accent1"/>
+          </a:fillRef>
+          <a:effectRef idx="0">
+            <a:schemeClr val="accent1"/>
+          </a:effectRef>
+          <a:fontRef idx="minor">
+            <a:schemeClr val="lt1"/>
+          </a:fontRef>
+        </p:style>
+        <p:txBody>
+          <a:bodyPr rtlCol="0" anchor="ctr"/>
+          <a:lstStyle/>
+          <a:p>
+            <a:pPr algn="ctr"/>
+            <a:r>
+              <a:rPr lang="en-US" sz="1100" b="1" dirty="0" smtClean="0">
+                <a:solidFill>
+                  <a:schemeClr val="tx1"/>
+                </a:solidFill>
+                <a:latin typeface="Times New Roman" panose="02020603050405020304" pitchFamily="18" charset="0"/>
+                <a:cs typeface="Times New Roman" panose="02020603050405020304" pitchFamily="18" charset="0"/>
+              </a:rPr>
+              <a:t>Power supply</a:t>
+            </a:r>
+            <a:endParaRPr lang="en-US" sz="1100" b="1" dirty="0">
+              <a:solidFill>
+                <a:schemeClr val="tx1"/>
+              </a:solidFill>
+              <a:latin typeface="Times New Roman" panose="02020603050405020304" pitchFamily="18" charset="0"/>
+              <a:cs typeface="Times New Roman" panose="02020603050405020304" pitchFamily="18" charset="0"/>
+            </a:endParaRPr>
+          </a:p>
+        </p:txBody>
+      </p:sp>
+      <p:cxnSp>
+        <p:nvCxnSpPr>
+          <p:cNvPr id="8" name="Straight Connector 7"/>
+          <p:cNvCxnSpPr>
+            <a:stCxn id="2" idx="2"/>
+          </p:cNvCxnSpPr>
+          <p:nvPr/>
+        </p:nvCxnSpPr>
+        <p:spPr>
+          <a:xfrm>
+            <a:off x="1271587" y="4419600"/>
+            <a:ext cx="0" cy="609600"/>
+          </a:xfrm>
+          <a:prstGeom prst="line">
+            <a:avLst/>
+          </a:prstGeom>
+          <a:ln w="19050">
+            <a:solidFill>
+              <a:schemeClr val="tx1"/>
+            </a:solidFill>
+          </a:ln>
+        </p:spPr>
+        <p:style>
+          <a:lnRef idx="1">
+            <a:schemeClr val="accent1"/>
+          </a:lnRef>
+          <a:fillRef idx="0">
+            <a:schemeClr val="accent1"/>
+          </a:fillRef>
+          <a:effectRef idx="0">
+            <a:schemeClr val="accent1"/>
+          </a:effectRef>
+          <a:fontRef idx="minor">
+            <a:schemeClr val="tx1"/>
+          </a:fontRef>
+        </p:style>
+      </p:cxnSp>
+      <p:cxnSp>
+        <p:nvCxnSpPr>
+          <p:cNvPr id="9" name="Straight Connector 8"/>
+          <p:cNvCxnSpPr/>
+          <p:nvPr/>
+        </p:nvCxnSpPr>
+        <p:spPr>
+          <a:xfrm flipH="1" flipV="1">
+            <a:off x="1271587" y="5029200"/>
+            <a:ext cx="809624" cy="2"/>
+          </a:xfrm>
+          <a:prstGeom prst="line">
+            <a:avLst/>
+          </a:prstGeom>
+          <a:ln w="19050">
+            <a:solidFill>
+              <a:schemeClr val="tx1"/>
+            </a:solidFill>
+          </a:ln>
+        </p:spPr>
+        <p:style>
+          <a:lnRef idx="1">
+            <a:schemeClr val="accent1"/>
+          </a:lnRef>
+          <a:fillRef idx="0">
+            <a:schemeClr val="accent1"/>
+          </a:fillRef>
+          <a:effectRef idx="0">
+            <a:schemeClr val="accent1"/>
+          </a:effectRef>
+          <a:fontRef idx="minor">
+            <a:schemeClr val="tx1"/>
+          </a:fontRef>
+        </p:style>
+      </p:cxnSp>
+      <p:cxnSp>
+        <p:nvCxnSpPr>
+          <p:cNvPr id="15" name="Straight Connector 14"/>
+          <p:cNvCxnSpPr>
+            <a:endCxn id="6" idx="0"/>
+          </p:cNvCxnSpPr>
+          <p:nvPr/>
+        </p:nvCxnSpPr>
+        <p:spPr>
+          <a:xfrm flipH="1">
+            <a:off x="2676523" y="4419599"/>
+            <a:ext cx="2" cy="497827"/>
+          </a:xfrm>
+          <a:prstGeom prst="line">
+            <a:avLst/>
+          </a:prstGeom>
+          <a:ln w="19050">
+            <a:solidFill>
+              <a:schemeClr val="tx1"/>
+            </a:solidFill>
+          </a:ln>
+        </p:spPr>
+        <p:style>
+          <a:lnRef idx="1">
+            <a:schemeClr val="accent1"/>
+          </a:lnRef>
+          <a:fillRef idx="0">
+            <a:schemeClr val="accent1"/>
+          </a:fillRef>
+          <a:effectRef idx="0">
+            <a:schemeClr val="accent1"/>
+          </a:effectRef>
+          <a:fontRef idx="minor">
+            <a:schemeClr val="tx1"/>
+          </a:fontRef>
+        </p:style>
+      </p:cxnSp>
+      <p:cxnSp>
+        <p:nvCxnSpPr>
+          <p:cNvPr id="17" name="Straight Connector 16"/>
+          <p:cNvCxnSpPr>
+            <a:stCxn id="4" idx="2"/>
+            <a:endCxn id="5" idx="0"/>
+          </p:cNvCxnSpPr>
+          <p:nvPr/>
+        </p:nvCxnSpPr>
+        <p:spPr>
+          <a:xfrm flipH="1">
+            <a:off x="2676523" y="3537272"/>
+            <a:ext cx="1" cy="415602"/>
+          </a:xfrm>
+          <a:prstGeom prst="line">
+            <a:avLst/>
+          </a:prstGeom>
+          <a:ln w="19050">
+            <a:solidFill>
+              <a:schemeClr val="tx1"/>
+            </a:solidFill>
+          </a:ln>
+        </p:spPr>
+        <p:style>
+          <a:lnRef idx="1">
+            <a:schemeClr val="accent1"/>
+          </a:lnRef>
+          <a:fillRef idx="0">
+            <a:schemeClr val="accent1"/>
+          </a:fillRef>
+          <a:effectRef idx="0">
+            <a:schemeClr val="accent1"/>
+          </a:effectRef>
+          <a:fontRef idx="minor">
+            <a:schemeClr val="tx1"/>
+          </a:fontRef>
+        </p:style>
+      </p:cxnSp>
+      <p:cxnSp>
+        <p:nvCxnSpPr>
+          <p:cNvPr id="19" name="Straight Connector 18"/>
+          <p:cNvCxnSpPr/>
+          <p:nvPr/>
+        </p:nvCxnSpPr>
+        <p:spPr>
+          <a:xfrm>
+            <a:off x="4081460" y="4419600"/>
+            <a:ext cx="0" cy="609600"/>
+          </a:xfrm>
+          <a:prstGeom prst="line">
+            <a:avLst/>
+          </a:prstGeom>
+          <a:ln w="19050">
+            <a:solidFill>
+              <a:schemeClr val="tx1"/>
+            </a:solidFill>
+          </a:ln>
+        </p:spPr>
+        <p:style>
+          <a:lnRef idx="1">
+            <a:schemeClr val="accent1"/>
+          </a:lnRef>
+          <a:fillRef idx="0">
+            <a:schemeClr val="accent1"/>
+          </a:fillRef>
+          <a:effectRef idx="0">
+            <a:schemeClr val="accent1"/>
+          </a:effectRef>
+          <a:fontRef idx="minor">
+            <a:schemeClr val="tx1"/>
+          </a:fontRef>
+        </p:style>
+      </p:cxnSp>
+      <p:cxnSp>
+        <p:nvCxnSpPr>
+          <p:cNvPr id="24" name="Straight Connector 23"/>
+          <p:cNvCxnSpPr/>
+          <p:nvPr/>
+        </p:nvCxnSpPr>
+        <p:spPr>
+          <a:xfrm flipH="1" flipV="1">
+            <a:off x="3271837" y="5029198"/>
+            <a:ext cx="809624" cy="2"/>
+          </a:xfrm>
+          <a:prstGeom prst="line">
+            <a:avLst/>
+          </a:prstGeom>
+          <a:ln w="19050">
+            <a:solidFill>
+              <a:schemeClr val="tx1"/>
+            </a:solidFill>
+          </a:ln>
+        </p:spPr>
+        <p:style>
+          <a:lnRef idx="1">
+            <a:schemeClr val="accent1"/>
+          </a:lnRef>
+          <a:fillRef idx="0">
+            <a:schemeClr val="accent1"/>
+          </a:fillRef>
+          <a:effectRef idx="0">
+            <a:schemeClr val="accent1"/>
+          </a:effectRef>
+          <a:fontRef idx="minor">
+            <a:schemeClr val="tx1"/>
+          </a:fontRef>
+        </p:style>
+      </p:cxnSp>
+      <p:cxnSp>
+        <p:nvCxnSpPr>
+          <p:cNvPr id="12" name="Straight Connector 11"/>
+          <p:cNvCxnSpPr>
+            <a:stCxn id="2" idx="3"/>
+            <a:endCxn id="5" idx="1"/>
+          </p:cNvCxnSpPr>
+          <p:nvPr/>
+        </p:nvCxnSpPr>
+        <p:spPr>
+          <a:xfrm flipV="1">
+            <a:off x="1866900" y="4186237"/>
+            <a:ext cx="214311" cy="1"/>
+          </a:xfrm>
+          <a:prstGeom prst="line">
+            <a:avLst/>
+          </a:prstGeom>
+          <a:ln w="19050">
+            <a:solidFill>
+              <a:schemeClr val="tx1"/>
+            </a:solidFill>
+          </a:ln>
+        </p:spPr>
+        <p:style>
+          <a:lnRef idx="1">
+            <a:schemeClr val="accent1"/>
+          </a:lnRef>
+          <a:fillRef idx="0">
+            <a:schemeClr val="accent1"/>
+          </a:fillRef>
+          <a:effectRef idx="0">
+            <a:schemeClr val="accent1"/>
+          </a:effectRef>
+          <a:fontRef idx="minor">
+            <a:schemeClr val="tx1"/>
+          </a:fontRef>
+        </p:style>
+      </p:cxnSp>
+      <p:cxnSp>
+        <p:nvCxnSpPr>
+          <p:cNvPr id="18" name="Straight Connector 17"/>
+          <p:cNvCxnSpPr/>
+          <p:nvPr/>
+        </p:nvCxnSpPr>
+        <p:spPr>
+          <a:xfrm flipV="1">
+            <a:off x="3271835" y="4198771"/>
+            <a:ext cx="214311" cy="1"/>
+          </a:xfrm>
+          <a:prstGeom prst="line">
+            <a:avLst/>
+          </a:prstGeom>
+          <a:ln w="19050">
+            <a:solidFill>
+              <a:schemeClr val="tx1"/>
+            </a:solidFill>
+          </a:ln>
+        </p:spPr>
+        <p:style>
+          <a:lnRef idx="1">
+            <a:schemeClr val="accent1"/>
+          </a:lnRef>
+          <a:fillRef idx="0">
+            <a:schemeClr val="accent1"/>
+          </a:fillRef>
+          <a:effectRef idx="0">
+            <a:schemeClr val="accent1"/>
+          </a:effectRef>
+          <a:fontRef idx="minor">
+            <a:schemeClr val="tx1"/>
+          </a:fontRef>
+        </p:style>
+      </p:cxnSp>
+    </p:spTree>
+    <p:extLst>
+      <p:ext uri="{BB962C8B-B14F-4D97-AF65-F5344CB8AC3E}">
+        <p14:creationId xmlns:p14="http://schemas.microsoft.com/office/powerpoint/2010/main" val="4152046690"/>
       </p:ext>
     </p:extLst>
   </p:cSld>

</xml_diff>

<commit_message>
adds more to our ptocol
</commit_message>
<xml_diff>
--- a/images/pics.pptx
+++ b/images/pics.pptx
@@ -5,7 +5,7 @@
     <p:sldMasterId id="2147483648" r:id="rId1"/>
   </p:sldMasterIdLst>
   <p:notesMasterIdLst>
-    <p:notesMasterId r:id="rId28"/>
+    <p:notesMasterId r:id="rId29"/>
   </p:notesMasterIdLst>
   <p:sldIdLst>
     <p:sldId id="257" r:id="rId2"/>
@@ -34,6 +34,7 @@
     <p:sldId id="274" r:id="rId25"/>
     <p:sldId id="279" r:id="rId26"/>
     <p:sldId id="283" r:id="rId27"/>
+    <p:sldId id="285" r:id="rId28"/>
   </p:sldIdLst>
   <p:sldSz cx="12192000" cy="6858000"/>
   <p:notesSz cx="6858000" cy="9144000"/>
@@ -233,7 +234,7 @@
           <a:p>
             <a:fld id="{4FF7AF54-2AD9-468C-807B-634631568B63}" type="datetimeFigureOut">
               <a:rPr lang="en-US" smtClean="0"/>
-              <a:t>2/9/2015</a:t>
+              <a:t>2/16/2015</a:t>
             </a:fld>
             <a:endParaRPr lang="en-US"/>
           </a:p>
@@ -716,7 +717,7 @@
           <a:p>
             <a:fld id="{844C98E4-C9EE-4E87-AFEC-1BE23205BC3C}" type="datetimeFigureOut">
               <a:rPr lang="en-US" smtClean="0"/>
-              <a:t>2/9/2015</a:t>
+              <a:t>2/16/2015</a:t>
             </a:fld>
             <a:endParaRPr lang="en-US"/>
           </a:p>
@@ -886,7 +887,7 @@
           <a:p>
             <a:fld id="{844C98E4-C9EE-4E87-AFEC-1BE23205BC3C}" type="datetimeFigureOut">
               <a:rPr lang="en-US" smtClean="0"/>
-              <a:t>2/9/2015</a:t>
+              <a:t>2/16/2015</a:t>
             </a:fld>
             <a:endParaRPr lang="en-US"/>
           </a:p>
@@ -1066,7 +1067,7 @@
           <a:p>
             <a:fld id="{844C98E4-C9EE-4E87-AFEC-1BE23205BC3C}" type="datetimeFigureOut">
               <a:rPr lang="en-US" smtClean="0"/>
-              <a:t>2/9/2015</a:t>
+              <a:t>2/16/2015</a:t>
             </a:fld>
             <a:endParaRPr lang="en-US"/>
           </a:p>
@@ -1236,7 +1237,7 @@
           <a:p>
             <a:fld id="{844C98E4-C9EE-4E87-AFEC-1BE23205BC3C}" type="datetimeFigureOut">
               <a:rPr lang="en-US" smtClean="0"/>
-              <a:t>2/9/2015</a:t>
+              <a:t>2/16/2015</a:t>
             </a:fld>
             <a:endParaRPr lang="en-US"/>
           </a:p>
@@ -1482,7 +1483,7 @@
           <a:p>
             <a:fld id="{844C98E4-C9EE-4E87-AFEC-1BE23205BC3C}" type="datetimeFigureOut">
               <a:rPr lang="en-US" smtClean="0"/>
-              <a:t>2/9/2015</a:t>
+              <a:t>2/16/2015</a:t>
             </a:fld>
             <a:endParaRPr lang="en-US"/>
           </a:p>
@@ -1714,7 +1715,7 @@
           <a:p>
             <a:fld id="{844C98E4-C9EE-4E87-AFEC-1BE23205BC3C}" type="datetimeFigureOut">
               <a:rPr lang="en-US" smtClean="0"/>
-              <a:t>2/9/2015</a:t>
+              <a:t>2/16/2015</a:t>
             </a:fld>
             <a:endParaRPr lang="en-US"/>
           </a:p>
@@ -2081,7 +2082,7 @@
           <a:p>
             <a:fld id="{844C98E4-C9EE-4E87-AFEC-1BE23205BC3C}" type="datetimeFigureOut">
               <a:rPr lang="en-US" smtClean="0"/>
-              <a:t>2/9/2015</a:t>
+              <a:t>2/16/2015</a:t>
             </a:fld>
             <a:endParaRPr lang="en-US"/>
           </a:p>
@@ -2199,7 +2200,7 @@
           <a:p>
             <a:fld id="{844C98E4-C9EE-4E87-AFEC-1BE23205BC3C}" type="datetimeFigureOut">
               <a:rPr lang="en-US" smtClean="0"/>
-              <a:t>2/9/2015</a:t>
+              <a:t>2/16/2015</a:t>
             </a:fld>
             <a:endParaRPr lang="en-US"/>
           </a:p>
@@ -2294,7 +2295,7 @@
           <a:p>
             <a:fld id="{844C98E4-C9EE-4E87-AFEC-1BE23205BC3C}" type="datetimeFigureOut">
               <a:rPr lang="en-US" smtClean="0"/>
-              <a:t>2/9/2015</a:t>
+              <a:t>2/16/2015</a:t>
             </a:fld>
             <a:endParaRPr lang="en-US"/>
           </a:p>
@@ -2571,7 +2572,7 @@
           <a:p>
             <a:fld id="{844C98E4-C9EE-4E87-AFEC-1BE23205BC3C}" type="datetimeFigureOut">
               <a:rPr lang="en-US" smtClean="0"/>
-              <a:t>2/9/2015</a:t>
+              <a:t>2/16/2015</a:t>
             </a:fld>
             <a:endParaRPr lang="en-US"/>
           </a:p>
@@ -2824,7 +2825,7 @@
           <a:p>
             <a:fld id="{844C98E4-C9EE-4E87-AFEC-1BE23205BC3C}" type="datetimeFigureOut">
               <a:rPr lang="en-US" smtClean="0"/>
-              <a:t>2/9/2015</a:t>
+              <a:t>2/16/2015</a:t>
             </a:fld>
             <a:endParaRPr lang="en-US"/>
           </a:p>
@@ -3037,7 +3038,7 @@
           <a:p>
             <a:fld id="{844C98E4-C9EE-4E87-AFEC-1BE23205BC3C}" type="datetimeFigureOut">
               <a:rPr lang="en-US" smtClean="0"/>
-              <a:t>2/9/2015</a:t>
+              <a:t>2/16/2015</a:t>
             </a:fld>
             <a:endParaRPr lang="en-US"/>
           </a:p>
@@ -26589,6 +26590,1670 @@
     <p:extLst>
       <p:ext uri="{BB962C8B-B14F-4D97-AF65-F5344CB8AC3E}">
         <p14:creationId xmlns:p14="http://schemas.microsoft.com/office/powerpoint/2010/main" val="1841215657"/>
+      </p:ext>
+    </p:extLst>
+  </p:cSld>
+  <p:clrMapOvr>
+    <a:masterClrMapping/>
+  </p:clrMapOvr>
+  <p:timing>
+    <p:tnLst>
+      <p:par>
+        <p:cTn id="1" dur="indefinite" restart="never" nodeType="tmRoot"/>
+      </p:par>
+    </p:tnLst>
+  </p:timing>
+</p:sld>
+</file>
+
+<file path=ppt/slides/slide27.xml><?xml version="1.0" encoding="utf-8"?>
+<p:sld xmlns:a="http://schemas.openxmlformats.org/drawingml/2006/main" xmlns:r="http://schemas.openxmlformats.org/officeDocument/2006/relationships" xmlns:p="http://schemas.openxmlformats.org/presentationml/2006/main">
+  <p:cSld>
+    <p:spTree>
+      <p:nvGrpSpPr>
+        <p:cNvPr id="1" name=""/>
+        <p:cNvGrpSpPr/>
+        <p:nvPr/>
+      </p:nvGrpSpPr>
+      <p:grpSpPr>
+        <a:xfrm>
+          <a:off x="0" y="0"/>
+          <a:ext cx="0" cy="0"/>
+          <a:chOff x="0" y="0"/>
+          <a:chExt cx="0" cy="0"/>
+        </a:xfrm>
+      </p:grpSpPr>
+      <p:sp>
+        <p:nvSpPr>
+          <p:cNvPr id="2" name="Oval 1"/>
+          <p:cNvSpPr/>
+          <p:nvPr/>
+        </p:nvSpPr>
+        <p:spPr>
+          <a:xfrm>
+            <a:off x="143884" y="6249670"/>
+            <a:ext cx="457200" cy="457200"/>
+          </a:xfrm>
+          <a:prstGeom prst="ellipse">
+            <a:avLst/>
+          </a:prstGeom>
+          <a:noFill/>
+          <a:ln w="19050">
+            <a:solidFill>
+              <a:schemeClr val="tx1"/>
+            </a:solidFill>
+          </a:ln>
+        </p:spPr>
+        <p:style>
+          <a:lnRef idx="2">
+            <a:schemeClr val="accent1">
+              <a:shade val="50000"/>
+            </a:schemeClr>
+          </a:lnRef>
+          <a:fillRef idx="1">
+            <a:schemeClr val="accent1"/>
+          </a:fillRef>
+          <a:effectRef idx="0">
+            <a:schemeClr val="accent1"/>
+          </a:effectRef>
+          <a:fontRef idx="minor">
+            <a:schemeClr val="lt1"/>
+          </a:fontRef>
+        </p:style>
+        <p:txBody>
+          <a:bodyPr rot="0" spcFirstLastPara="0" vert="horz" wrap="square" lIns="91440" tIns="45720" rIns="91440" bIns="45720" numCol="1" spcCol="0" rtlCol="0" fromWordArt="0" anchor="ctr" anchorCtr="0" forceAA="0" compatLnSpc="1">
+            <a:prstTxWarp prst="textNoShape">
+              <a:avLst/>
+            </a:prstTxWarp>
+            <a:noAutofit/>
+          </a:bodyPr>
+          <a:lstStyle/>
+          <a:p>
+            <a:r>
+              <a:rPr lang="en-US" sz="900" b="1" dirty="0" smtClean="0">
+                <a:solidFill>
+                  <a:prstClr val="black"/>
+                </a:solidFill>
+                <a:latin typeface="Times New Roman" panose="02020603050405020304" pitchFamily="18" charset="0"/>
+                <a:cs typeface="Times New Roman" panose="02020603050405020304" pitchFamily="18" charset="0"/>
+              </a:rPr>
+              <a:t>A</a:t>
+            </a:r>
+            <a:r>
+              <a:rPr lang="en-US" sz="900" b="1" baseline="-25000" dirty="0" smtClean="0">
+                <a:solidFill>
+                  <a:prstClr val="black"/>
+                </a:solidFill>
+                <a:latin typeface="Times New Roman" panose="02020603050405020304" pitchFamily="18" charset="0"/>
+                <a:cs typeface="Times New Roman" panose="02020603050405020304" pitchFamily="18" charset="0"/>
+              </a:rPr>
+              <a:t>0</a:t>
+            </a:r>
+            <a:endParaRPr lang="en-US" sz="900" b="1" dirty="0"/>
+          </a:p>
+        </p:txBody>
+      </p:sp>
+      <p:sp>
+        <p:nvSpPr>
+          <p:cNvPr id="3" name="Oval 2"/>
+          <p:cNvSpPr/>
+          <p:nvPr/>
+        </p:nvSpPr>
+        <p:spPr>
+          <a:xfrm>
+            <a:off x="765447" y="6249670"/>
+            <a:ext cx="457200" cy="457200"/>
+          </a:xfrm>
+          <a:prstGeom prst="ellipse">
+            <a:avLst/>
+          </a:prstGeom>
+          <a:noFill/>
+          <a:ln w="19050">
+            <a:solidFill>
+              <a:schemeClr val="tx1"/>
+            </a:solidFill>
+          </a:ln>
+        </p:spPr>
+        <p:style>
+          <a:lnRef idx="2">
+            <a:schemeClr val="accent1">
+              <a:shade val="50000"/>
+            </a:schemeClr>
+          </a:lnRef>
+          <a:fillRef idx="1">
+            <a:schemeClr val="accent1"/>
+          </a:fillRef>
+          <a:effectRef idx="0">
+            <a:schemeClr val="accent1"/>
+          </a:effectRef>
+          <a:fontRef idx="minor">
+            <a:schemeClr val="lt1"/>
+          </a:fontRef>
+        </p:style>
+        <p:txBody>
+          <a:bodyPr rot="0" spcFirstLastPara="0" vert="horz" wrap="square" lIns="91440" tIns="45720" rIns="91440" bIns="45720" numCol="1" spcCol="0" rtlCol="0" fromWordArt="0" anchor="ctr" anchorCtr="0" forceAA="0" compatLnSpc="1">
+            <a:prstTxWarp prst="textNoShape">
+              <a:avLst/>
+            </a:prstTxWarp>
+            <a:noAutofit/>
+          </a:bodyPr>
+          <a:lstStyle/>
+          <a:p>
+            <a:r>
+              <a:rPr lang="en-US" sz="900" b="1" dirty="0" smtClean="0">
+                <a:solidFill>
+                  <a:prstClr val="black"/>
+                </a:solidFill>
+                <a:latin typeface="Times New Roman" panose="02020603050405020304" pitchFamily="18" charset="0"/>
+                <a:cs typeface="Times New Roman" panose="02020603050405020304" pitchFamily="18" charset="0"/>
+              </a:rPr>
+              <a:t>B</a:t>
+            </a:r>
+            <a:r>
+              <a:rPr lang="en-US" sz="900" b="1" baseline="-25000" dirty="0" smtClean="0">
+                <a:solidFill>
+                  <a:prstClr val="black"/>
+                </a:solidFill>
+                <a:latin typeface="Times New Roman" panose="02020603050405020304" pitchFamily="18" charset="0"/>
+                <a:cs typeface="Times New Roman" panose="02020603050405020304" pitchFamily="18" charset="0"/>
+              </a:rPr>
+              <a:t>0</a:t>
+            </a:r>
+            <a:endParaRPr lang="en-US" sz="900" b="1" dirty="0"/>
+          </a:p>
+        </p:txBody>
+      </p:sp>
+      <p:sp>
+        <p:nvSpPr>
+          <p:cNvPr id="4" name="Oval 3"/>
+          <p:cNvSpPr/>
+          <p:nvPr/>
+        </p:nvSpPr>
+        <p:spPr>
+          <a:xfrm>
+            <a:off x="471555" y="5438821"/>
+            <a:ext cx="457200" cy="457200"/>
+          </a:xfrm>
+          <a:prstGeom prst="ellipse">
+            <a:avLst/>
+          </a:prstGeom>
+          <a:noFill/>
+          <a:ln w="19050">
+            <a:solidFill>
+              <a:schemeClr val="tx1"/>
+            </a:solidFill>
+          </a:ln>
+        </p:spPr>
+        <p:style>
+          <a:lnRef idx="2">
+            <a:schemeClr val="accent1">
+              <a:shade val="50000"/>
+            </a:schemeClr>
+          </a:lnRef>
+          <a:fillRef idx="1">
+            <a:schemeClr val="accent1"/>
+          </a:fillRef>
+          <a:effectRef idx="0">
+            <a:schemeClr val="accent1"/>
+          </a:effectRef>
+          <a:fontRef idx="minor">
+            <a:schemeClr val="lt1"/>
+          </a:fontRef>
+        </p:style>
+        <p:txBody>
+          <a:bodyPr rot="0" spcFirstLastPara="0" vert="horz" wrap="square" lIns="91440" tIns="45720" rIns="91440" bIns="45720" numCol="1" spcCol="0" rtlCol="0" fromWordArt="0" anchor="ctr" anchorCtr="0" forceAA="0" compatLnSpc="1">
+            <a:prstTxWarp prst="textNoShape">
+              <a:avLst/>
+            </a:prstTxWarp>
+            <a:noAutofit/>
+          </a:bodyPr>
+          <a:lstStyle/>
+          <a:p>
+            <a:r>
+              <a:rPr lang="en-US" sz="900" b="1" dirty="0" smtClean="0">
+                <a:solidFill>
+                  <a:schemeClr val="tx1"/>
+                </a:solidFill>
+                <a:latin typeface="Times New Roman" panose="02020603050405020304" pitchFamily="18" charset="0"/>
+                <a:cs typeface="Times New Roman" panose="02020603050405020304" pitchFamily="18" charset="0"/>
+              </a:rPr>
+              <a:t>I</a:t>
+            </a:r>
+            <a:r>
+              <a:rPr lang="en-US" sz="900" b="1" baseline="-25000" dirty="0" smtClean="0">
+                <a:solidFill>
+                  <a:schemeClr val="tx1"/>
+                </a:solidFill>
+                <a:latin typeface="Times New Roman" panose="02020603050405020304" pitchFamily="18" charset="0"/>
+                <a:cs typeface="Times New Roman" panose="02020603050405020304" pitchFamily="18" charset="0"/>
+              </a:rPr>
+              <a:t>1</a:t>
+            </a:r>
+            <a:endParaRPr lang="en-US" sz="900" b="1" baseline="-25000" dirty="0">
+              <a:solidFill>
+                <a:schemeClr val="tx1"/>
+              </a:solidFill>
+              <a:latin typeface="Times New Roman" panose="02020603050405020304" pitchFamily="18" charset="0"/>
+              <a:cs typeface="Times New Roman" panose="02020603050405020304" pitchFamily="18" charset="0"/>
+            </a:endParaRPr>
+          </a:p>
+        </p:txBody>
+      </p:sp>
+      <p:cxnSp>
+        <p:nvCxnSpPr>
+          <p:cNvPr id="5" name="Straight Connector 4"/>
+          <p:cNvCxnSpPr>
+            <a:endCxn id="4" idx="4"/>
+          </p:cNvCxnSpPr>
+          <p:nvPr/>
+        </p:nvCxnSpPr>
+        <p:spPr>
+          <a:xfrm flipV="1">
+            <a:off x="370487" y="5896021"/>
+            <a:ext cx="329668" cy="352380"/>
+          </a:xfrm>
+          <a:prstGeom prst="line">
+            <a:avLst/>
+          </a:prstGeom>
+          <a:ln w="19050">
+            <a:solidFill>
+              <a:schemeClr val="tx1"/>
+            </a:solidFill>
+          </a:ln>
+        </p:spPr>
+        <p:style>
+          <a:lnRef idx="1">
+            <a:schemeClr val="accent1"/>
+          </a:lnRef>
+          <a:fillRef idx="0">
+            <a:schemeClr val="accent1"/>
+          </a:fillRef>
+          <a:effectRef idx="0">
+            <a:schemeClr val="accent1"/>
+          </a:effectRef>
+          <a:fontRef idx="minor">
+            <a:schemeClr val="tx1"/>
+          </a:fontRef>
+        </p:style>
+      </p:cxnSp>
+      <p:cxnSp>
+        <p:nvCxnSpPr>
+          <p:cNvPr id="6" name="Straight Connector 5"/>
+          <p:cNvCxnSpPr>
+            <a:stCxn id="3" idx="0"/>
+            <a:endCxn id="4" idx="4"/>
+          </p:cNvCxnSpPr>
+          <p:nvPr/>
+        </p:nvCxnSpPr>
+        <p:spPr>
+          <a:xfrm flipH="1" flipV="1">
+            <a:off x="700155" y="5896021"/>
+            <a:ext cx="293892" cy="353649"/>
+          </a:xfrm>
+          <a:prstGeom prst="line">
+            <a:avLst/>
+          </a:prstGeom>
+          <a:ln w="19050">
+            <a:solidFill>
+              <a:schemeClr val="tx1"/>
+            </a:solidFill>
+          </a:ln>
+        </p:spPr>
+        <p:style>
+          <a:lnRef idx="1">
+            <a:schemeClr val="accent1"/>
+          </a:lnRef>
+          <a:fillRef idx="0">
+            <a:schemeClr val="accent1"/>
+          </a:fillRef>
+          <a:effectRef idx="0">
+            <a:schemeClr val="accent1"/>
+          </a:effectRef>
+          <a:fontRef idx="minor">
+            <a:schemeClr val="tx1"/>
+          </a:fontRef>
+        </p:style>
+      </p:cxnSp>
+      <p:sp>
+        <p:nvSpPr>
+          <p:cNvPr id="7" name="Oval 6"/>
+          <p:cNvSpPr/>
+          <p:nvPr/>
+        </p:nvSpPr>
+        <p:spPr>
+          <a:xfrm>
+            <a:off x="1303241" y="6249670"/>
+            <a:ext cx="457200" cy="457200"/>
+          </a:xfrm>
+          <a:prstGeom prst="ellipse">
+            <a:avLst/>
+          </a:prstGeom>
+          <a:noFill/>
+          <a:ln w="19050">
+            <a:solidFill>
+              <a:schemeClr val="tx1"/>
+            </a:solidFill>
+          </a:ln>
+        </p:spPr>
+        <p:style>
+          <a:lnRef idx="2">
+            <a:schemeClr val="accent1">
+              <a:shade val="50000"/>
+            </a:schemeClr>
+          </a:lnRef>
+          <a:fillRef idx="1">
+            <a:schemeClr val="accent1"/>
+          </a:fillRef>
+          <a:effectRef idx="0">
+            <a:schemeClr val="accent1"/>
+          </a:effectRef>
+          <a:fontRef idx="minor">
+            <a:schemeClr val="lt1"/>
+          </a:fontRef>
+        </p:style>
+        <p:txBody>
+          <a:bodyPr rot="0" spcFirstLastPara="0" vert="horz" wrap="square" lIns="91440" tIns="45720" rIns="91440" bIns="45720" numCol="1" spcCol="0" rtlCol="0" fromWordArt="0" anchor="ctr" anchorCtr="0" forceAA="0" compatLnSpc="1">
+            <a:prstTxWarp prst="textNoShape">
+              <a:avLst/>
+            </a:prstTxWarp>
+            <a:noAutofit/>
+          </a:bodyPr>
+          <a:lstStyle/>
+          <a:p>
+            <a:r>
+              <a:rPr lang="en-US" sz="900" b="1" dirty="0" smtClean="0">
+                <a:solidFill>
+                  <a:prstClr val="black"/>
+                </a:solidFill>
+                <a:latin typeface="Times New Roman" panose="02020603050405020304" pitchFamily="18" charset="0"/>
+                <a:cs typeface="Times New Roman" panose="02020603050405020304" pitchFamily="18" charset="0"/>
+              </a:rPr>
+              <a:t>C</a:t>
+            </a:r>
+            <a:r>
+              <a:rPr lang="en-US" sz="900" b="1" baseline="-25000" dirty="0" smtClean="0">
+                <a:solidFill>
+                  <a:prstClr val="black"/>
+                </a:solidFill>
+                <a:latin typeface="Times New Roman" panose="02020603050405020304" pitchFamily="18" charset="0"/>
+                <a:cs typeface="Times New Roman" panose="02020603050405020304" pitchFamily="18" charset="0"/>
+              </a:rPr>
+              <a:t>0</a:t>
+            </a:r>
+            <a:endParaRPr lang="en-US" sz="900" b="1" dirty="0"/>
+          </a:p>
+        </p:txBody>
+      </p:sp>
+      <p:sp>
+        <p:nvSpPr>
+          <p:cNvPr id="8" name="Oval 7"/>
+          <p:cNvSpPr/>
+          <p:nvPr/>
+        </p:nvSpPr>
+        <p:spPr>
+          <a:xfrm>
+            <a:off x="1924804" y="6249670"/>
+            <a:ext cx="457200" cy="457200"/>
+          </a:xfrm>
+          <a:prstGeom prst="ellipse">
+            <a:avLst/>
+          </a:prstGeom>
+          <a:noFill/>
+          <a:ln w="19050">
+            <a:solidFill>
+              <a:schemeClr val="tx1"/>
+            </a:solidFill>
+          </a:ln>
+        </p:spPr>
+        <p:style>
+          <a:lnRef idx="2">
+            <a:schemeClr val="accent1">
+              <a:shade val="50000"/>
+            </a:schemeClr>
+          </a:lnRef>
+          <a:fillRef idx="1">
+            <a:schemeClr val="accent1"/>
+          </a:fillRef>
+          <a:effectRef idx="0">
+            <a:schemeClr val="accent1"/>
+          </a:effectRef>
+          <a:fontRef idx="minor">
+            <a:schemeClr val="lt1"/>
+          </a:fontRef>
+        </p:style>
+        <p:txBody>
+          <a:bodyPr rot="0" spcFirstLastPara="0" vert="horz" wrap="square" lIns="91440" tIns="45720" rIns="91440" bIns="45720" numCol="1" spcCol="0" rtlCol="0" fromWordArt="0" anchor="ctr" anchorCtr="0" forceAA="0" compatLnSpc="1">
+            <a:prstTxWarp prst="textNoShape">
+              <a:avLst/>
+            </a:prstTxWarp>
+            <a:noAutofit/>
+          </a:bodyPr>
+          <a:lstStyle/>
+          <a:p>
+            <a:r>
+              <a:rPr lang="en-US" sz="900" b="1" dirty="0" smtClean="0">
+                <a:solidFill>
+                  <a:prstClr val="black"/>
+                </a:solidFill>
+                <a:latin typeface="Times New Roman" panose="02020603050405020304" pitchFamily="18" charset="0"/>
+                <a:cs typeface="Times New Roman" panose="02020603050405020304" pitchFamily="18" charset="0"/>
+              </a:rPr>
+              <a:t>D</a:t>
+            </a:r>
+            <a:r>
+              <a:rPr lang="en-US" sz="900" b="1" baseline="-25000" dirty="0" smtClean="0">
+                <a:solidFill>
+                  <a:prstClr val="black"/>
+                </a:solidFill>
+                <a:latin typeface="Times New Roman" panose="02020603050405020304" pitchFamily="18" charset="0"/>
+                <a:cs typeface="Times New Roman" panose="02020603050405020304" pitchFamily="18" charset="0"/>
+              </a:rPr>
+              <a:t>0</a:t>
+            </a:r>
+            <a:endParaRPr lang="en-US" sz="900" b="1" dirty="0"/>
+          </a:p>
+        </p:txBody>
+      </p:sp>
+      <p:sp>
+        <p:nvSpPr>
+          <p:cNvPr id="9" name="Oval 8"/>
+          <p:cNvSpPr/>
+          <p:nvPr/>
+        </p:nvSpPr>
+        <p:spPr>
+          <a:xfrm>
+            <a:off x="1630912" y="5438821"/>
+            <a:ext cx="457200" cy="457200"/>
+          </a:xfrm>
+          <a:prstGeom prst="ellipse">
+            <a:avLst/>
+          </a:prstGeom>
+          <a:noFill/>
+          <a:ln w="19050">
+            <a:solidFill>
+              <a:schemeClr val="tx1"/>
+            </a:solidFill>
+          </a:ln>
+        </p:spPr>
+        <p:style>
+          <a:lnRef idx="2">
+            <a:schemeClr val="accent1">
+              <a:shade val="50000"/>
+            </a:schemeClr>
+          </a:lnRef>
+          <a:fillRef idx="1">
+            <a:schemeClr val="accent1"/>
+          </a:fillRef>
+          <a:effectRef idx="0">
+            <a:schemeClr val="accent1"/>
+          </a:effectRef>
+          <a:fontRef idx="minor">
+            <a:schemeClr val="lt1"/>
+          </a:fontRef>
+        </p:style>
+        <p:txBody>
+          <a:bodyPr rot="0" spcFirstLastPara="0" vert="horz" wrap="square" lIns="91440" tIns="45720" rIns="91440" bIns="45720" numCol="1" spcCol="0" rtlCol="0" fromWordArt="0" anchor="ctr" anchorCtr="0" forceAA="0" compatLnSpc="1">
+            <a:prstTxWarp prst="textNoShape">
+              <a:avLst/>
+            </a:prstTxWarp>
+            <a:noAutofit/>
+          </a:bodyPr>
+          <a:lstStyle/>
+          <a:p>
+            <a:r>
+              <a:rPr lang="en-US" sz="900" b="1" dirty="0" smtClean="0">
+                <a:solidFill>
+                  <a:schemeClr val="tx1"/>
+                </a:solidFill>
+                <a:latin typeface="Times New Roman" panose="02020603050405020304" pitchFamily="18" charset="0"/>
+                <a:cs typeface="Times New Roman" panose="02020603050405020304" pitchFamily="18" charset="0"/>
+              </a:rPr>
+              <a:t>J</a:t>
+            </a:r>
+            <a:r>
+              <a:rPr lang="en-US" sz="900" b="1" baseline="-25000" dirty="0" smtClean="0">
+                <a:solidFill>
+                  <a:schemeClr val="tx1"/>
+                </a:solidFill>
+                <a:latin typeface="Times New Roman" panose="02020603050405020304" pitchFamily="18" charset="0"/>
+                <a:cs typeface="Times New Roman" panose="02020603050405020304" pitchFamily="18" charset="0"/>
+              </a:rPr>
+              <a:t>1</a:t>
+            </a:r>
+            <a:endParaRPr lang="en-US" sz="900" b="1" baseline="-25000" dirty="0">
+              <a:solidFill>
+                <a:schemeClr val="tx1"/>
+              </a:solidFill>
+              <a:latin typeface="Times New Roman" panose="02020603050405020304" pitchFamily="18" charset="0"/>
+              <a:cs typeface="Times New Roman" panose="02020603050405020304" pitchFamily="18" charset="0"/>
+            </a:endParaRPr>
+          </a:p>
+        </p:txBody>
+      </p:sp>
+      <p:cxnSp>
+        <p:nvCxnSpPr>
+          <p:cNvPr id="10" name="Straight Connector 9"/>
+          <p:cNvCxnSpPr/>
+          <p:nvPr/>
+        </p:nvCxnSpPr>
+        <p:spPr>
+          <a:xfrm flipV="1">
+            <a:off x="1529844" y="5896021"/>
+            <a:ext cx="329668" cy="352380"/>
+          </a:xfrm>
+          <a:prstGeom prst="line">
+            <a:avLst/>
+          </a:prstGeom>
+          <a:ln w="19050">
+            <a:solidFill>
+              <a:schemeClr val="tx1"/>
+            </a:solidFill>
+          </a:ln>
+        </p:spPr>
+        <p:style>
+          <a:lnRef idx="1">
+            <a:schemeClr val="accent1"/>
+          </a:lnRef>
+          <a:fillRef idx="0">
+            <a:schemeClr val="accent1"/>
+          </a:fillRef>
+          <a:effectRef idx="0">
+            <a:schemeClr val="accent1"/>
+          </a:effectRef>
+          <a:fontRef idx="minor">
+            <a:schemeClr val="tx1"/>
+          </a:fontRef>
+        </p:style>
+      </p:cxnSp>
+      <p:cxnSp>
+        <p:nvCxnSpPr>
+          <p:cNvPr id="11" name="Straight Connector 10"/>
+          <p:cNvCxnSpPr>
+            <a:stCxn id="8" idx="0"/>
+            <a:endCxn id="9" idx="4"/>
+          </p:cNvCxnSpPr>
+          <p:nvPr/>
+        </p:nvCxnSpPr>
+        <p:spPr>
+          <a:xfrm flipH="1" flipV="1">
+            <a:off x="1859512" y="5896021"/>
+            <a:ext cx="293892" cy="353649"/>
+          </a:xfrm>
+          <a:prstGeom prst="line">
+            <a:avLst/>
+          </a:prstGeom>
+          <a:ln w="19050">
+            <a:solidFill>
+              <a:schemeClr val="tx1"/>
+            </a:solidFill>
+          </a:ln>
+        </p:spPr>
+        <p:style>
+          <a:lnRef idx="1">
+            <a:schemeClr val="accent1"/>
+          </a:lnRef>
+          <a:fillRef idx="0">
+            <a:schemeClr val="accent1"/>
+          </a:fillRef>
+          <a:effectRef idx="0">
+            <a:schemeClr val="accent1"/>
+          </a:effectRef>
+          <a:fontRef idx="minor">
+            <a:schemeClr val="tx1"/>
+          </a:fontRef>
+        </p:style>
+      </p:cxnSp>
+      <p:sp>
+        <p:nvSpPr>
+          <p:cNvPr id="13" name="Oval 12"/>
+          <p:cNvSpPr/>
+          <p:nvPr/>
+        </p:nvSpPr>
+        <p:spPr>
+          <a:xfrm>
+            <a:off x="2488726" y="6249670"/>
+            <a:ext cx="457200" cy="457200"/>
+          </a:xfrm>
+          <a:prstGeom prst="ellipse">
+            <a:avLst/>
+          </a:prstGeom>
+          <a:noFill/>
+          <a:ln w="19050">
+            <a:solidFill>
+              <a:schemeClr val="tx1"/>
+            </a:solidFill>
+          </a:ln>
+        </p:spPr>
+        <p:style>
+          <a:lnRef idx="2">
+            <a:schemeClr val="accent1">
+              <a:shade val="50000"/>
+            </a:schemeClr>
+          </a:lnRef>
+          <a:fillRef idx="1">
+            <a:schemeClr val="accent1"/>
+          </a:fillRef>
+          <a:effectRef idx="0">
+            <a:schemeClr val="accent1"/>
+          </a:effectRef>
+          <a:fontRef idx="minor">
+            <a:schemeClr val="lt1"/>
+          </a:fontRef>
+        </p:style>
+        <p:txBody>
+          <a:bodyPr rot="0" spcFirstLastPara="0" vert="horz" wrap="square" lIns="91440" tIns="45720" rIns="91440" bIns="45720" numCol="1" spcCol="0" rtlCol="0" fromWordArt="0" anchor="ctr" anchorCtr="0" forceAA="0" compatLnSpc="1">
+            <a:prstTxWarp prst="textNoShape">
+              <a:avLst/>
+            </a:prstTxWarp>
+            <a:noAutofit/>
+          </a:bodyPr>
+          <a:lstStyle/>
+          <a:p>
+            <a:r>
+              <a:rPr lang="en-US" sz="900" b="1" dirty="0" smtClean="0">
+                <a:solidFill>
+                  <a:prstClr val="black"/>
+                </a:solidFill>
+                <a:latin typeface="Times New Roman" panose="02020603050405020304" pitchFamily="18" charset="0"/>
+                <a:cs typeface="Times New Roman" panose="02020603050405020304" pitchFamily="18" charset="0"/>
+              </a:rPr>
+              <a:t>E</a:t>
+            </a:r>
+            <a:r>
+              <a:rPr lang="en-US" sz="900" b="1" baseline="-25000" dirty="0" smtClean="0">
+                <a:solidFill>
+                  <a:prstClr val="black"/>
+                </a:solidFill>
+                <a:latin typeface="Times New Roman" panose="02020603050405020304" pitchFamily="18" charset="0"/>
+                <a:cs typeface="Times New Roman" panose="02020603050405020304" pitchFamily="18" charset="0"/>
+              </a:rPr>
+              <a:t>0</a:t>
+            </a:r>
+            <a:endParaRPr lang="en-US" sz="900" b="1" dirty="0"/>
+          </a:p>
+        </p:txBody>
+      </p:sp>
+      <p:sp>
+        <p:nvSpPr>
+          <p:cNvPr id="14" name="Oval 13"/>
+          <p:cNvSpPr/>
+          <p:nvPr/>
+        </p:nvSpPr>
+        <p:spPr>
+          <a:xfrm>
+            <a:off x="3035239" y="6248401"/>
+            <a:ext cx="457200" cy="457200"/>
+          </a:xfrm>
+          <a:prstGeom prst="ellipse">
+            <a:avLst/>
+          </a:prstGeom>
+          <a:noFill/>
+          <a:ln w="19050">
+            <a:solidFill>
+              <a:schemeClr val="tx1"/>
+            </a:solidFill>
+          </a:ln>
+        </p:spPr>
+        <p:style>
+          <a:lnRef idx="2">
+            <a:schemeClr val="accent1">
+              <a:shade val="50000"/>
+            </a:schemeClr>
+          </a:lnRef>
+          <a:fillRef idx="1">
+            <a:schemeClr val="accent1"/>
+          </a:fillRef>
+          <a:effectRef idx="0">
+            <a:schemeClr val="accent1"/>
+          </a:effectRef>
+          <a:fontRef idx="minor">
+            <a:schemeClr val="lt1"/>
+          </a:fontRef>
+        </p:style>
+        <p:txBody>
+          <a:bodyPr rot="0" spcFirstLastPara="0" vert="horz" wrap="square" lIns="91440" tIns="45720" rIns="91440" bIns="45720" numCol="1" spcCol="0" rtlCol="0" fromWordArt="0" anchor="ctr" anchorCtr="0" forceAA="0" compatLnSpc="1">
+            <a:prstTxWarp prst="textNoShape">
+              <a:avLst/>
+            </a:prstTxWarp>
+            <a:noAutofit/>
+          </a:bodyPr>
+          <a:lstStyle/>
+          <a:p>
+            <a:r>
+              <a:rPr lang="en-US" sz="900" b="1" dirty="0" smtClean="0">
+                <a:solidFill>
+                  <a:prstClr val="black"/>
+                </a:solidFill>
+                <a:latin typeface="Times New Roman" panose="02020603050405020304" pitchFamily="18" charset="0"/>
+                <a:cs typeface="Times New Roman" panose="02020603050405020304" pitchFamily="18" charset="0"/>
+              </a:rPr>
+              <a:t>F</a:t>
+            </a:r>
+            <a:r>
+              <a:rPr lang="en-US" sz="900" b="1" baseline="-25000" dirty="0" smtClean="0">
+                <a:solidFill>
+                  <a:prstClr val="black"/>
+                </a:solidFill>
+                <a:latin typeface="Times New Roman" panose="02020603050405020304" pitchFamily="18" charset="0"/>
+                <a:cs typeface="Times New Roman" panose="02020603050405020304" pitchFamily="18" charset="0"/>
+              </a:rPr>
+              <a:t>0</a:t>
+            </a:r>
+            <a:endParaRPr lang="en-US" sz="900" b="1" dirty="0"/>
+          </a:p>
+        </p:txBody>
+      </p:sp>
+      <p:sp>
+        <p:nvSpPr>
+          <p:cNvPr id="15" name="Oval 14"/>
+          <p:cNvSpPr/>
+          <p:nvPr/>
+        </p:nvSpPr>
+        <p:spPr>
+          <a:xfrm>
+            <a:off x="3569227" y="6248401"/>
+            <a:ext cx="457200" cy="457200"/>
+          </a:xfrm>
+          <a:prstGeom prst="ellipse">
+            <a:avLst/>
+          </a:prstGeom>
+          <a:noFill/>
+          <a:ln w="19050">
+            <a:solidFill>
+              <a:schemeClr val="tx1"/>
+            </a:solidFill>
+          </a:ln>
+        </p:spPr>
+        <p:style>
+          <a:lnRef idx="2">
+            <a:schemeClr val="accent1">
+              <a:shade val="50000"/>
+            </a:schemeClr>
+          </a:lnRef>
+          <a:fillRef idx="1">
+            <a:schemeClr val="accent1"/>
+          </a:fillRef>
+          <a:effectRef idx="0">
+            <a:schemeClr val="accent1"/>
+          </a:effectRef>
+          <a:fontRef idx="minor">
+            <a:schemeClr val="lt1"/>
+          </a:fontRef>
+        </p:style>
+        <p:txBody>
+          <a:bodyPr rot="0" spcFirstLastPara="0" vert="horz" wrap="square" lIns="91440" tIns="45720" rIns="91440" bIns="45720" numCol="1" spcCol="0" rtlCol="0" fromWordArt="0" anchor="ctr" anchorCtr="0" forceAA="0" compatLnSpc="1">
+            <a:prstTxWarp prst="textNoShape">
+              <a:avLst/>
+            </a:prstTxWarp>
+            <a:noAutofit/>
+          </a:bodyPr>
+          <a:lstStyle/>
+          <a:p>
+            <a:r>
+              <a:rPr lang="en-US" sz="900" b="1" dirty="0" smtClean="0">
+                <a:solidFill>
+                  <a:prstClr val="black"/>
+                </a:solidFill>
+                <a:latin typeface="Times New Roman" panose="02020603050405020304" pitchFamily="18" charset="0"/>
+                <a:cs typeface="Times New Roman" panose="02020603050405020304" pitchFamily="18" charset="0"/>
+              </a:rPr>
+              <a:t>G</a:t>
+            </a:r>
+            <a:r>
+              <a:rPr lang="en-US" sz="900" b="1" baseline="-25000" dirty="0" smtClean="0">
+                <a:solidFill>
+                  <a:prstClr val="black"/>
+                </a:solidFill>
+                <a:latin typeface="Times New Roman" panose="02020603050405020304" pitchFamily="18" charset="0"/>
+                <a:cs typeface="Times New Roman" panose="02020603050405020304" pitchFamily="18" charset="0"/>
+              </a:rPr>
+              <a:t>0</a:t>
+            </a:r>
+            <a:endParaRPr lang="en-US" sz="900" b="1" dirty="0"/>
+          </a:p>
+        </p:txBody>
+      </p:sp>
+      <p:sp>
+        <p:nvSpPr>
+          <p:cNvPr id="16" name="Oval 15"/>
+          <p:cNvSpPr/>
+          <p:nvPr/>
+        </p:nvSpPr>
+        <p:spPr>
+          <a:xfrm>
+            <a:off x="4132467" y="6248401"/>
+            <a:ext cx="457200" cy="457200"/>
+          </a:xfrm>
+          <a:prstGeom prst="ellipse">
+            <a:avLst/>
+          </a:prstGeom>
+          <a:noFill/>
+          <a:ln w="19050">
+            <a:solidFill>
+              <a:schemeClr val="tx1"/>
+            </a:solidFill>
+          </a:ln>
+        </p:spPr>
+        <p:style>
+          <a:lnRef idx="2">
+            <a:schemeClr val="accent1">
+              <a:shade val="50000"/>
+            </a:schemeClr>
+          </a:lnRef>
+          <a:fillRef idx="1">
+            <a:schemeClr val="accent1"/>
+          </a:fillRef>
+          <a:effectRef idx="0">
+            <a:schemeClr val="accent1"/>
+          </a:effectRef>
+          <a:fontRef idx="minor">
+            <a:schemeClr val="lt1"/>
+          </a:fontRef>
+        </p:style>
+        <p:txBody>
+          <a:bodyPr rot="0" spcFirstLastPara="0" vert="horz" wrap="square" lIns="91440" tIns="45720" rIns="91440" bIns="45720" numCol="1" spcCol="0" rtlCol="0" fromWordArt="0" anchor="ctr" anchorCtr="0" forceAA="0" compatLnSpc="1">
+            <a:prstTxWarp prst="textNoShape">
+              <a:avLst/>
+            </a:prstTxWarp>
+            <a:noAutofit/>
+          </a:bodyPr>
+          <a:lstStyle/>
+          <a:p>
+            <a:r>
+              <a:rPr lang="en-US" sz="900" b="1" dirty="0" smtClean="0">
+                <a:solidFill>
+                  <a:prstClr val="black"/>
+                </a:solidFill>
+                <a:latin typeface="Times New Roman" panose="02020603050405020304" pitchFamily="18" charset="0"/>
+                <a:cs typeface="Times New Roman" panose="02020603050405020304" pitchFamily="18" charset="0"/>
+              </a:rPr>
+              <a:t>H</a:t>
+            </a:r>
+            <a:r>
+              <a:rPr lang="en-US" sz="900" b="1" baseline="-25000" dirty="0" smtClean="0">
+                <a:solidFill>
+                  <a:prstClr val="black"/>
+                </a:solidFill>
+                <a:latin typeface="Times New Roman" panose="02020603050405020304" pitchFamily="18" charset="0"/>
+                <a:cs typeface="Times New Roman" panose="02020603050405020304" pitchFamily="18" charset="0"/>
+              </a:rPr>
+              <a:t>0</a:t>
+            </a:r>
+            <a:endParaRPr lang="en-US" sz="900" b="1" dirty="0"/>
+          </a:p>
+        </p:txBody>
+      </p:sp>
+      <p:cxnSp>
+        <p:nvCxnSpPr>
+          <p:cNvPr id="17" name="Straight Connector 16"/>
+          <p:cNvCxnSpPr/>
+          <p:nvPr/>
+        </p:nvCxnSpPr>
+        <p:spPr>
+          <a:xfrm flipV="1">
+            <a:off x="2675122" y="5894752"/>
+            <a:ext cx="329668" cy="352380"/>
+          </a:xfrm>
+          <a:prstGeom prst="line">
+            <a:avLst/>
+          </a:prstGeom>
+          <a:ln w="19050">
+            <a:solidFill>
+              <a:schemeClr val="tx1"/>
+            </a:solidFill>
+          </a:ln>
+        </p:spPr>
+        <p:style>
+          <a:lnRef idx="1">
+            <a:schemeClr val="accent1"/>
+          </a:lnRef>
+          <a:fillRef idx="0">
+            <a:schemeClr val="accent1"/>
+          </a:fillRef>
+          <a:effectRef idx="0">
+            <a:schemeClr val="accent1"/>
+          </a:effectRef>
+          <a:fontRef idx="minor">
+            <a:schemeClr val="tx1"/>
+          </a:fontRef>
+        </p:style>
+      </p:cxnSp>
+      <p:cxnSp>
+        <p:nvCxnSpPr>
+          <p:cNvPr id="18" name="Straight Connector 17"/>
+          <p:cNvCxnSpPr/>
+          <p:nvPr/>
+        </p:nvCxnSpPr>
+        <p:spPr>
+          <a:xfrm flipH="1" flipV="1">
+            <a:off x="3004790" y="5894752"/>
+            <a:ext cx="293892" cy="353649"/>
+          </a:xfrm>
+          <a:prstGeom prst="line">
+            <a:avLst/>
+          </a:prstGeom>
+          <a:ln w="19050">
+            <a:solidFill>
+              <a:schemeClr val="tx1"/>
+            </a:solidFill>
+          </a:ln>
+        </p:spPr>
+        <p:style>
+          <a:lnRef idx="1">
+            <a:schemeClr val="accent1"/>
+          </a:lnRef>
+          <a:fillRef idx="0">
+            <a:schemeClr val="accent1"/>
+          </a:fillRef>
+          <a:effectRef idx="0">
+            <a:schemeClr val="accent1"/>
+          </a:effectRef>
+          <a:fontRef idx="minor">
+            <a:schemeClr val="tx1"/>
+          </a:fontRef>
+        </p:style>
+      </p:cxnSp>
+      <p:cxnSp>
+        <p:nvCxnSpPr>
+          <p:cNvPr id="19" name="Straight Connector 18"/>
+          <p:cNvCxnSpPr/>
+          <p:nvPr/>
+        </p:nvCxnSpPr>
+        <p:spPr>
+          <a:xfrm flipV="1">
+            <a:off x="3772670" y="5894752"/>
+            <a:ext cx="329668" cy="352380"/>
+          </a:xfrm>
+          <a:prstGeom prst="line">
+            <a:avLst/>
+          </a:prstGeom>
+          <a:ln w="19050">
+            <a:solidFill>
+              <a:schemeClr val="tx1"/>
+            </a:solidFill>
+          </a:ln>
+        </p:spPr>
+        <p:style>
+          <a:lnRef idx="1">
+            <a:schemeClr val="accent1"/>
+          </a:lnRef>
+          <a:fillRef idx="0">
+            <a:schemeClr val="accent1"/>
+          </a:fillRef>
+          <a:effectRef idx="0">
+            <a:schemeClr val="accent1"/>
+          </a:effectRef>
+          <a:fontRef idx="minor">
+            <a:schemeClr val="tx1"/>
+          </a:fontRef>
+        </p:style>
+      </p:cxnSp>
+      <p:cxnSp>
+        <p:nvCxnSpPr>
+          <p:cNvPr id="20" name="Straight Connector 19"/>
+          <p:cNvCxnSpPr/>
+          <p:nvPr/>
+        </p:nvCxnSpPr>
+        <p:spPr>
+          <a:xfrm flipH="1" flipV="1">
+            <a:off x="4102338" y="5894752"/>
+            <a:ext cx="293892" cy="353649"/>
+          </a:xfrm>
+          <a:prstGeom prst="line">
+            <a:avLst/>
+          </a:prstGeom>
+          <a:ln w="19050">
+            <a:solidFill>
+              <a:schemeClr val="tx1"/>
+            </a:solidFill>
+          </a:ln>
+        </p:spPr>
+        <p:style>
+          <a:lnRef idx="1">
+            <a:schemeClr val="accent1"/>
+          </a:lnRef>
+          <a:fillRef idx="0">
+            <a:schemeClr val="accent1"/>
+          </a:fillRef>
+          <a:effectRef idx="0">
+            <a:schemeClr val="accent1"/>
+          </a:effectRef>
+          <a:fontRef idx="minor">
+            <a:schemeClr val="tx1"/>
+          </a:fontRef>
+        </p:style>
+      </p:cxnSp>
+      <p:sp>
+        <p:nvSpPr>
+          <p:cNvPr id="21" name="Oval 20"/>
+          <p:cNvSpPr/>
+          <p:nvPr/>
+        </p:nvSpPr>
+        <p:spPr>
+          <a:xfrm>
+            <a:off x="2781921" y="5437552"/>
+            <a:ext cx="457200" cy="457200"/>
+          </a:xfrm>
+          <a:prstGeom prst="ellipse">
+            <a:avLst/>
+          </a:prstGeom>
+          <a:noFill/>
+          <a:ln w="19050">
+            <a:solidFill>
+              <a:schemeClr val="tx1"/>
+            </a:solidFill>
+          </a:ln>
+        </p:spPr>
+        <p:style>
+          <a:lnRef idx="2">
+            <a:schemeClr val="accent1">
+              <a:shade val="50000"/>
+            </a:schemeClr>
+          </a:lnRef>
+          <a:fillRef idx="1">
+            <a:schemeClr val="accent1"/>
+          </a:fillRef>
+          <a:effectRef idx="0">
+            <a:schemeClr val="accent1"/>
+          </a:effectRef>
+          <a:fontRef idx="minor">
+            <a:schemeClr val="lt1"/>
+          </a:fontRef>
+        </p:style>
+        <p:txBody>
+          <a:bodyPr rot="0" spcFirstLastPara="0" vert="horz" wrap="square" lIns="91440" tIns="45720" rIns="91440" bIns="45720" numCol="1" spcCol="0" rtlCol="0" fromWordArt="0" anchor="ctr" anchorCtr="0" forceAA="0" compatLnSpc="1">
+            <a:prstTxWarp prst="textNoShape">
+              <a:avLst/>
+            </a:prstTxWarp>
+            <a:noAutofit/>
+          </a:bodyPr>
+          <a:lstStyle/>
+          <a:p>
+            <a:r>
+              <a:rPr lang="en-US" sz="900" b="1" dirty="0" smtClean="0">
+                <a:solidFill>
+                  <a:schemeClr val="tx1"/>
+                </a:solidFill>
+                <a:latin typeface="Times New Roman" panose="02020603050405020304" pitchFamily="18" charset="0"/>
+                <a:cs typeface="Times New Roman" panose="02020603050405020304" pitchFamily="18" charset="0"/>
+              </a:rPr>
+              <a:t>K</a:t>
+            </a:r>
+            <a:r>
+              <a:rPr lang="en-US" sz="900" b="1" baseline="-25000" dirty="0" smtClean="0">
+                <a:solidFill>
+                  <a:schemeClr val="tx1"/>
+                </a:solidFill>
+                <a:latin typeface="Times New Roman" panose="02020603050405020304" pitchFamily="18" charset="0"/>
+                <a:cs typeface="Times New Roman" panose="02020603050405020304" pitchFamily="18" charset="0"/>
+              </a:rPr>
+              <a:t>1</a:t>
+            </a:r>
+            <a:endParaRPr lang="en-US" sz="900" b="1" baseline="-25000" dirty="0">
+              <a:solidFill>
+                <a:schemeClr val="tx1"/>
+              </a:solidFill>
+              <a:latin typeface="Times New Roman" panose="02020603050405020304" pitchFamily="18" charset="0"/>
+              <a:cs typeface="Times New Roman" panose="02020603050405020304" pitchFamily="18" charset="0"/>
+            </a:endParaRPr>
+          </a:p>
+        </p:txBody>
+      </p:sp>
+      <p:sp>
+        <p:nvSpPr>
+          <p:cNvPr id="22" name="Oval 21"/>
+          <p:cNvSpPr/>
+          <p:nvPr/>
+        </p:nvSpPr>
+        <p:spPr>
+          <a:xfrm>
+            <a:off x="3889821" y="5437552"/>
+            <a:ext cx="456579" cy="457200"/>
+          </a:xfrm>
+          <a:prstGeom prst="ellipse">
+            <a:avLst/>
+          </a:prstGeom>
+          <a:noFill/>
+          <a:ln w="19050">
+            <a:solidFill>
+              <a:schemeClr val="tx1"/>
+            </a:solidFill>
+          </a:ln>
+        </p:spPr>
+        <p:style>
+          <a:lnRef idx="2">
+            <a:schemeClr val="accent1">
+              <a:shade val="50000"/>
+            </a:schemeClr>
+          </a:lnRef>
+          <a:fillRef idx="1">
+            <a:schemeClr val="accent1"/>
+          </a:fillRef>
+          <a:effectRef idx="0">
+            <a:schemeClr val="accent1"/>
+          </a:effectRef>
+          <a:fontRef idx="minor">
+            <a:schemeClr val="lt1"/>
+          </a:fontRef>
+        </p:style>
+        <p:txBody>
+          <a:bodyPr rot="0" spcFirstLastPara="0" vert="horz" wrap="square" lIns="91440" tIns="45720" rIns="91440" bIns="45720" numCol="1" spcCol="0" rtlCol="0" fromWordArt="0" anchor="ctr" anchorCtr="0" forceAA="0" compatLnSpc="1">
+            <a:prstTxWarp prst="textNoShape">
+              <a:avLst/>
+            </a:prstTxWarp>
+            <a:noAutofit/>
+          </a:bodyPr>
+          <a:lstStyle/>
+          <a:p>
+            <a:pPr lvl="0"/>
+            <a:endParaRPr lang="en-US" sz="900" b="1" dirty="0" smtClean="0">
+              <a:solidFill>
+                <a:prstClr val="black"/>
+              </a:solidFill>
+              <a:latin typeface="Times New Roman" panose="02020603050405020304" pitchFamily="18" charset="0"/>
+              <a:cs typeface="Times New Roman" panose="02020603050405020304" pitchFamily="18" charset="0"/>
+            </a:endParaRPr>
+          </a:p>
+          <a:p>
+            <a:r>
+              <a:rPr lang="en-US" sz="900" b="1" dirty="0" smtClean="0">
+                <a:solidFill>
+                  <a:schemeClr val="tx1"/>
+                </a:solidFill>
+                <a:latin typeface="Times New Roman" panose="02020603050405020304" pitchFamily="18" charset="0"/>
+                <a:cs typeface="Times New Roman" panose="02020603050405020304" pitchFamily="18" charset="0"/>
+              </a:rPr>
+              <a:t>L</a:t>
+            </a:r>
+            <a:r>
+              <a:rPr lang="en-US" sz="900" b="1" baseline="-25000" dirty="0" smtClean="0">
+                <a:solidFill>
+                  <a:schemeClr val="tx1"/>
+                </a:solidFill>
+                <a:latin typeface="Times New Roman" panose="02020603050405020304" pitchFamily="18" charset="0"/>
+                <a:cs typeface="Times New Roman" panose="02020603050405020304" pitchFamily="18" charset="0"/>
+              </a:rPr>
+              <a:t>1</a:t>
+            </a:r>
+            <a:endParaRPr lang="en-US" sz="900" b="1" baseline="-25000" dirty="0">
+              <a:solidFill>
+                <a:schemeClr val="tx1"/>
+              </a:solidFill>
+              <a:latin typeface="Times New Roman" panose="02020603050405020304" pitchFamily="18" charset="0"/>
+              <a:cs typeface="Times New Roman" panose="02020603050405020304" pitchFamily="18" charset="0"/>
+            </a:endParaRPr>
+          </a:p>
+          <a:p>
+            <a:endParaRPr lang="en-US" sz="1000" b="1" baseline="-25000" dirty="0">
+              <a:solidFill>
+                <a:schemeClr val="tx1"/>
+              </a:solidFill>
+              <a:latin typeface="Times New Roman" panose="02020603050405020304" pitchFamily="18" charset="0"/>
+              <a:cs typeface="Times New Roman" panose="02020603050405020304" pitchFamily="18" charset="0"/>
+            </a:endParaRPr>
+          </a:p>
+        </p:txBody>
+      </p:sp>
+      <p:sp>
+        <p:nvSpPr>
+          <p:cNvPr id="24" name="Oval 23"/>
+          <p:cNvSpPr/>
+          <p:nvPr/>
+        </p:nvSpPr>
+        <p:spPr>
+          <a:xfrm>
+            <a:off x="3365231" y="4568608"/>
+            <a:ext cx="457200" cy="457200"/>
+          </a:xfrm>
+          <a:prstGeom prst="ellipse">
+            <a:avLst/>
+          </a:prstGeom>
+          <a:noFill/>
+          <a:ln w="19050">
+            <a:solidFill>
+              <a:schemeClr val="tx1"/>
+            </a:solidFill>
+          </a:ln>
+        </p:spPr>
+        <p:style>
+          <a:lnRef idx="2">
+            <a:schemeClr val="accent1">
+              <a:shade val="50000"/>
+            </a:schemeClr>
+          </a:lnRef>
+          <a:fillRef idx="1">
+            <a:schemeClr val="accent1"/>
+          </a:fillRef>
+          <a:effectRef idx="0">
+            <a:schemeClr val="accent1"/>
+          </a:effectRef>
+          <a:fontRef idx="minor">
+            <a:schemeClr val="lt1"/>
+          </a:fontRef>
+        </p:style>
+        <p:txBody>
+          <a:bodyPr rot="0" spcFirstLastPara="0" vert="horz" wrap="square" lIns="91440" tIns="45720" rIns="91440" bIns="45720" numCol="1" spcCol="0" rtlCol="0" fromWordArt="0" anchor="ctr" anchorCtr="0" forceAA="0" compatLnSpc="1">
+            <a:prstTxWarp prst="textNoShape">
+              <a:avLst/>
+            </a:prstTxWarp>
+            <a:noAutofit/>
+          </a:bodyPr>
+          <a:lstStyle/>
+          <a:p>
+            <a:r>
+              <a:rPr lang="en-US" sz="900" b="1" dirty="0" smtClean="0">
+                <a:solidFill>
+                  <a:schemeClr val="tx1"/>
+                </a:solidFill>
+                <a:latin typeface="Times New Roman" panose="02020603050405020304" pitchFamily="18" charset="0"/>
+                <a:cs typeface="Times New Roman" panose="02020603050405020304" pitchFamily="18" charset="0"/>
+              </a:rPr>
+              <a:t>N</a:t>
+            </a:r>
+            <a:r>
+              <a:rPr lang="en-US" sz="900" b="1" baseline="-25000" dirty="0" smtClean="0">
+                <a:solidFill>
+                  <a:schemeClr val="tx1"/>
+                </a:solidFill>
+                <a:latin typeface="Times New Roman" panose="02020603050405020304" pitchFamily="18" charset="0"/>
+                <a:cs typeface="Times New Roman" panose="02020603050405020304" pitchFamily="18" charset="0"/>
+              </a:rPr>
+              <a:t>2</a:t>
+            </a:r>
+            <a:endParaRPr lang="en-US" sz="900" b="1" baseline="-25000" dirty="0">
+              <a:solidFill>
+                <a:schemeClr val="tx1"/>
+              </a:solidFill>
+              <a:latin typeface="Times New Roman" panose="02020603050405020304" pitchFamily="18" charset="0"/>
+              <a:cs typeface="Times New Roman" panose="02020603050405020304" pitchFamily="18" charset="0"/>
+            </a:endParaRPr>
+          </a:p>
+        </p:txBody>
+      </p:sp>
+      <p:cxnSp>
+        <p:nvCxnSpPr>
+          <p:cNvPr id="25" name="Straight Connector 24"/>
+          <p:cNvCxnSpPr>
+            <a:stCxn id="4" idx="0"/>
+          </p:cNvCxnSpPr>
+          <p:nvPr/>
+        </p:nvCxnSpPr>
+        <p:spPr>
+          <a:xfrm flipV="1">
+            <a:off x="700155" y="5025808"/>
+            <a:ext cx="621774" cy="413013"/>
+          </a:xfrm>
+          <a:prstGeom prst="line">
+            <a:avLst/>
+          </a:prstGeom>
+          <a:ln w="19050">
+            <a:solidFill>
+              <a:schemeClr val="tx1"/>
+            </a:solidFill>
+          </a:ln>
+        </p:spPr>
+        <p:style>
+          <a:lnRef idx="1">
+            <a:schemeClr val="accent1"/>
+          </a:lnRef>
+          <a:fillRef idx="0">
+            <a:schemeClr val="accent1"/>
+          </a:fillRef>
+          <a:effectRef idx="0">
+            <a:schemeClr val="accent1"/>
+          </a:effectRef>
+          <a:fontRef idx="minor">
+            <a:schemeClr val="tx1"/>
+          </a:fontRef>
+        </p:style>
+      </p:cxnSp>
+      <p:cxnSp>
+        <p:nvCxnSpPr>
+          <p:cNvPr id="26" name="Straight Connector 25"/>
+          <p:cNvCxnSpPr>
+            <a:stCxn id="9" idx="0"/>
+          </p:cNvCxnSpPr>
+          <p:nvPr/>
+        </p:nvCxnSpPr>
+        <p:spPr>
+          <a:xfrm flipH="1" flipV="1">
+            <a:off x="1321929" y="5025808"/>
+            <a:ext cx="537583" cy="413013"/>
+          </a:xfrm>
+          <a:prstGeom prst="line">
+            <a:avLst/>
+          </a:prstGeom>
+          <a:ln w="19050">
+            <a:solidFill>
+              <a:schemeClr val="tx1"/>
+            </a:solidFill>
+          </a:ln>
+        </p:spPr>
+        <p:style>
+          <a:lnRef idx="1">
+            <a:schemeClr val="accent1"/>
+          </a:lnRef>
+          <a:fillRef idx="0">
+            <a:schemeClr val="accent1"/>
+          </a:fillRef>
+          <a:effectRef idx="0">
+            <a:schemeClr val="accent1"/>
+          </a:effectRef>
+          <a:fontRef idx="minor">
+            <a:schemeClr val="tx1"/>
+          </a:fontRef>
+        </p:style>
+      </p:cxnSp>
+      <p:cxnSp>
+        <p:nvCxnSpPr>
+          <p:cNvPr id="27" name="Straight Connector 26"/>
+          <p:cNvCxnSpPr/>
+          <p:nvPr/>
+        </p:nvCxnSpPr>
+        <p:spPr>
+          <a:xfrm flipV="1">
+            <a:off x="2951371" y="5025808"/>
+            <a:ext cx="642460" cy="413013"/>
+          </a:xfrm>
+          <a:prstGeom prst="line">
+            <a:avLst/>
+          </a:prstGeom>
+          <a:ln w="19050">
+            <a:solidFill>
+              <a:schemeClr val="tx1"/>
+            </a:solidFill>
+          </a:ln>
+        </p:spPr>
+        <p:style>
+          <a:lnRef idx="1">
+            <a:schemeClr val="accent1"/>
+          </a:lnRef>
+          <a:fillRef idx="0">
+            <a:schemeClr val="accent1"/>
+          </a:fillRef>
+          <a:effectRef idx="0">
+            <a:schemeClr val="accent1"/>
+          </a:effectRef>
+          <a:fontRef idx="minor">
+            <a:schemeClr val="tx1"/>
+          </a:fontRef>
+        </p:style>
+      </p:cxnSp>
+      <p:cxnSp>
+        <p:nvCxnSpPr>
+          <p:cNvPr id="28" name="Straight Connector 27"/>
+          <p:cNvCxnSpPr/>
+          <p:nvPr/>
+        </p:nvCxnSpPr>
+        <p:spPr>
+          <a:xfrm flipH="1" flipV="1">
+            <a:off x="3593831" y="5025808"/>
+            <a:ext cx="516897" cy="413013"/>
+          </a:xfrm>
+          <a:prstGeom prst="line">
+            <a:avLst/>
+          </a:prstGeom>
+          <a:ln w="19050">
+            <a:solidFill>
+              <a:schemeClr val="tx1"/>
+            </a:solidFill>
+          </a:ln>
+        </p:spPr>
+        <p:style>
+          <a:lnRef idx="1">
+            <a:schemeClr val="accent1"/>
+          </a:lnRef>
+          <a:fillRef idx="0">
+            <a:schemeClr val="accent1"/>
+          </a:fillRef>
+          <a:effectRef idx="0">
+            <a:schemeClr val="accent1"/>
+          </a:effectRef>
+          <a:fontRef idx="minor">
+            <a:schemeClr val="tx1"/>
+          </a:fontRef>
+        </p:style>
+      </p:cxnSp>
+      <p:sp>
+        <p:nvSpPr>
+          <p:cNvPr id="29" name="Oval 28"/>
+          <p:cNvSpPr/>
+          <p:nvPr/>
+        </p:nvSpPr>
+        <p:spPr>
+          <a:xfrm>
+            <a:off x="2217922" y="3771900"/>
+            <a:ext cx="457200" cy="457200"/>
+          </a:xfrm>
+          <a:prstGeom prst="ellipse">
+            <a:avLst/>
+          </a:prstGeom>
+          <a:noFill/>
+          <a:ln w="19050">
+            <a:solidFill>
+              <a:schemeClr val="tx1"/>
+            </a:solidFill>
+          </a:ln>
+        </p:spPr>
+        <p:style>
+          <a:lnRef idx="2">
+            <a:schemeClr val="accent1">
+              <a:shade val="50000"/>
+            </a:schemeClr>
+          </a:lnRef>
+          <a:fillRef idx="1">
+            <a:schemeClr val="accent1"/>
+          </a:fillRef>
+          <a:effectRef idx="0">
+            <a:schemeClr val="accent1"/>
+          </a:effectRef>
+          <a:fontRef idx="minor">
+            <a:schemeClr val="lt1"/>
+          </a:fontRef>
+        </p:style>
+        <p:txBody>
+          <a:bodyPr rot="0" spcFirstLastPara="0" vert="horz" wrap="square" lIns="91440" tIns="45720" rIns="91440" bIns="45720" numCol="1" spcCol="0" rtlCol="0" fromWordArt="0" anchor="ctr" anchorCtr="0" forceAA="0" compatLnSpc="1">
+            <a:prstTxWarp prst="textNoShape">
+              <a:avLst/>
+            </a:prstTxWarp>
+            <a:noAutofit/>
+          </a:bodyPr>
+          <a:lstStyle/>
+          <a:p>
+            <a:r>
+              <a:rPr lang="en-US" sz="900" b="1" dirty="0" smtClean="0">
+                <a:solidFill>
+                  <a:schemeClr val="tx1"/>
+                </a:solidFill>
+                <a:latin typeface="Times New Roman" panose="02020603050405020304" pitchFamily="18" charset="0"/>
+                <a:cs typeface="Times New Roman" panose="02020603050405020304" pitchFamily="18" charset="0"/>
+              </a:rPr>
+              <a:t>O</a:t>
+            </a:r>
+            <a:r>
+              <a:rPr lang="en-US" sz="900" b="1" baseline="-25000" dirty="0" smtClean="0">
+                <a:solidFill>
+                  <a:schemeClr val="tx1"/>
+                </a:solidFill>
+                <a:latin typeface="Times New Roman" panose="02020603050405020304" pitchFamily="18" charset="0"/>
+                <a:cs typeface="Times New Roman" panose="02020603050405020304" pitchFamily="18" charset="0"/>
+              </a:rPr>
+              <a:t>3</a:t>
+            </a:r>
+            <a:endParaRPr lang="en-US" sz="900" b="1" baseline="-25000" dirty="0">
+              <a:solidFill>
+                <a:schemeClr val="tx1"/>
+              </a:solidFill>
+              <a:latin typeface="Times New Roman" panose="02020603050405020304" pitchFamily="18" charset="0"/>
+              <a:cs typeface="Times New Roman" panose="02020603050405020304" pitchFamily="18" charset="0"/>
+            </a:endParaRPr>
+          </a:p>
+          <a:p>
+            <a:endParaRPr lang="en-US" sz="900" b="1" baseline="-25000" dirty="0">
+              <a:solidFill>
+                <a:schemeClr val="tx1"/>
+              </a:solidFill>
+              <a:latin typeface="Times New Roman" panose="02020603050405020304" pitchFamily="18" charset="0"/>
+              <a:cs typeface="Times New Roman" panose="02020603050405020304" pitchFamily="18" charset="0"/>
+            </a:endParaRPr>
+          </a:p>
+        </p:txBody>
+      </p:sp>
+      <p:cxnSp>
+        <p:nvCxnSpPr>
+          <p:cNvPr id="30" name="Straight Connector 29"/>
+          <p:cNvCxnSpPr>
+            <a:endCxn id="29" idx="3"/>
+          </p:cNvCxnSpPr>
+          <p:nvPr/>
+        </p:nvCxnSpPr>
+        <p:spPr>
+          <a:xfrm flipV="1">
+            <a:off x="1309682" y="4162145"/>
+            <a:ext cx="975195" cy="406464"/>
+          </a:xfrm>
+          <a:prstGeom prst="line">
+            <a:avLst/>
+          </a:prstGeom>
+          <a:ln w="19050">
+            <a:solidFill>
+              <a:schemeClr val="tx1"/>
+            </a:solidFill>
+          </a:ln>
+        </p:spPr>
+        <p:style>
+          <a:lnRef idx="1">
+            <a:schemeClr val="accent1"/>
+          </a:lnRef>
+          <a:fillRef idx="0">
+            <a:schemeClr val="accent1"/>
+          </a:fillRef>
+          <a:effectRef idx="0">
+            <a:schemeClr val="accent1"/>
+          </a:effectRef>
+          <a:fontRef idx="minor">
+            <a:schemeClr val="tx1"/>
+          </a:fontRef>
+        </p:style>
+      </p:cxnSp>
+      <p:cxnSp>
+        <p:nvCxnSpPr>
+          <p:cNvPr id="32" name="Straight Connector 31"/>
+          <p:cNvCxnSpPr>
+            <a:stCxn id="24" idx="0"/>
+            <a:endCxn id="29" idx="5"/>
+          </p:cNvCxnSpPr>
+          <p:nvPr/>
+        </p:nvCxnSpPr>
+        <p:spPr>
+          <a:xfrm flipH="1" flipV="1">
+            <a:off x="2608167" y="4162145"/>
+            <a:ext cx="985664" cy="406463"/>
+          </a:xfrm>
+          <a:prstGeom prst="line">
+            <a:avLst/>
+          </a:prstGeom>
+          <a:ln w="19050">
+            <a:solidFill>
+              <a:schemeClr val="tx1"/>
+            </a:solidFill>
+          </a:ln>
+        </p:spPr>
+        <p:style>
+          <a:lnRef idx="1">
+            <a:schemeClr val="accent1"/>
+          </a:lnRef>
+          <a:fillRef idx="0">
+            <a:schemeClr val="accent1"/>
+          </a:fillRef>
+          <a:effectRef idx="0">
+            <a:schemeClr val="accent1"/>
+          </a:effectRef>
+          <a:fontRef idx="minor">
+            <a:schemeClr val="tx1"/>
+          </a:fontRef>
+        </p:style>
+      </p:cxnSp>
+      <p:sp>
+        <p:nvSpPr>
+          <p:cNvPr id="33" name="Oval 32"/>
+          <p:cNvSpPr/>
+          <p:nvPr/>
+        </p:nvSpPr>
+        <p:spPr>
+          <a:xfrm>
+            <a:off x="1081082" y="4568608"/>
+            <a:ext cx="457200" cy="457200"/>
+          </a:xfrm>
+          <a:prstGeom prst="ellipse">
+            <a:avLst/>
+          </a:prstGeom>
+          <a:noFill/>
+          <a:ln w="19050">
+            <a:solidFill>
+              <a:schemeClr val="tx1"/>
+            </a:solidFill>
+          </a:ln>
+        </p:spPr>
+        <p:style>
+          <a:lnRef idx="2">
+            <a:schemeClr val="accent1">
+              <a:shade val="50000"/>
+            </a:schemeClr>
+          </a:lnRef>
+          <a:fillRef idx="1">
+            <a:schemeClr val="accent1"/>
+          </a:fillRef>
+          <a:effectRef idx="0">
+            <a:schemeClr val="accent1"/>
+          </a:effectRef>
+          <a:fontRef idx="minor">
+            <a:schemeClr val="lt1"/>
+          </a:fontRef>
+        </p:style>
+        <p:txBody>
+          <a:bodyPr rot="0" spcFirstLastPara="0" vert="horz" wrap="square" lIns="91440" tIns="45720" rIns="91440" bIns="45720" numCol="1" spcCol="0" rtlCol="0" fromWordArt="0" anchor="ctr" anchorCtr="0" forceAA="0" compatLnSpc="1">
+            <a:prstTxWarp prst="textNoShape">
+              <a:avLst/>
+            </a:prstTxWarp>
+            <a:noAutofit/>
+          </a:bodyPr>
+          <a:lstStyle/>
+          <a:p>
+            <a:r>
+              <a:rPr lang="en-US" sz="850" b="1" dirty="0" smtClean="0">
+                <a:solidFill>
+                  <a:schemeClr val="tx1"/>
+                </a:solidFill>
+                <a:latin typeface="Times New Roman" panose="02020603050405020304" pitchFamily="18" charset="0"/>
+                <a:cs typeface="Times New Roman" panose="02020603050405020304" pitchFamily="18" charset="0"/>
+              </a:rPr>
+              <a:t>M</a:t>
+            </a:r>
+            <a:r>
+              <a:rPr lang="en-US" sz="850" b="1" baseline="-25000" dirty="0" smtClean="0">
+                <a:solidFill>
+                  <a:schemeClr val="tx1"/>
+                </a:solidFill>
+                <a:latin typeface="Times New Roman" panose="02020603050405020304" pitchFamily="18" charset="0"/>
+                <a:cs typeface="Times New Roman" panose="02020603050405020304" pitchFamily="18" charset="0"/>
+              </a:rPr>
+              <a:t>2</a:t>
+            </a:r>
+            <a:endParaRPr lang="en-US" sz="850" b="1" baseline="-25000" dirty="0">
+              <a:solidFill>
+                <a:schemeClr val="tx1"/>
+              </a:solidFill>
+              <a:latin typeface="Times New Roman" panose="02020603050405020304" pitchFamily="18" charset="0"/>
+              <a:cs typeface="Times New Roman" panose="02020603050405020304" pitchFamily="18" charset="0"/>
+            </a:endParaRPr>
+          </a:p>
+        </p:txBody>
+      </p:sp>
+    </p:spTree>
+    <p:extLst>
+      <p:ext uri="{BB962C8B-B14F-4D97-AF65-F5344CB8AC3E}">
+        <p14:creationId xmlns:p14="http://schemas.microsoft.com/office/powerpoint/2010/main" val="4205240897"/>
       </p:ext>
     </p:extLst>
   </p:cSld>

</xml_diff>